<commit_message>
adding few slides to phenotype powerpoint
</commit_message>
<xml_diff>
--- a/docs/presentations/OBI workshop Oct 2011 Philly/Phenotype.pptx
+++ b/docs/presentations/OBI workshop Oct 2011 Philly/Phenotype.pptx
@@ -1,6 +1,6 @@
 
 <file path=ppt/presentation.xml><?xml version="1.0" encoding="utf-8"?>
-<p:presentation xmlns:a="http://schemas.openxmlformats.org/drawingml/2006/main" xmlns:r="http://schemas.openxmlformats.org/officeDocument/2006/relationships" xmlns:p="http://schemas.openxmlformats.org/presentationml/2006/main" saveSubsetFonts="1">
+<p:presentation xmlns:a="http://schemas.openxmlformats.org/drawingml/2006/main" xmlns:r="http://schemas.openxmlformats.org/officeDocument/2006/relationships" xmlns:mc="http://schemas.openxmlformats.org/markup-compatibility/2006" xmlns:mv="urn:schemas-microsoft-com:mac:vml" xmlns:p="http://schemas.openxmlformats.org/presentationml/2006/main" mc:Ignorable="mv" mc:PreserveAttributes="mv:*" saveSubsetFonts="1">
   <p:sldMasterIdLst>
     <p:sldMasterId id="2147483660" r:id="rId1"/>
     <p:sldMasterId id="2147483671" r:id="rId2"/>
@@ -19,6 +19,14 @@
     <p:sldId id="262" r:id="rId13"/>
     <p:sldId id="258" r:id="rId14"/>
     <p:sldId id="259" r:id="rId15"/>
+    <p:sldId id="272" r:id="rId16"/>
+    <p:sldId id="268" r:id="rId17"/>
+    <p:sldId id="270" r:id="rId18"/>
+    <p:sldId id="269" r:id="rId19"/>
+    <p:sldId id="267" r:id="rId20"/>
+    <p:sldId id="271" r:id="rId21"/>
+    <p:sldId id="265" r:id="rId22"/>
+    <p:sldId id="266" r:id="rId23"/>
   </p:sldIdLst>
   <p:sldSz cx="9144000" cy="6858000" type="screen4x3"/>
   <p:notesSz cx="6858000" cy="9144000"/>
@@ -121,7 +129,7 @@
 </file>
 
 <file path=ppt/slideLayouts/slideLayout1.xml><?xml version="1.0" encoding="utf-8"?>
-<p:sldLayout xmlns:a="http://schemas.openxmlformats.org/drawingml/2006/main" xmlns:r="http://schemas.openxmlformats.org/officeDocument/2006/relationships" xmlns:p="http://schemas.openxmlformats.org/presentationml/2006/main" showMasterSp="0" preserve="1">
+<p:sldLayout xmlns:a="http://schemas.openxmlformats.org/drawingml/2006/main" xmlns:r="http://schemas.openxmlformats.org/officeDocument/2006/relationships" xmlns:mc="http://schemas.openxmlformats.org/markup-compatibility/2006" xmlns:mv="urn:schemas-microsoft-com:mac:vml" xmlns:p="http://schemas.openxmlformats.org/presentationml/2006/main" mc:Ignorable="mv" mc:PreserveAttributes="mv:*" showMasterSp="0" preserve="1">
   <p:cSld name="Title Slide">
     <p:spTree>
       <p:nvGrpSpPr>
@@ -184,7 +192,6 @@
             <a:lvl9pPr marL="3657600" indent="0" algn="ctr">
               <a:buNone/>
             </a:lvl9pPr>
-            <a:extLst/>
           </a:lstStyle>
           <a:p>
             <a:r>
@@ -240,9 +247,7 @@
           </p:style>
           <p:txBody>
             <a:bodyPr anchor="ctr"/>
-            <a:lstStyle>
-              <a:extLst/>
-            </a:lstStyle>
+            <a:lstStyle/>
             <a:p>
               <a:pPr algn="ctr"/>
               <a:endParaRPr lang="en-US"/>
@@ -280,9 +285,7 @@
           </p:style>
           <p:txBody>
             <a:bodyPr anchor="ctr"/>
-            <a:lstStyle>
-              <a:extLst/>
-            </a:lstStyle>
+            <a:lstStyle/>
             <a:p>
               <a:pPr algn="ctr"/>
               <a:endParaRPr lang="en-US"/>
@@ -320,9 +323,7 @@
           </p:style>
           <p:txBody>
             <a:bodyPr anchor="ctr"/>
-            <a:lstStyle>
-              <a:extLst/>
-            </a:lstStyle>
+            <a:lstStyle/>
             <a:p>
               <a:pPr algn="ctr"/>
               <a:endParaRPr lang="en-US"/>
@@ -360,9 +361,7 @@
           </p:style>
           <p:txBody>
             <a:bodyPr anchor="ctr"/>
-            <a:lstStyle>
-              <a:extLst/>
-            </a:lstStyle>
+            <a:lstStyle/>
             <a:p>
               <a:pPr algn="ctr"/>
               <a:endParaRPr lang="en-US"/>
@@ -400,9 +399,7 @@
           </p:style>
           <p:txBody>
             <a:bodyPr anchor="ctr"/>
-            <a:lstStyle>
-              <a:extLst/>
-            </a:lstStyle>
+            <a:lstStyle/>
             <a:p>
               <a:pPr algn="ctr"/>
               <a:endParaRPr lang="en-US"/>
@@ -440,9 +437,7 @@
           </p:style>
           <p:txBody>
             <a:bodyPr anchor="ctr"/>
-            <a:lstStyle>
-              <a:extLst/>
-            </a:lstStyle>
+            <a:lstStyle/>
             <a:p>
               <a:pPr algn="ctr"/>
               <a:endParaRPr lang="en-US"/>
@@ -480,9 +475,7 @@
           </p:style>
           <p:txBody>
             <a:bodyPr anchor="ctr"/>
-            <a:lstStyle>
-              <a:extLst/>
-            </a:lstStyle>
+            <a:lstStyle/>
             <a:p>
               <a:pPr algn="ctr"/>
               <a:endParaRPr lang="en-US"/>
@@ -535,9 +528,7 @@
           </p:style>
           <p:txBody>
             <a:bodyPr anchor="ctr"/>
-            <a:lstStyle>
-              <a:extLst/>
-            </a:lstStyle>
+            <a:lstStyle/>
             <a:p>
               <a:pPr algn="ctr"/>
               <a:endParaRPr lang="en-US"/>
@@ -575,9 +566,7 @@
           </p:style>
           <p:txBody>
             <a:bodyPr anchor="ctr"/>
-            <a:lstStyle>
-              <a:extLst/>
-            </a:lstStyle>
+            <a:lstStyle/>
             <a:p>
               <a:pPr algn="ctr"/>
               <a:endParaRPr lang="en-US"/>
@@ -615,9 +604,7 @@
           </p:style>
           <p:txBody>
             <a:bodyPr anchor="ctr"/>
-            <a:lstStyle>
-              <a:extLst/>
-            </a:lstStyle>
+            <a:lstStyle/>
             <a:p>
               <a:pPr algn="ctr"/>
               <a:endParaRPr lang="en-US"/>
@@ -655,9 +642,7 @@
           </p:style>
           <p:txBody>
             <a:bodyPr anchor="ctr"/>
-            <a:lstStyle>
-              <a:extLst/>
-            </a:lstStyle>
+            <a:lstStyle/>
             <a:p>
               <a:pPr algn="ctr"/>
               <a:endParaRPr lang="en-US" dirty="0"/>
@@ -695,9 +680,7 @@
           </p:style>
           <p:txBody>
             <a:bodyPr anchor="ctr"/>
-            <a:lstStyle>
-              <a:extLst/>
-            </a:lstStyle>
+            <a:lstStyle/>
             <a:p>
               <a:pPr algn="ctr"/>
               <a:endParaRPr lang="en-US"/>
@@ -735,9 +718,7 @@
           </p:style>
           <p:txBody>
             <a:bodyPr anchor="ctr"/>
-            <a:lstStyle>
-              <a:extLst/>
-            </a:lstStyle>
+            <a:lstStyle/>
             <a:p>
               <a:pPr algn="ctr"/>
               <a:endParaRPr lang="en-US"/>
@@ -775,9 +756,7 @@
           </p:style>
           <p:txBody>
             <a:bodyPr anchor="ctr"/>
-            <a:lstStyle>
-              <a:extLst/>
-            </a:lstStyle>
+            <a:lstStyle/>
             <a:p>
               <a:pPr algn="ctr"/>
               <a:endParaRPr lang="en-US"/>
@@ -817,9 +796,7 @@
         </p:style>
         <p:txBody>
           <a:bodyPr anchor="ctr"/>
-          <a:lstStyle>
-            <a:extLst/>
-          </a:lstStyle>
+          <a:lstStyle/>
           <a:p>
             <a:pPr algn="ctr"/>
             <a:endParaRPr lang="en-US" dirty="0"/>
@@ -858,9 +835,7 @@
         </p:style>
         <p:txBody>
           <a:bodyPr anchor="ctr"/>
-          <a:lstStyle>
-            <a:extLst/>
-          </a:lstStyle>
+          <a:lstStyle/>
           <a:p>
             <a:pPr algn="ctr"/>
             <a:endParaRPr lang="en-US"/>
@@ -899,9 +874,7 @@
         </p:style>
         <p:txBody>
           <a:bodyPr anchor="ctr"/>
-          <a:lstStyle>
-            <a:extLst/>
-          </a:lstStyle>
+          <a:lstStyle/>
           <a:p>
             <a:pPr algn="ctr"/>
             <a:endParaRPr lang="en-US"/>
@@ -940,9 +913,7 @@
         </p:style>
         <p:txBody>
           <a:bodyPr anchor="ctr"/>
-          <a:lstStyle>
-            <a:extLst/>
-          </a:lstStyle>
+          <a:lstStyle/>
           <a:p>
             <a:pPr algn="ctr"/>
             <a:endParaRPr lang="en-US"/>
@@ -962,14 +933,12 @@
         <p:spPr/>
         <p:txBody>
           <a:bodyPr rtlCol="0"/>
-          <a:lstStyle>
-            <a:extLst/>
-          </a:lstStyle>
+          <a:lstStyle/>
           <a:p>
             <a:fld id="{FC4E1F84-22AE-408B-8AEE-B5F39E910140}" type="datetimeFigureOut">
               <a:rPr lang="en-US" smtClean="0"/>
               <a:pPr/>
-              <a:t>10/7/2011</a:t>
+              <a:t>10/12/11</a:t>
             </a:fld>
             <a:endParaRPr lang="en-US"/>
           </a:p>
@@ -988,9 +957,7 @@
         <p:spPr/>
         <p:txBody>
           <a:bodyPr rtlCol="0"/>
-          <a:lstStyle>
-            <a:extLst/>
-          </a:lstStyle>
+          <a:lstStyle/>
           <a:p>
             <a:fld id="{700068D3-86B4-4F8E-B6AD-2596F9145F76}" type="slidenum">
               <a:rPr lang="en-US" smtClean="0"/>
@@ -1014,9 +981,7 @@
         <p:spPr/>
         <p:txBody>
           <a:bodyPr rtlCol="0"/>
-          <a:lstStyle>
-            <a:extLst/>
-          </a:lstStyle>
+          <a:lstStyle/>
           <a:p>
             <a:endParaRPr lang="en-US"/>
           </a:p>
@@ -1089,7 +1054,6 @@
                 <a:cs typeface="+mj-cs"/>
               </a:defRPr>
             </a:lvl1pPr>
-            <a:extLst/>
           </a:lstStyle>
           <a:p>
             <a:r>
@@ -1116,7 +1080,7 @@
 </file>
 
 <file path=ppt/slideLayouts/slideLayout10.xml><?xml version="1.0" encoding="utf-8"?>
-<p:sldLayout xmlns:a="http://schemas.openxmlformats.org/drawingml/2006/main" xmlns:r="http://schemas.openxmlformats.org/officeDocument/2006/relationships" xmlns:p="http://schemas.openxmlformats.org/presentationml/2006/main" type="titleOnly">
+<p:sldLayout xmlns:a="http://schemas.openxmlformats.org/drawingml/2006/main" xmlns:r="http://schemas.openxmlformats.org/officeDocument/2006/relationships" xmlns:mc="http://schemas.openxmlformats.org/markup-compatibility/2006" xmlns:mv="urn:schemas-microsoft-com:mac:vml" xmlns:p="http://schemas.openxmlformats.org/presentationml/2006/main" mc:Ignorable="mv" mc:PreserveAttributes="mv:*" type="titleOnly">
   <p:cSld name="Title Only">
     <p:spTree>
       <p:nvGrpSpPr>
@@ -1173,7 +1137,7 @@
             <a:fld id="{FC4E1F84-22AE-408B-8AEE-B5F39E910140}" type="datetimeFigureOut">
               <a:rPr lang="en-US" smtClean="0"/>
               <a:pPr/>
-              <a:t>10/7/2011</a:t>
+              <a:t>10/12/11</a:t>
             </a:fld>
             <a:endParaRPr lang="en-US"/>
           </a:p>
@@ -1238,7 +1202,7 @@
 </file>
 
 <file path=ppt/slideLayouts/slideLayout11.xml><?xml version="1.0" encoding="utf-8"?>
-<p:sldLayout xmlns:a="http://schemas.openxmlformats.org/drawingml/2006/main" xmlns:r="http://schemas.openxmlformats.org/officeDocument/2006/relationships" xmlns:p="http://schemas.openxmlformats.org/presentationml/2006/main" showMasterSp="0" type="title" preserve="1">
+<p:sldLayout xmlns:a="http://schemas.openxmlformats.org/drawingml/2006/main" xmlns:r="http://schemas.openxmlformats.org/officeDocument/2006/relationships" xmlns:mc="http://schemas.openxmlformats.org/markup-compatibility/2006" xmlns:mv="urn:schemas-microsoft-com:mac:vml" xmlns:p="http://schemas.openxmlformats.org/presentationml/2006/main" mc:Ignorable="mv" mc:PreserveAttributes="mv:*" showMasterSp="0" type="title" preserve="1">
   <p:cSld name="Title Slide">
     <p:bg>
       <p:bgRef idx="1001">
@@ -1380,7 +1344,7 @@
             <a:fld id="{39C41B7C-DC17-4ECC-A2D3-90661E3E8418}" type="datetimeFigureOut">
               <a:rPr lang="en-US" smtClean="0"/>
               <a:pPr/>
-              <a:t>10/7/2011</a:t>
+              <a:t>10/12/11</a:t>
             </a:fld>
             <a:endParaRPr lang="en-US"/>
           </a:p>
@@ -2149,7 +2113,7 @@
 </file>
 
 <file path=ppt/slideLayouts/slideLayout12.xml><?xml version="1.0" encoding="utf-8"?>
-<p:sldLayout xmlns:a="http://schemas.openxmlformats.org/drawingml/2006/main" xmlns:r="http://schemas.openxmlformats.org/officeDocument/2006/relationships" xmlns:p="http://schemas.openxmlformats.org/presentationml/2006/main" type="obj" preserve="1">
+<p:sldLayout xmlns:a="http://schemas.openxmlformats.org/drawingml/2006/main" xmlns:r="http://schemas.openxmlformats.org/officeDocument/2006/relationships" xmlns:mc="http://schemas.openxmlformats.org/markup-compatibility/2006" xmlns:mv="urn:schemas-microsoft-com:mac:vml" xmlns:p="http://schemas.openxmlformats.org/presentationml/2006/main" mc:Ignorable="mv" mc:PreserveAttributes="mv:*" type="obj" preserve="1">
   <p:cSld name="Title and Content">
     <p:spTree>
       <p:nvGrpSpPr>
@@ -2263,7 +2227,7 @@
             <a:fld id="{39C41B7C-DC17-4ECC-A2D3-90661E3E8418}" type="datetimeFigureOut">
               <a:rPr lang="en-US" smtClean="0"/>
               <a:pPr/>
-              <a:t>10/7/2011</a:t>
+              <a:t>10/12/11</a:t>
             </a:fld>
             <a:endParaRPr lang="en-US"/>
           </a:p>
@@ -2328,7 +2292,7 @@
 </file>
 
 <file path=ppt/slideLayouts/slideLayout13.xml><?xml version="1.0" encoding="utf-8"?>
-<p:sldLayout xmlns:a="http://schemas.openxmlformats.org/drawingml/2006/main" xmlns:r="http://schemas.openxmlformats.org/officeDocument/2006/relationships" xmlns:p="http://schemas.openxmlformats.org/presentationml/2006/main" showMasterSp="0" type="secHead" preserve="1">
+<p:sldLayout xmlns:a="http://schemas.openxmlformats.org/drawingml/2006/main" xmlns:r="http://schemas.openxmlformats.org/officeDocument/2006/relationships" xmlns:mc="http://schemas.openxmlformats.org/markup-compatibility/2006" xmlns:mv="urn:schemas-microsoft-com:mac:vml" xmlns:p="http://schemas.openxmlformats.org/presentationml/2006/main" mc:Ignorable="mv" mc:PreserveAttributes="mv:*" showMasterSp="0" type="secHead" preserve="1">
   <p:cSld name="Section Header">
     <p:bg>
       <p:bgRef idx="1001">
@@ -2482,7 +2446,7 @@
             <a:fld id="{39C41B7C-DC17-4ECC-A2D3-90661E3E8418}" type="datetimeFigureOut">
               <a:rPr lang="en-US" smtClean="0"/>
               <a:pPr/>
-              <a:t>10/7/2011</a:t>
+              <a:t>10/12/11</a:t>
             </a:fld>
             <a:endParaRPr lang="en-US"/>
           </a:p>
@@ -3248,7 +3212,7 @@
 </file>
 
 <file path=ppt/slideLayouts/slideLayout14.xml><?xml version="1.0" encoding="utf-8"?>
-<p:sldLayout xmlns:a="http://schemas.openxmlformats.org/drawingml/2006/main" xmlns:r="http://schemas.openxmlformats.org/officeDocument/2006/relationships" xmlns:p="http://schemas.openxmlformats.org/presentationml/2006/main" type="twoObj" preserve="1">
+<p:sldLayout xmlns:a="http://schemas.openxmlformats.org/drawingml/2006/main" xmlns:r="http://schemas.openxmlformats.org/officeDocument/2006/relationships" xmlns:mc="http://schemas.openxmlformats.org/markup-compatibility/2006" xmlns:mv="urn:schemas-microsoft-com:mac:vml" xmlns:p="http://schemas.openxmlformats.org/presentationml/2006/main" mc:Ignorable="mv" mc:PreserveAttributes="mv:*" type="twoObj" preserve="1">
   <p:cSld name="Two Content">
     <p:spTree>
       <p:nvGrpSpPr>
@@ -3305,7 +3269,7 @@
             <a:fld id="{39C41B7C-DC17-4ECC-A2D3-90661E3E8418}" type="datetimeFigureOut">
               <a:rPr lang="en-US" smtClean="0"/>
               <a:pPr/>
-              <a:t>10/7/2011</a:t>
+              <a:t>10/12/11</a:t>
             </a:fld>
             <a:endParaRPr lang="en-US"/>
           </a:p>
@@ -3484,7 +3448,7 @@
 </file>
 
 <file path=ppt/slideLayouts/slideLayout15.xml><?xml version="1.0" encoding="utf-8"?>
-<p:sldLayout xmlns:a="http://schemas.openxmlformats.org/drawingml/2006/main" xmlns:r="http://schemas.openxmlformats.org/officeDocument/2006/relationships" xmlns:p="http://schemas.openxmlformats.org/presentationml/2006/main" type="twoTxTwoObj" preserve="1">
+<p:sldLayout xmlns:a="http://schemas.openxmlformats.org/drawingml/2006/main" xmlns:r="http://schemas.openxmlformats.org/officeDocument/2006/relationships" xmlns:mc="http://schemas.openxmlformats.org/markup-compatibility/2006" xmlns:mv="urn:schemas-microsoft-com:mac:vml" xmlns:p="http://schemas.openxmlformats.org/presentationml/2006/main" mc:Ignorable="mv" mc:PreserveAttributes="mv:*" type="twoTxTwoObj" preserve="1">
   <p:cSld name="Comparison">
     <p:spTree>
       <p:nvGrpSpPr>
@@ -3550,7 +3514,7 @@
             <a:fld id="{39C41B7C-DC17-4ECC-A2D3-90661E3E8418}" type="datetimeFigureOut">
               <a:rPr lang="en-US" smtClean="0"/>
               <a:pPr/>
-              <a:t>10/7/2011</a:t>
+              <a:t>10/12/11</a:t>
             </a:fld>
             <a:endParaRPr lang="en-US"/>
           </a:p>
@@ -3825,7 +3789,7 @@
 </file>
 
 <file path=ppt/slideLayouts/slideLayout16.xml><?xml version="1.0" encoding="utf-8"?>
-<p:sldLayout xmlns:a="http://schemas.openxmlformats.org/drawingml/2006/main" xmlns:r="http://schemas.openxmlformats.org/officeDocument/2006/relationships" xmlns:p="http://schemas.openxmlformats.org/presentationml/2006/main" type="titleOnly" preserve="1">
+<p:sldLayout xmlns:a="http://schemas.openxmlformats.org/drawingml/2006/main" xmlns:r="http://schemas.openxmlformats.org/officeDocument/2006/relationships" xmlns:mc="http://schemas.openxmlformats.org/markup-compatibility/2006" xmlns:mv="urn:schemas-microsoft-com:mac:vml" xmlns:p="http://schemas.openxmlformats.org/presentationml/2006/main" mc:Ignorable="mv" mc:PreserveAttributes="mv:*" type="titleOnly" preserve="1">
   <p:cSld name="Title Only">
     <p:spTree>
       <p:nvGrpSpPr>
@@ -3882,7 +3846,7 @@
             <a:fld id="{39C41B7C-DC17-4ECC-A2D3-90661E3E8418}" type="datetimeFigureOut">
               <a:rPr lang="en-US" smtClean="0"/>
               <a:pPr/>
-              <a:t>10/7/2011</a:t>
+              <a:t>10/12/11</a:t>
             </a:fld>
             <a:endParaRPr lang="en-US"/>
           </a:p>
@@ -3947,7 +3911,7 @@
 </file>
 
 <file path=ppt/slideLayouts/slideLayout17.xml><?xml version="1.0" encoding="utf-8"?>
-<p:sldLayout xmlns:a="http://schemas.openxmlformats.org/drawingml/2006/main" xmlns:r="http://schemas.openxmlformats.org/officeDocument/2006/relationships" xmlns:p="http://schemas.openxmlformats.org/presentationml/2006/main" type="blank" preserve="1">
+<p:sldLayout xmlns:a="http://schemas.openxmlformats.org/drawingml/2006/main" xmlns:r="http://schemas.openxmlformats.org/officeDocument/2006/relationships" xmlns:mc="http://schemas.openxmlformats.org/markup-compatibility/2006" xmlns:mv="urn:schemas-microsoft-com:mac:vml" xmlns:p="http://schemas.openxmlformats.org/presentationml/2006/main" mc:Ignorable="mv" mc:PreserveAttributes="mv:*" type="blank" preserve="1">
   <p:cSld name="Blank">
     <p:spTree>
       <p:nvGrpSpPr>
@@ -3981,7 +3945,7 @@
             <a:fld id="{39C41B7C-DC17-4ECC-A2D3-90661E3E8418}" type="datetimeFigureOut">
               <a:rPr lang="en-US" smtClean="0"/>
               <a:pPr/>
-              <a:t>10/7/2011</a:t>
+              <a:t>10/12/11</a:t>
             </a:fld>
             <a:endParaRPr lang="en-US"/>
           </a:p>
@@ -4046,7 +4010,7 @@
 </file>
 
 <file path=ppt/slideLayouts/slideLayout18.xml><?xml version="1.0" encoding="utf-8"?>
-<p:sldLayout xmlns:a="http://schemas.openxmlformats.org/drawingml/2006/main" xmlns:r="http://schemas.openxmlformats.org/officeDocument/2006/relationships" xmlns:p="http://schemas.openxmlformats.org/presentationml/2006/main" showMasterSp="0" type="objTx" preserve="1">
+<p:sldLayout xmlns:a="http://schemas.openxmlformats.org/drawingml/2006/main" xmlns:r="http://schemas.openxmlformats.org/officeDocument/2006/relationships" xmlns:mc="http://schemas.openxmlformats.org/markup-compatibility/2006" xmlns:mv="urn:schemas-microsoft-com:mac:vml" xmlns:p="http://schemas.openxmlformats.org/presentationml/2006/main" mc:Ignorable="mv" mc:PreserveAttributes="mv:*" showMasterSp="0" type="objTx" preserve="1">
   <p:cSld name="Content with Caption">
     <p:bg>
       <p:bgRef idx="1001">
@@ -4507,7 +4471,7 @@
             <a:fld id="{39C41B7C-DC17-4ECC-A2D3-90661E3E8418}" type="datetimeFigureOut">
               <a:rPr lang="en-US" smtClean="0"/>
               <a:pPr/>
-              <a:t>10/7/2011</a:t>
+              <a:t>10/12/11</a:t>
             </a:fld>
             <a:endParaRPr lang="en-US"/>
           </a:p>
@@ -4572,7 +4536,7 @@
 </file>
 
 <file path=ppt/slideLayouts/slideLayout19.xml><?xml version="1.0" encoding="utf-8"?>
-<p:sldLayout xmlns:a="http://schemas.openxmlformats.org/drawingml/2006/main" xmlns:r="http://schemas.openxmlformats.org/officeDocument/2006/relationships" xmlns:p="http://schemas.openxmlformats.org/presentationml/2006/main" showMasterSp="0" type="picTx" preserve="1">
+<p:sldLayout xmlns:a="http://schemas.openxmlformats.org/drawingml/2006/main" xmlns:r="http://schemas.openxmlformats.org/officeDocument/2006/relationships" xmlns:mc="http://schemas.openxmlformats.org/markup-compatibility/2006" xmlns:mv="urn:schemas-microsoft-com:mac:vml" xmlns:p="http://schemas.openxmlformats.org/presentationml/2006/main" mc:Ignorable="mv" mc:PreserveAttributes="mv:*" showMasterSp="0" type="picTx" preserve="1">
   <p:cSld name="Picture with Caption">
     <p:spTree>
       <p:nvGrpSpPr>
@@ -5027,7 +4991,7 @@
             <a:fld id="{39C41B7C-DC17-4ECC-A2D3-90661E3E8418}" type="datetimeFigureOut">
               <a:rPr lang="en-US" smtClean="0"/>
               <a:pPr/>
-              <a:t>10/7/2011</a:t>
+              <a:t>10/12/11</a:t>
             </a:fld>
             <a:endParaRPr lang="en-US"/>
           </a:p>
@@ -5092,7 +5056,7 @@
 </file>
 
 <file path=ppt/slideLayouts/slideLayout2.xml><?xml version="1.0" encoding="utf-8"?>
-<p:sldLayout xmlns:a="http://schemas.openxmlformats.org/drawingml/2006/main" xmlns:r="http://schemas.openxmlformats.org/officeDocument/2006/relationships" xmlns:p="http://schemas.openxmlformats.org/presentationml/2006/main" preserve="1">
+<p:sldLayout xmlns:a="http://schemas.openxmlformats.org/drawingml/2006/main" xmlns:r="http://schemas.openxmlformats.org/officeDocument/2006/relationships" xmlns:mc="http://schemas.openxmlformats.org/markup-compatibility/2006" xmlns:mv="urn:schemas-microsoft-com:mac:vml" xmlns:p="http://schemas.openxmlformats.org/presentationml/2006/main" mc:Ignorable="mv" mc:PreserveAttributes="mv:*" preserve="1">
   <p:cSld name="Title and Content">
     <p:spTree>
       <p:nvGrpSpPr>
@@ -5121,9 +5085,7 @@
         <p:spPr/>
         <p:txBody>
           <a:bodyPr/>
-          <a:lstStyle>
-            <a:extLst/>
-          </a:lstStyle>
+          <a:lstStyle/>
           <a:p>
             <a:pPr lvl="0"/>
             <a:r>
@@ -5175,14 +5137,12 @@
         <p:spPr/>
         <p:txBody>
           <a:bodyPr rtlCol="0"/>
-          <a:lstStyle>
-            <a:extLst/>
-          </a:lstStyle>
+          <a:lstStyle/>
           <a:p>
             <a:fld id="{FC4E1F84-22AE-408B-8AEE-B5F39E910140}" type="datetimeFigureOut">
               <a:rPr lang="en-US" smtClean="0"/>
               <a:pPr/>
-              <a:t>10/7/2011</a:t>
+              <a:t>10/12/11</a:t>
             </a:fld>
             <a:endParaRPr lang="en-US"/>
           </a:p>
@@ -5201,9 +5161,7 @@
         <p:spPr/>
         <p:txBody>
           <a:bodyPr rtlCol="0"/>
-          <a:lstStyle>
-            <a:extLst/>
-          </a:lstStyle>
+          <a:lstStyle/>
           <a:p>
             <a:fld id="{700068D3-86B4-4F8E-B6AD-2596F9145F76}" type="slidenum">
               <a:rPr lang="en-US" smtClean="0"/>
@@ -5227,9 +5185,7 @@
         <p:spPr/>
         <p:txBody>
           <a:bodyPr rtlCol="0"/>
-          <a:lstStyle>
-            <a:extLst/>
-          </a:lstStyle>
+          <a:lstStyle/>
           <a:p>
             <a:endParaRPr lang="en-US"/>
           </a:p>
@@ -5248,9 +5204,7 @@
         <p:spPr/>
         <p:txBody>
           <a:bodyPr rtlCol="0" anchor="b"/>
-          <a:lstStyle>
-            <a:extLst/>
-          </a:lstStyle>
+          <a:lstStyle/>
           <a:p>
             <a:r>
               <a:rPr lang="en-US" smtClean="0"/>
@@ -5276,7 +5230,7 @@
 </file>
 
 <file path=ppt/slideLayouts/slideLayout20.xml><?xml version="1.0" encoding="utf-8"?>
-<p:sldLayout xmlns:a="http://schemas.openxmlformats.org/drawingml/2006/main" xmlns:r="http://schemas.openxmlformats.org/officeDocument/2006/relationships" xmlns:p="http://schemas.openxmlformats.org/presentationml/2006/main" type="vertTx" preserve="1">
+<p:sldLayout xmlns:a="http://schemas.openxmlformats.org/drawingml/2006/main" xmlns:r="http://schemas.openxmlformats.org/officeDocument/2006/relationships" xmlns:mc="http://schemas.openxmlformats.org/markup-compatibility/2006" xmlns:mv="urn:schemas-microsoft-com:mac:vml" xmlns:p="http://schemas.openxmlformats.org/presentationml/2006/main" mc:Ignorable="mv" mc:PreserveAttributes="mv:*" type="vertTx" preserve="1">
   <p:cSld name="Title and Vertical Text">
     <p:spTree>
       <p:nvGrpSpPr>
@@ -5385,7 +5339,7 @@
             <a:fld id="{39C41B7C-DC17-4ECC-A2D3-90661E3E8418}" type="datetimeFigureOut">
               <a:rPr lang="en-US" smtClean="0"/>
               <a:pPr/>
-              <a:t>10/7/2011</a:t>
+              <a:t>10/12/11</a:t>
             </a:fld>
             <a:endParaRPr lang="en-US"/>
           </a:p>
@@ -5450,7 +5404,7 @@
 </file>
 
 <file path=ppt/slideLayouts/slideLayout21.xml><?xml version="1.0" encoding="utf-8"?>
-<p:sldLayout xmlns:a="http://schemas.openxmlformats.org/drawingml/2006/main" xmlns:r="http://schemas.openxmlformats.org/officeDocument/2006/relationships" xmlns:p="http://schemas.openxmlformats.org/presentationml/2006/main" type="vertTitleAndTx" preserve="1">
+<p:sldLayout xmlns:a="http://schemas.openxmlformats.org/drawingml/2006/main" xmlns:r="http://schemas.openxmlformats.org/officeDocument/2006/relationships" xmlns:mc="http://schemas.openxmlformats.org/markup-compatibility/2006" xmlns:mv="urn:schemas-microsoft-com:mac:vml" xmlns:p="http://schemas.openxmlformats.org/presentationml/2006/main" mc:Ignorable="mv" mc:PreserveAttributes="mv:*" type="vertTitleAndTx" preserve="1">
   <p:cSld name="Vertical Title and Text">
     <p:spTree>
       <p:nvGrpSpPr>
@@ -5569,7 +5523,7 @@
             <a:fld id="{39C41B7C-DC17-4ECC-A2D3-90661E3E8418}" type="datetimeFigureOut">
               <a:rPr lang="en-US" smtClean="0"/>
               <a:pPr/>
-              <a:t>10/7/2011</a:t>
+              <a:t>10/12/11</a:t>
             </a:fld>
             <a:endParaRPr lang="en-US"/>
           </a:p>
@@ -5634,7 +5588,7 @@
 </file>
 
 <file path=ppt/slideLayouts/slideLayout22.xml><?xml version="1.0" encoding="utf-8"?>
-<p:sldLayout xmlns:a="http://schemas.openxmlformats.org/drawingml/2006/main" xmlns:r="http://schemas.openxmlformats.org/officeDocument/2006/relationships" xmlns:p="http://schemas.openxmlformats.org/presentationml/2006/main" showMasterSp="0" type="title" preserve="1">
+<p:sldLayout xmlns:a="http://schemas.openxmlformats.org/drawingml/2006/main" xmlns:r="http://schemas.openxmlformats.org/officeDocument/2006/relationships" xmlns:mc="http://schemas.openxmlformats.org/markup-compatibility/2006" xmlns:mv="urn:schemas-microsoft-com:mac:vml" xmlns:p="http://schemas.openxmlformats.org/presentationml/2006/main" mc:Ignorable="mv" mc:PreserveAttributes="mv:*" showMasterSp="0" type="title" preserve="1">
   <p:cSld name="Title Slide">
     <p:bg>
       <p:bgRef idx="1001">
@@ -5776,7 +5730,7 @@
             <a:fld id="{39C41B7C-DC17-4ECC-A2D3-90661E3E8418}" type="datetimeFigureOut">
               <a:rPr lang="en-US" smtClean="0"/>
               <a:pPr/>
-              <a:t>10/7/2011</a:t>
+              <a:t>10/12/11</a:t>
             </a:fld>
             <a:endParaRPr lang="en-US"/>
           </a:p>
@@ -6545,7 +6499,7 @@
 </file>
 
 <file path=ppt/slideLayouts/slideLayout23.xml><?xml version="1.0" encoding="utf-8"?>
-<p:sldLayout xmlns:a="http://schemas.openxmlformats.org/drawingml/2006/main" xmlns:r="http://schemas.openxmlformats.org/officeDocument/2006/relationships" xmlns:p="http://schemas.openxmlformats.org/presentationml/2006/main" type="obj" preserve="1">
+<p:sldLayout xmlns:a="http://schemas.openxmlformats.org/drawingml/2006/main" xmlns:r="http://schemas.openxmlformats.org/officeDocument/2006/relationships" xmlns:mc="http://schemas.openxmlformats.org/markup-compatibility/2006" xmlns:mv="urn:schemas-microsoft-com:mac:vml" xmlns:p="http://schemas.openxmlformats.org/presentationml/2006/main" mc:Ignorable="mv" mc:PreserveAttributes="mv:*" type="obj" preserve="1">
   <p:cSld name="Title and Content">
     <p:spTree>
       <p:nvGrpSpPr>
@@ -6659,7 +6613,7 @@
             <a:fld id="{39C41B7C-DC17-4ECC-A2D3-90661E3E8418}" type="datetimeFigureOut">
               <a:rPr lang="en-US" smtClean="0"/>
               <a:pPr/>
-              <a:t>10/7/2011</a:t>
+              <a:t>10/12/11</a:t>
             </a:fld>
             <a:endParaRPr lang="en-US"/>
           </a:p>
@@ -6724,7 +6678,7 @@
 </file>
 
 <file path=ppt/slideLayouts/slideLayout24.xml><?xml version="1.0" encoding="utf-8"?>
-<p:sldLayout xmlns:a="http://schemas.openxmlformats.org/drawingml/2006/main" xmlns:r="http://schemas.openxmlformats.org/officeDocument/2006/relationships" xmlns:p="http://schemas.openxmlformats.org/presentationml/2006/main" showMasterSp="0" type="secHead" preserve="1">
+<p:sldLayout xmlns:a="http://schemas.openxmlformats.org/drawingml/2006/main" xmlns:r="http://schemas.openxmlformats.org/officeDocument/2006/relationships" xmlns:mc="http://schemas.openxmlformats.org/markup-compatibility/2006" xmlns:mv="urn:schemas-microsoft-com:mac:vml" xmlns:p="http://schemas.openxmlformats.org/presentationml/2006/main" mc:Ignorable="mv" mc:PreserveAttributes="mv:*" showMasterSp="0" type="secHead" preserve="1">
   <p:cSld name="Section Header">
     <p:bg>
       <p:bgRef idx="1001">
@@ -6878,7 +6832,7 @@
             <a:fld id="{39C41B7C-DC17-4ECC-A2D3-90661E3E8418}" type="datetimeFigureOut">
               <a:rPr lang="en-US" smtClean="0"/>
               <a:pPr/>
-              <a:t>10/7/2011</a:t>
+              <a:t>10/12/11</a:t>
             </a:fld>
             <a:endParaRPr lang="en-US"/>
           </a:p>
@@ -7644,7 +7598,7 @@
 </file>
 
 <file path=ppt/slideLayouts/slideLayout25.xml><?xml version="1.0" encoding="utf-8"?>
-<p:sldLayout xmlns:a="http://schemas.openxmlformats.org/drawingml/2006/main" xmlns:r="http://schemas.openxmlformats.org/officeDocument/2006/relationships" xmlns:p="http://schemas.openxmlformats.org/presentationml/2006/main" type="twoObj" preserve="1">
+<p:sldLayout xmlns:a="http://schemas.openxmlformats.org/drawingml/2006/main" xmlns:r="http://schemas.openxmlformats.org/officeDocument/2006/relationships" xmlns:mc="http://schemas.openxmlformats.org/markup-compatibility/2006" xmlns:mv="urn:schemas-microsoft-com:mac:vml" xmlns:p="http://schemas.openxmlformats.org/presentationml/2006/main" mc:Ignorable="mv" mc:PreserveAttributes="mv:*" type="twoObj" preserve="1">
   <p:cSld name="Two Content">
     <p:spTree>
       <p:nvGrpSpPr>
@@ -7701,7 +7655,7 @@
             <a:fld id="{39C41B7C-DC17-4ECC-A2D3-90661E3E8418}" type="datetimeFigureOut">
               <a:rPr lang="en-US" smtClean="0"/>
               <a:pPr/>
-              <a:t>10/7/2011</a:t>
+              <a:t>10/12/11</a:t>
             </a:fld>
             <a:endParaRPr lang="en-US"/>
           </a:p>
@@ -7880,7 +7834,7 @@
 </file>
 
 <file path=ppt/slideLayouts/slideLayout26.xml><?xml version="1.0" encoding="utf-8"?>
-<p:sldLayout xmlns:a="http://schemas.openxmlformats.org/drawingml/2006/main" xmlns:r="http://schemas.openxmlformats.org/officeDocument/2006/relationships" xmlns:p="http://schemas.openxmlformats.org/presentationml/2006/main" type="twoTxTwoObj" preserve="1">
+<p:sldLayout xmlns:a="http://schemas.openxmlformats.org/drawingml/2006/main" xmlns:r="http://schemas.openxmlformats.org/officeDocument/2006/relationships" xmlns:mc="http://schemas.openxmlformats.org/markup-compatibility/2006" xmlns:mv="urn:schemas-microsoft-com:mac:vml" xmlns:p="http://schemas.openxmlformats.org/presentationml/2006/main" mc:Ignorable="mv" mc:PreserveAttributes="mv:*" type="twoTxTwoObj" preserve="1">
   <p:cSld name="Comparison">
     <p:spTree>
       <p:nvGrpSpPr>
@@ -7946,7 +7900,7 @@
             <a:fld id="{39C41B7C-DC17-4ECC-A2D3-90661E3E8418}" type="datetimeFigureOut">
               <a:rPr lang="en-US" smtClean="0"/>
               <a:pPr/>
-              <a:t>10/7/2011</a:t>
+              <a:t>10/12/11</a:t>
             </a:fld>
             <a:endParaRPr lang="en-US"/>
           </a:p>
@@ -8221,7 +8175,7 @@
 </file>
 
 <file path=ppt/slideLayouts/slideLayout27.xml><?xml version="1.0" encoding="utf-8"?>
-<p:sldLayout xmlns:a="http://schemas.openxmlformats.org/drawingml/2006/main" xmlns:r="http://schemas.openxmlformats.org/officeDocument/2006/relationships" xmlns:p="http://schemas.openxmlformats.org/presentationml/2006/main" type="titleOnly" preserve="1">
+<p:sldLayout xmlns:a="http://schemas.openxmlformats.org/drawingml/2006/main" xmlns:r="http://schemas.openxmlformats.org/officeDocument/2006/relationships" xmlns:mc="http://schemas.openxmlformats.org/markup-compatibility/2006" xmlns:mv="urn:schemas-microsoft-com:mac:vml" xmlns:p="http://schemas.openxmlformats.org/presentationml/2006/main" mc:Ignorable="mv" mc:PreserveAttributes="mv:*" type="titleOnly" preserve="1">
   <p:cSld name="Title Only">
     <p:spTree>
       <p:nvGrpSpPr>
@@ -8278,7 +8232,7 @@
             <a:fld id="{39C41B7C-DC17-4ECC-A2D3-90661E3E8418}" type="datetimeFigureOut">
               <a:rPr lang="en-US" smtClean="0"/>
               <a:pPr/>
-              <a:t>10/7/2011</a:t>
+              <a:t>10/12/11</a:t>
             </a:fld>
             <a:endParaRPr lang="en-US"/>
           </a:p>
@@ -8343,7 +8297,7 @@
 </file>
 
 <file path=ppt/slideLayouts/slideLayout28.xml><?xml version="1.0" encoding="utf-8"?>
-<p:sldLayout xmlns:a="http://schemas.openxmlformats.org/drawingml/2006/main" xmlns:r="http://schemas.openxmlformats.org/officeDocument/2006/relationships" xmlns:p="http://schemas.openxmlformats.org/presentationml/2006/main" type="blank" preserve="1">
+<p:sldLayout xmlns:a="http://schemas.openxmlformats.org/drawingml/2006/main" xmlns:r="http://schemas.openxmlformats.org/officeDocument/2006/relationships" xmlns:mc="http://schemas.openxmlformats.org/markup-compatibility/2006" xmlns:mv="urn:schemas-microsoft-com:mac:vml" xmlns:p="http://schemas.openxmlformats.org/presentationml/2006/main" mc:Ignorable="mv" mc:PreserveAttributes="mv:*" type="blank" preserve="1">
   <p:cSld name="Blank">
     <p:spTree>
       <p:nvGrpSpPr>
@@ -8377,7 +8331,7 @@
             <a:fld id="{39C41B7C-DC17-4ECC-A2D3-90661E3E8418}" type="datetimeFigureOut">
               <a:rPr lang="en-US" smtClean="0"/>
               <a:pPr/>
-              <a:t>10/7/2011</a:t>
+              <a:t>10/12/11</a:t>
             </a:fld>
             <a:endParaRPr lang="en-US"/>
           </a:p>
@@ -8442,7 +8396,7 @@
 </file>
 
 <file path=ppt/slideLayouts/slideLayout29.xml><?xml version="1.0" encoding="utf-8"?>
-<p:sldLayout xmlns:a="http://schemas.openxmlformats.org/drawingml/2006/main" xmlns:r="http://schemas.openxmlformats.org/officeDocument/2006/relationships" xmlns:p="http://schemas.openxmlformats.org/presentationml/2006/main" showMasterSp="0" type="objTx" preserve="1">
+<p:sldLayout xmlns:a="http://schemas.openxmlformats.org/drawingml/2006/main" xmlns:r="http://schemas.openxmlformats.org/officeDocument/2006/relationships" xmlns:mc="http://schemas.openxmlformats.org/markup-compatibility/2006" xmlns:mv="urn:schemas-microsoft-com:mac:vml" xmlns:p="http://schemas.openxmlformats.org/presentationml/2006/main" mc:Ignorable="mv" mc:PreserveAttributes="mv:*" showMasterSp="0" type="objTx" preserve="1">
   <p:cSld name="Content with Caption">
     <p:bg>
       <p:bgRef idx="1001">
@@ -8903,7 +8857,7 @@
             <a:fld id="{39C41B7C-DC17-4ECC-A2D3-90661E3E8418}" type="datetimeFigureOut">
               <a:rPr lang="en-US" smtClean="0"/>
               <a:pPr/>
-              <a:t>10/7/2011</a:t>
+              <a:t>10/12/11</a:t>
             </a:fld>
             <a:endParaRPr lang="en-US"/>
           </a:p>
@@ -8968,7 +8922,7 @@
 </file>
 
 <file path=ppt/slideLayouts/slideLayout3.xml><?xml version="1.0" encoding="utf-8"?>
-<p:sldLayout xmlns:a="http://schemas.openxmlformats.org/drawingml/2006/main" xmlns:r="http://schemas.openxmlformats.org/officeDocument/2006/relationships" xmlns:p="http://schemas.openxmlformats.org/presentationml/2006/main" preserve="1">
+<p:sldLayout xmlns:a="http://schemas.openxmlformats.org/drawingml/2006/main" xmlns:r="http://schemas.openxmlformats.org/officeDocument/2006/relationships" xmlns:mc="http://schemas.openxmlformats.org/markup-compatibility/2006" xmlns:mv="urn:schemas-microsoft-com:mac:vml" xmlns:p="http://schemas.openxmlformats.org/presentationml/2006/main" mc:Ignorable="mv" mc:PreserveAttributes="mv:*" preserve="1">
   <p:cSld name="Section Header">
     <p:spTree>
       <p:nvGrpSpPr>
@@ -8997,14 +8951,12 @@
         <p:spPr/>
         <p:txBody>
           <a:bodyPr rtlCol="0"/>
-          <a:lstStyle>
-            <a:extLst/>
-          </a:lstStyle>
+          <a:lstStyle/>
           <a:p>
             <a:fld id="{FC4E1F84-22AE-408B-8AEE-B5F39E910140}" type="datetimeFigureOut">
               <a:rPr lang="en-US" smtClean="0"/>
               <a:pPr/>
-              <a:t>10/7/2011</a:t>
+              <a:t>10/12/11</a:t>
             </a:fld>
             <a:endParaRPr lang="en-US"/>
           </a:p>
@@ -9023,9 +8975,7 @@
         <p:spPr/>
         <p:txBody>
           <a:bodyPr rtlCol="0"/>
-          <a:lstStyle>
-            <a:extLst/>
-          </a:lstStyle>
+          <a:lstStyle/>
           <a:p>
             <a:endParaRPr lang="en-US"/>
           </a:p>
@@ -9044,9 +8994,7 @@
         <p:spPr/>
         <p:txBody>
           <a:bodyPr rtlCol="0"/>
-          <a:lstStyle>
-            <a:extLst/>
-          </a:lstStyle>
+          <a:lstStyle/>
           <a:p>
             <a:fld id="{700068D3-86B4-4F8E-B6AD-2596F9145F76}" type="slidenum">
               <a:rPr lang="en-US" smtClean="0"/>
@@ -9116,7 +9064,6 @@
                 <a:cs typeface="+mj-cs"/>
               </a:defRPr>
             </a:lvl1pPr>
-            <a:extLst/>
           </a:lstStyle>
           <a:p>
             <a:r>
@@ -9143,7 +9090,7 @@
 </file>
 
 <file path=ppt/slideLayouts/slideLayout30.xml><?xml version="1.0" encoding="utf-8"?>
-<p:sldLayout xmlns:a="http://schemas.openxmlformats.org/drawingml/2006/main" xmlns:r="http://schemas.openxmlformats.org/officeDocument/2006/relationships" xmlns:p="http://schemas.openxmlformats.org/presentationml/2006/main" showMasterSp="0" type="picTx" preserve="1">
+<p:sldLayout xmlns:a="http://schemas.openxmlformats.org/drawingml/2006/main" xmlns:r="http://schemas.openxmlformats.org/officeDocument/2006/relationships" xmlns:mc="http://schemas.openxmlformats.org/markup-compatibility/2006" xmlns:mv="urn:schemas-microsoft-com:mac:vml" xmlns:p="http://schemas.openxmlformats.org/presentationml/2006/main" mc:Ignorable="mv" mc:PreserveAttributes="mv:*" showMasterSp="0" type="picTx" preserve="1">
   <p:cSld name="Picture with Caption">
     <p:spTree>
       <p:nvGrpSpPr>
@@ -9598,7 +9545,7 @@
             <a:fld id="{39C41B7C-DC17-4ECC-A2D3-90661E3E8418}" type="datetimeFigureOut">
               <a:rPr lang="en-US" smtClean="0"/>
               <a:pPr/>
-              <a:t>10/7/2011</a:t>
+              <a:t>10/12/11</a:t>
             </a:fld>
             <a:endParaRPr lang="en-US"/>
           </a:p>
@@ -9663,7 +9610,7 @@
 </file>
 
 <file path=ppt/slideLayouts/slideLayout31.xml><?xml version="1.0" encoding="utf-8"?>
-<p:sldLayout xmlns:a="http://schemas.openxmlformats.org/drawingml/2006/main" xmlns:r="http://schemas.openxmlformats.org/officeDocument/2006/relationships" xmlns:p="http://schemas.openxmlformats.org/presentationml/2006/main" type="vertTx" preserve="1">
+<p:sldLayout xmlns:a="http://schemas.openxmlformats.org/drawingml/2006/main" xmlns:r="http://schemas.openxmlformats.org/officeDocument/2006/relationships" xmlns:mc="http://schemas.openxmlformats.org/markup-compatibility/2006" xmlns:mv="urn:schemas-microsoft-com:mac:vml" xmlns:p="http://schemas.openxmlformats.org/presentationml/2006/main" mc:Ignorable="mv" mc:PreserveAttributes="mv:*" type="vertTx" preserve="1">
   <p:cSld name="Title and Vertical Text">
     <p:spTree>
       <p:nvGrpSpPr>
@@ -9772,7 +9719,7 @@
             <a:fld id="{39C41B7C-DC17-4ECC-A2D3-90661E3E8418}" type="datetimeFigureOut">
               <a:rPr lang="en-US" smtClean="0"/>
               <a:pPr/>
-              <a:t>10/7/2011</a:t>
+              <a:t>10/12/11</a:t>
             </a:fld>
             <a:endParaRPr lang="en-US"/>
           </a:p>
@@ -9837,7 +9784,7 @@
 </file>
 
 <file path=ppt/slideLayouts/slideLayout32.xml><?xml version="1.0" encoding="utf-8"?>
-<p:sldLayout xmlns:a="http://schemas.openxmlformats.org/drawingml/2006/main" xmlns:r="http://schemas.openxmlformats.org/officeDocument/2006/relationships" xmlns:p="http://schemas.openxmlformats.org/presentationml/2006/main" type="vertTitleAndTx" preserve="1">
+<p:sldLayout xmlns:a="http://schemas.openxmlformats.org/drawingml/2006/main" xmlns:r="http://schemas.openxmlformats.org/officeDocument/2006/relationships" xmlns:mc="http://schemas.openxmlformats.org/markup-compatibility/2006" xmlns:mv="urn:schemas-microsoft-com:mac:vml" xmlns:p="http://schemas.openxmlformats.org/presentationml/2006/main" mc:Ignorable="mv" mc:PreserveAttributes="mv:*" type="vertTitleAndTx" preserve="1">
   <p:cSld name="Vertical Title and Text">
     <p:spTree>
       <p:nvGrpSpPr>
@@ -9956,7 +9903,7 @@
             <a:fld id="{39C41B7C-DC17-4ECC-A2D3-90661E3E8418}" type="datetimeFigureOut">
               <a:rPr lang="en-US" smtClean="0"/>
               <a:pPr/>
-              <a:t>10/7/2011</a:t>
+              <a:t>10/12/11</a:t>
             </a:fld>
             <a:endParaRPr lang="en-US"/>
           </a:p>
@@ -10021,7 +9968,7 @@
 </file>
 
 <file path=ppt/slideLayouts/slideLayout33.xml><?xml version="1.0" encoding="utf-8"?>
-<p:sldLayout xmlns:a="http://schemas.openxmlformats.org/drawingml/2006/main" xmlns:r="http://schemas.openxmlformats.org/officeDocument/2006/relationships" xmlns:p="http://schemas.openxmlformats.org/presentationml/2006/main" showMasterSp="0" type="title" preserve="1">
+<p:sldLayout xmlns:a="http://schemas.openxmlformats.org/drawingml/2006/main" xmlns:r="http://schemas.openxmlformats.org/officeDocument/2006/relationships" xmlns:mc="http://schemas.openxmlformats.org/markup-compatibility/2006" xmlns:mv="urn:schemas-microsoft-com:mac:vml" xmlns:p="http://schemas.openxmlformats.org/presentationml/2006/main" mc:Ignorable="mv" mc:PreserveAttributes="mv:*" showMasterSp="0" type="title" preserve="1">
   <p:cSld name="Title Slide">
     <p:bg>
       <p:bgRef idx="1001">
@@ -10163,7 +10110,7 @@
             <a:fld id="{39C41B7C-DC17-4ECC-A2D3-90661E3E8418}" type="datetimeFigureOut">
               <a:rPr lang="en-US" smtClean="0"/>
               <a:pPr/>
-              <a:t>10/7/2011</a:t>
+              <a:t>10/12/11</a:t>
             </a:fld>
             <a:endParaRPr lang="en-US"/>
           </a:p>
@@ -10932,7 +10879,7 @@
 </file>
 
 <file path=ppt/slideLayouts/slideLayout34.xml><?xml version="1.0" encoding="utf-8"?>
-<p:sldLayout xmlns:a="http://schemas.openxmlformats.org/drawingml/2006/main" xmlns:r="http://schemas.openxmlformats.org/officeDocument/2006/relationships" xmlns:p="http://schemas.openxmlformats.org/presentationml/2006/main" type="obj" preserve="1">
+<p:sldLayout xmlns:a="http://schemas.openxmlformats.org/drawingml/2006/main" xmlns:r="http://schemas.openxmlformats.org/officeDocument/2006/relationships" xmlns:mc="http://schemas.openxmlformats.org/markup-compatibility/2006" xmlns:mv="urn:schemas-microsoft-com:mac:vml" xmlns:p="http://schemas.openxmlformats.org/presentationml/2006/main" mc:Ignorable="mv" mc:PreserveAttributes="mv:*" type="obj" preserve="1">
   <p:cSld name="Title and Content">
     <p:spTree>
       <p:nvGrpSpPr>
@@ -11046,7 +10993,7 @@
             <a:fld id="{39C41B7C-DC17-4ECC-A2D3-90661E3E8418}" type="datetimeFigureOut">
               <a:rPr lang="en-US" smtClean="0"/>
               <a:pPr/>
-              <a:t>10/7/2011</a:t>
+              <a:t>10/12/11</a:t>
             </a:fld>
             <a:endParaRPr lang="en-US"/>
           </a:p>
@@ -11111,7 +11058,7 @@
 </file>
 
 <file path=ppt/slideLayouts/slideLayout35.xml><?xml version="1.0" encoding="utf-8"?>
-<p:sldLayout xmlns:a="http://schemas.openxmlformats.org/drawingml/2006/main" xmlns:r="http://schemas.openxmlformats.org/officeDocument/2006/relationships" xmlns:p="http://schemas.openxmlformats.org/presentationml/2006/main" showMasterSp="0" type="secHead" preserve="1">
+<p:sldLayout xmlns:a="http://schemas.openxmlformats.org/drawingml/2006/main" xmlns:r="http://schemas.openxmlformats.org/officeDocument/2006/relationships" xmlns:mc="http://schemas.openxmlformats.org/markup-compatibility/2006" xmlns:mv="urn:schemas-microsoft-com:mac:vml" xmlns:p="http://schemas.openxmlformats.org/presentationml/2006/main" mc:Ignorable="mv" mc:PreserveAttributes="mv:*" showMasterSp="0" type="secHead" preserve="1">
   <p:cSld name="Section Header">
     <p:bg>
       <p:bgRef idx="1001">
@@ -11265,7 +11212,7 @@
             <a:fld id="{39C41B7C-DC17-4ECC-A2D3-90661E3E8418}" type="datetimeFigureOut">
               <a:rPr lang="en-US" smtClean="0"/>
               <a:pPr/>
-              <a:t>10/7/2011</a:t>
+              <a:t>10/12/11</a:t>
             </a:fld>
             <a:endParaRPr lang="en-US"/>
           </a:p>
@@ -12031,7 +11978,7 @@
 </file>
 
 <file path=ppt/slideLayouts/slideLayout36.xml><?xml version="1.0" encoding="utf-8"?>
-<p:sldLayout xmlns:a="http://schemas.openxmlformats.org/drawingml/2006/main" xmlns:r="http://schemas.openxmlformats.org/officeDocument/2006/relationships" xmlns:p="http://schemas.openxmlformats.org/presentationml/2006/main" type="twoObj" preserve="1">
+<p:sldLayout xmlns:a="http://schemas.openxmlformats.org/drawingml/2006/main" xmlns:r="http://schemas.openxmlformats.org/officeDocument/2006/relationships" xmlns:mc="http://schemas.openxmlformats.org/markup-compatibility/2006" xmlns:mv="urn:schemas-microsoft-com:mac:vml" xmlns:p="http://schemas.openxmlformats.org/presentationml/2006/main" mc:Ignorable="mv" mc:PreserveAttributes="mv:*" type="twoObj" preserve="1">
   <p:cSld name="Two Content">
     <p:spTree>
       <p:nvGrpSpPr>
@@ -12088,7 +12035,7 @@
             <a:fld id="{39C41B7C-DC17-4ECC-A2D3-90661E3E8418}" type="datetimeFigureOut">
               <a:rPr lang="en-US" smtClean="0"/>
               <a:pPr/>
-              <a:t>10/7/2011</a:t>
+              <a:t>10/12/11</a:t>
             </a:fld>
             <a:endParaRPr lang="en-US"/>
           </a:p>
@@ -12267,7 +12214,7 @@
 </file>
 
 <file path=ppt/slideLayouts/slideLayout37.xml><?xml version="1.0" encoding="utf-8"?>
-<p:sldLayout xmlns:a="http://schemas.openxmlformats.org/drawingml/2006/main" xmlns:r="http://schemas.openxmlformats.org/officeDocument/2006/relationships" xmlns:p="http://schemas.openxmlformats.org/presentationml/2006/main" type="twoTxTwoObj" preserve="1">
+<p:sldLayout xmlns:a="http://schemas.openxmlformats.org/drawingml/2006/main" xmlns:r="http://schemas.openxmlformats.org/officeDocument/2006/relationships" xmlns:mc="http://schemas.openxmlformats.org/markup-compatibility/2006" xmlns:mv="urn:schemas-microsoft-com:mac:vml" xmlns:p="http://schemas.openxmlformats.org/presentationml/2006/main" mc:Ignorable="mv" mc:PreserveAttributes="mv:*" type="twoTxTwoObj" preserve="1">
   <p:cSld name="Comparison">
     <p:spTree>
       <p:nvGrpSpPr>
@@ -12333,7 +12280,7 @@
             <a:fld id="{39C41B7C-DC17-4ECC-A2D3-90661E3E8418}" type="datetimeFigureOut">
               <a:rPr lang="en-US" smtClean="0"/>
               <a:pPr/>
-              <a:t>10/7/2011</a:t>
+              <a:t>10/12/11</a:t>
             </a:fld>
             <a:endParaRPr lang="en-US"/>
           </a:p>
@@ -12608,7 +12555,7 @@
 </file>
 
 <file path=ppt/slideLayouts/slideLayout38.xml><?xml version="1.0" encoding="utf-8"?>
-<p:sldLayout xmlns:a="http://schemas.openxmlformats.org/drawingml/2006/main" xmlns:r="http://schemas.openxmlformats.org/officeDocument/2006/relationships" xmlns:p="http://schemas.openxmlformats.org/presentationml/2006/main" type="titleOnly" preserve="1">
+<p:sldLayout xmlns:a="http://schemas.openxmlformats.org/drawingml/2006/main" xmlns:r="http://schemas.openxmlformats.org/officeDocument/2006/relationships" xmlns:mc="http://schemas.openxmlformats.org/markup-compatibility/2006" xmlns:mv="urn:schemas-microsoft-com:mac:vml" xmlns:p="http://schemas.openxmlformats.org/presentationml/2006/main" mc:Ignorable="mv" mc:PreserveAttributes="mv:*" type="titleOnly" preserve="1">
   <p:cSld name="Title Only">
     <p:spTree>
       <p:nvGrpSpPr>
@@ -12665,7 +12612,7 @@
             <a:fld id="{39C41B7C-DC17-4ECC-A2D3-90661E3E8418}" type="datetimeFigureOut">
               <a:rPr lang="en-US" smtClean="0"/>
               <a:pPr/>
-              <a:t>10/7/2011</a:t>
+              <a:t>10/12/11</a:t>
             </a:fld>
             <a:endParaRPr lang="en-US"/>
           </a:p>
@@ -12730,7 +12677,7 @@
 </file>
 
 <file path=ppt/slideLayouts/slideLayout39.xml><?xml version="1.0" encoding="utf-8"?>
-<p:sldLayout xmlns:a="http://schemas.openxmlformats.org/drawingml/2006/main" xmlns:r="http://schemas.openxmlformats.org/officeDocument/2006/relationships" xmlns:p="http://schemas.openxmlformats.org/presentationml/2006/main" type="blank" preserve="1">
+<p:sldLayout xmlns:a="http://schemas.openxmlformats.org/drawingml/2006/main" xmlns:r="http://schemas.openxmlformats.org/officeDocument/2006/relationships" xmlns:mc="http://schemas.openxmlformats.org/markup-compatibility/2006" xmlns:mv="urn:schemas-microsoft-com:mac:vml" xmlns:p="http://schemas.openxmlformats.org/presentationml/2006/main" mc:Ignorable="mv" mc:PreserveAttributes="mv:*" type="blank" preserve="1">
   <p:cSld name="Blank">
     <p:spTree>
       <p:nvGrpSpPr>
@@ -12764,7 +12711,7 @@
             <a:fld id="{39C41B7C-DC17-4ECC-A2D3-90661E3E8418}" type="datetimeFigureOut">
               <a:rPr lang="en-US" smtClean="0"/>
               <a:pPr/>
-              <a:t>10/7/2011</a:t>
+              <a:t>10/12/11</a:t>
             </a:fld>
             <a:endParaRPr lang="en-US"/>
           </a:p>
@@ -12829,7 +12776,7 @@
 </file>
 
 <file path=ppt/slideLayouts/slideLayout4.xml><?xml version="1.0" encoding="utf-8"?>
-<p:sldLayout xmlns:a="http://schemas.openxmlformats.org/drawingml/2006/main" xmlns:r="http://schemas.openxmlformats.org/officeDocument/2006/relationships" xmlns:p="http://schemas.openxmlformats.org/presentationml/2006/main" preserve="1">
+<p:sldLayout xmlns:a="http://schemas.openxmlformats.org/drawingml/2006/main" xmlns:r="http://schemas.openxmlformats.org/officeDocument/2006/relationships" xmlns:mc="http://schemas.openxmlformats.org/markup-compatibility/2006" xmlns:mv="urn:schemas-microsoft-com:mac:vml" xmlns:p="http://schemas.openxmlformats.org/presentationml/2006/main" mc:Ignorable="mv" mc:PreserveAttributes="mv:*" preserve="1">
   <p:cSld name="Simple Question &amp; Answer">
     <p:spTree>
       <p:nvGrpSpPr>
@@ -12862,13 +12809,12 @@
             <a:lvl1pPr algn="r">
               <a:defRPr/>
             </a:lvl1pPr>
-            <a:extLst/>
           </a:lstStyle>
           <a:p>
             <a:fld id="{FC4E1F84-22AE-408B-8AEE-B5F39E910140}" type="datetimeFigureOut">
               <a:rPr lang="en-US" smtClean="0"/>
               <a:pPr/>
-              <a:t>10/7/2011</a:t>
+              <a:t>10/12/11</a:t>
             </a:fld>
             <a:endParaRPr lang="en-US"/>
           </a:p>
@@ -12887,9 +12833,7 @@
         <p:spPr/>
         <p:txBody>
           <a:bodyPr vert="horz"/>
-          <a:lstStyle>
-            <a:extLst/>
-          </a:lstStyle>
+          <a:lstStyle/>
           <a:p>
             <a:endParaRPr lang="en-US"/>
           </a:p>
@@ -12908,9 +12852,7 @@
         <p:spPr/>
         <p:txBody>
           <a:bodyPr vert="horz"/>
-          <a:lstStyle>
-            <a:extLst/>
-          </a:lstStyle>
+          <a:lstStyle/>
           <a:p>
             <a:fld id="{700068D3-86B4-4F8E-B6AD-2596F9145F76}" type="slidenum">
               <a:rPr lang="en-US" smtClean="0"/>
@@ -12949,7 +12891,6 @@
                 </a:solidFill>
               </a:defRPr>
             </a:lvl1pPr>
-            <a:extLst/>
           </a:lstStyle>
           <a:p>
             <a:r>
@@ -13019,7 +12960,6 @@
                 <a:cs typeface="+mj-cs"/>
               </a:defRPr>
             </a:lvl1pPr>
-            <a:extLst/>
           </a:lstStyle>
           <a:p>
             <a:pPr lvl="0"/>
@@ -13315,7 +13255,7 @@
 </file>
 
 <file path=ppt/slideLayouts/slideLayout40.xml><?xml version="1.0" encoding="utf-8"?>
-<p:sldLayout xmlns:a="http://schemas.openxmlformats.org/drawingml/2006/main" xmlns:r="http://schemas.openxmlformats.org/officeDocument/2006/relationships" xmlns:p="http://schemas.openxmlformats.org/presentationml/2006/main" showMasterSp="0" type="objTx" preserve="1">
+<p:sldLayout xmlns:a="http://schemas.openxmlformats.org/drawingml/2006/main" xmlns:r="http://schemas.openxmlformats.org/officeDocument/2006/relationships" xmlns:mc="http://schemas.openxmlformats.org/markup-compatibility/2006" xmlns:mv="urn:schemas-microsoft-com:mac:vml" xmlns:p="http://schemas.openxmlformats.org/presentationml/2006/main" mc:Ignorable="mv" mc:PreserveAttributes="mv:*" showMasterSp="0" type="objTx" preserve="1">
   <p:cSld name="Content with Caption">
     <p:bg>
       <p:bgRef idx="1001">
@@ -13776,7 +13716,7 @@
             <a:fld id="{39C41B7C-DC17-4ECC-A2D3-90661E3E8418}" type="datetimeFigureOut">
               <a:rPr lang="en-US" smtClean="0"/>
               <a:pPr/>
-              <a:t>10/7/2011</a:t>
+              <a:t>10/12/11</a:t>
             </a:fld>
             <a:endParaRPr lang="en-US"/>
           </a:p>
@@ -13841,7 +13781,7 @@
 </file>
 
 <file path=ppt/slideLayouts/slideLayout41.xml><?xml version="1.0" encoding="utf-8"?>
-<p:sldLayout xmlns:a="http://schemas.openxmlformats.org/drawingml/2006/main" xmlns:r="http://schemas.openxmlformats.org/officeDocument/2006/relationships" xmlns:p="http://schemas.openxmlformats.org/presentationml/2006/main" showMasterSp="0" type="picTx" preserve="1">
+<p:sldLayout xmlns:a="http://schemas.openxmlformats.org/drawingml/2006/main" xmlns:r="http://schemas.openxmlformats.org/officeDocument/2006/relationships" xmlns:mc="http://schemas.openxmlformats.org/markup-compatibility/2006" xmlns:mv="urn:schemas-microsoft-com:mac:vml" xmlns:p="http://schemas.openxmlformats.org/presentationml/2006/main" mc:Ignorable="mv" mc:PreserveAttributes="mv:*" showMasterSp="0" type="picTx" preserve="1">
   <p:cSld name="Picture with Caption">
     <p:spTree>
       <p:nvGrpSpPr>
@@ -14296,7 +14236,7 @@
             <a:fld id="{39C41B7C-DC17-4ECC-A2D3-90661E3E8418}" type="datetimeFigureOut">
               <a:rPr lang="en-US" smtClean="0"/>
               <a:pPr/>
-              <a:t>10/7/2011</a:t>
+              <a:t>10/12/11</a:t>
             </a:fld>
             <a:endParaRPr lang="en-US"/>
           </a:p>
@@ -14361,7 +14301,7 @@
 </file>
 
 <file path=ppt/slideLayouts/slideLayout42.xml><?xml version="1.0" encoding="utf-8"?>
-<p:sldLayout xmlns:a="http://schemas.openxmlformats.org/drawingml/2006/main" xmlns:r="http://schemas.openxmlformats.org/officeDocument/2006/relationships" xmlns:p="http://schemas.openxmlformats.org/presentationml/2006/main" type="vertTx" preserve="1">
+<p:sldLayout xmlns:a="http://schemas.openxmlformats.org/drawingml/2006/main" xmlns:r="http://schemas.openxmlformats.org/officeDocument/2006/relationships" xmlns:mc="http://schemas.openxmlformats.org/markup-compatibility/2006" xmlns:mv="urn:schemas-microsoft-com:mac:vml" xmlns:p="http://schemas.openxmlformats.org/presentationml/2006/main" mc:Ignorable="mv" mc:PreserveAttributes="mv:*" type="vertTx" preserve="1">
   <p:cSld name="Title and Vertical Text">
     <p:spTree>
       <p:nvGrpSpPr>
@@ -14470,7 +14410,7 @@
             <a:fld id="{39C41B7C-DC17-4ECC-A2D3-90661E3E8418}" type="datetimeFigureOut">
               <a:rPr lang="en-US" smtClean="0"/>
               <a:pPr/>
-              <a:t>10/7/2011</a:t>
+              <a:t>10/12/11</a:t>
             </a:fld>
             <a:endParaRPr lang="en-US"/>
           </a:p>
@@ -14535,7 +14475,7 @@
 </file>
 
 <file path=ppt/slideLayouts/slideLayout43.xml><?xml version="1.0" encoding="utf-8"?>
-<p:sldLayout xmlns:a="http://schemas.openxmlformats.org/drawingml/2006/main" xmlns:r="http://schemas.openxmlformats.org/officeDocument/2006/relationships" xmlns:p="http://schemas.openxmlformats.org/presentationml/2006/main" type="vertTitleAndTx" preserve="1">
+<p:sldLayout xmlns:a="http://schemas.openxmlformats.org/drawingml/2006/main" xmlns:r="http://schemas.openxmlformats.org/officeDocument/2006/relationships" xmlns:mc="http://schemas.openxmlformats.org/markup-compatibility/2006" xmlns:mv="urn:schemas-microsoft-com:mac:vml" xmlns:p="http://schemas.openxmlformats.org/presentationml/2006/main" mc:Ignorable="mv" mc:PreserveAttributes="mv:*" type="vertTitleAndTx" preserve="1">
   <p:cSld name="Vertical Title and Text">
     <p:spTree>
       <p:nvGrpSpPr>
@@ -14654,7 +14594,7 @@
             <a:fld id="{39C41B7C-DC17-4ECC-A2D3-90661E3E8418}" type="datetimeFigureOut">
               <a:rPr lang="en-US" smtClean="0"/>
               <a:pPr/>
-              <a:t>10/7/2011</a:t>
+              <a:t>10/12/11</a:t>
             </a:fld>
             <a:endParaRPr lang="en-US"/>
           </a:p>
@@ -14719,7 +14659,7 @@
 </file>
 
 <file path=ppt/slideLayouts/slideLayout44.xml><?xml version="1.0" encoding="utf-8"?>
-<p:sldLayout xmlns:a="http://schemas.openxmlformats.org/drawingml/2006/main" xmlns:r="http://schemas.openxmlformats.org/officeDocument/2006/relationships" xmlns:p="http://schemas.openxmlformats.org/presentationml/2006/main" showMasterSp="0" type="title" preserve="1">
+<p:sldLayout xmlns:a="http://schemas.openxmlformats.org/drawingml/2006/main" xmlns:r="http://schemas.openxmlformats.org/officeDocument/2006/relationships" xmlns:mc="http://schemas.openxmlformats.org/markup-compatibility/2006" xmlns:mv="urn:schemas-microsoft-com:mac:vml" xmlns:p="http://schemas.openxmlformats.org/presentationml/2006/main" mc:Ignorable="mv" mc:PreserveAttributes="mv:*" showMasterSp="0" type="title" preserve="1">
   <p:cSld name="Title Slide">
     <p:bg>
       <p:bgRef idx="1001">
@@ -14861,7 +14801,7 @@
             <a:fld id="{39C41B7C-DC17-4ECC-A2D3-90661E3E8418}" type="datetimeFigureOut">
               <a:rPr lang="en-US" smtClean="0"/>
               <a:pPr/>
-              <a:t>10/7/2011</a:t>
+              <a:t>10/12/11</a:t>
             </a:fld>
             <a:endParaRPr lang="en-US"/>
           </a:p>
@@ -15630,7 +15570,7 @@
 </file>
 
 <file path=ppt/slideLayouts/slideLayout45.xml><?xml version="1.0" encoding="utf-8"?>
-<p:sldLayout xmlns:a="http://schemas.openxmlformats.org/drawingml/2006/main" xmlns:r="http://schemas.openxmlformats.org/officeDocument/2006/relationships" xmlns:p="http://schemas.openxmlformats.org/presentationml/2006/main" type="obj" preserve="1">
+<p:sldLayout xmlns:a="http://schemas.openxmlformats.org/drawingml/2006/main" xmlns:r="http://schemas.openxmlformats.org/officeDocument/2006/relationships" xmlns:mc="http://schemas.openxmlformats.org/markup-compatibility/2006" xmlns:mv="urn:schemas-microsoft-com:mac:vml" xmlns:p="http://schemas.openxmlformats.org/presentationml/2006/main" mc:Ignorable="mv" mc:PreserveAttributes="mv:*" type="obj" preserve="1">
   <p:cSld name="Title and Content">
     <p:spTree>
       <p:nvGrpSpPr>
@@ -15744,7 +15684,7 @@
             <a:fld id="{39C41B7C-DC17-4ECC-A2D3-90661E3E8418}" type="datetimeFigureOut">
               <a:rPr lang="en-US" smtClean="0"/>
               <a:pPr/>
-              <a:t>10/7/2011</a:t>
+              <a:t>10/12/11</a:t>
             </a:fld>
             <a:endParaRPr lang="en-US"/>
           </a:p>
@@ -15809,7 +15749,7 @@
 </file>
 
 <file path=ppt/slideLayouts/slideLayout46.xml><?xml version="1.0" encoding="utf-8"?>
-<p:sldLayout xmlns:a="http://schemas.openxmlformats.org/drawingml/2006/main" xmlns:r="http://schemas.openxmlformats.org/officeDocument/2006/relationships" xmlns:p="http://schemas.openxmlformats.org/presentationml/2006/main" showMasterSp="0" type="secHead" preserve="1">
+<p:sldLayout xmlns:a="http://schemas.openxmlformats.org/drawingml/2006/main" xmlns:r="http://schemas.openxmlformats.org/officeDocument/2006/relationships" xmlns:mc="http://schemas.openxmlformats.org/markup-compatibility/2006" xmlns:mv="urn:schemas-microsoft-com:mac:vml" xmlns:p="http://schemas.openxmlformats.org/presentationml/2006/main" mc:Ignorable="mv" mc:PreserveAttributes="mv:*" showMasterSp="0" type="secHead" preserve="1">
   <p:cSld name="Section Header">
     <p:bg>
       <p:bgRef idx="1001">
@@ -15963,7 +15903,7 @@
             <a:fld id="{39C41B7C-DC17-4ECC-A2D3-90661E3E8418}" type="datetimeFigureOut">
               <a:rPr lang="en-US" smtClean="0"/>
               <a:pPr/>
-              <a:t>10/7/2011</a:t>
+              <a:t>10/12/11</a:t>
             </a:fld>
             <a:endParaRPr lang="en-US"/>
           </a:p>
@@ -16729,7 +16669,7 @@
 </file>
 
 <file path=ppt/slideLayouts/slideLayout47.xml><?xml version="1.0" encoding="utf-8"?>
-<p:sldLayout xmlns:a="http://schemas.openxmlformats.org/drawingml/2006/main" xmlns:r="http://schemas.openxmlformats.org/officeDocument/2006/relationships" xmlns:p="http://schemas.openxmlformats.org/presentationml/2006/main" type="twoObj" preserve="1">
+<p:sldLayout xmlns:a="http://schemas.openxmlformats.org/drawingml/2006/main" xmlns:r="http://schemas.openxmlformats.org/officeDocument/2006/relationships" xmlns:mc="http://schemas.openxmlformats.org/markup-compatibility/2006" xmlns:mv="urn:schemas-microsoft-com:mac:vml" xmlns:p="http://schemas.openxmlformats.org/presentationml/2006/main" mc:Ignorable="mv" mc:PreserveAttributes="mv:*" type="twoObj" preserve="1">
   <p:cSld name="Two Content">
     <p:spTree>
       <p:nvGrpSpPr>
@@ -16786,7 +16726,7 @@
             <a:fld id="{39C41B7C-DC17-4ECC-A2D3-90661E3E8418}" type="datetimeFigureOut">
               <a:rPr lang="en-US" smtClean="0"/>
               <a:pPr/>
-              <a:t>10/7/2011</a:t>
+              <a:t>10/12/11</a:t>
             </a:fld>
             <a:endParaRPr lang="en-US"/>
           </a:p>
@@ -16965,7 +16905,7 @@
 </file>
 
 <file path=ppt/slideLayouts/slideLayout48.xml><?xml version="1.0" encoding="utf-8"?>
-<p:sldLayout xmlns:a="http://schemas.openxmlformats.org/drawingml/2006/main" xmlns:r="http://schemas.openxmlformats.org/officeDocument/2006/relationships" xmlns:p="http://schemas.openxmlformats.org/presentationml/2006/main" type="twoTxTwoObj" preserve="1">
+<p:sldLayout xmlns:a="http://schemas.openxmlformats.org/drawingml/2006/main" xmlns:r="http://schemas.openxmlformats.org/officeDocument/2006/relationships" xmlns:mc="http://schemas.openxmlformats.org/markup-compatibility/2006" xmlns:mv="urn:schemas-microsoft-com:mac:vml" xmlns:p="http://schemas.openxmlformats.org/presentationml/2006/main" mc:Ignorable="mv" mc:PreserveAttributes="mv:*" type="twoTxTwoObj" preserve="1">
   <p:cSld name="Comparison">
     <p:spTree>
       <p:nvGrpSpPr>
@@ -17031,7 +16971,7 @@
             <a:fld id="{39C41B7C-DC17-4ECC-A2D3-90661E3E8418}" type="datetimeFigureOut">
               <a:rPr lang="en-US" smtClean="0"/>
               <a:pPr/>
-              <a:t>10/7/2011</a:t>
+              <a:t>10/12/11</a:t>
             </a:fld>
             <a:endParaRPr lang="en-US"/>
           </a:p>
@@ -17306,7 +17246,7 @@
 </file>
 
 <file path=ppt/slideLayouts/slideLayout49.xml><?xml version="1.0" encoding="utf-8"?>
-<p:sldLayout xmlns:a="http://schemas.openxmlformats.org/drawingml/2006/main" xmlns:r="http://schemas.openxmlformats.org/officeDocument/2006/relationships" xmlns:p="http://schemas.openxmlformats.org/presentationml/2006/main" type="titleOnly" preserve="1">
+<p:sldLayout xmlns:a="http://schemas.openxmlformats.org/drawingml/2006/main" xmlns:r="http://schemas.openxmlformats.org/officeDocument/2006/relationships" xmlns:mc="http://schemas.openxmlformats.org/markup-compatibility/2006" xmlns:mv="urn:schemas-microsoft-com:mac:vml" xmlns:p="http://schemas.openxmlformats.org/presentationml/2006/main" mc:Ignorable="mv" mc:PreserveAttributes="mv:*" type="titleOnly" preserve="1">
   <p:cSld name="Title Only">
     <p:spTree>
       <p:nvGrpSpPr>
@@ -17363,7 +17303,7 @@
             <a:fld id="{39C41B7C-DC17-4ECC-A2D3-90661E3E8418}" type="datetimeFigureOut">
               <a:rPr lang="en-US" smtClean="0"/>
               <a:pPr/>
-              <a:t>10/7/2011</a:t>
+              <a:t>10/12/11</a:t>
             </a:fld>
             <a:endParaRPr lang="en-US"/>
           </a:p>
@@ -17428,7 +17368,7 @@
 </file>
 
 <file path=ppt/slideLayouts/slideLayout5.xml><?xml version="1.0" encoding="utf-8"?>
-<p:sldLayout xmlns:a="http://schemas.openxmlformats.org/drawingml/2006/main" xmlns:r="http://schemas.openxmlformats.org/officeDocument/2006/relationships" xmlns:p="http://schemas.openxmlformats.org/presentationml/2006/main" preserve="1">
+<p:sldLayout xmlns:a="http://schemas.openxmlformats.org/drawingml/2006/main" xmlns:r="http://schemas.openxmlformats.org/officeDocument/2006/relationships" xmlns:mc="http://schemas.openxmlformats.org/markup-compatibility/2006" xmlns:mv="urn:schemas-microsoft-com:mac:vml" xmlns:p="http://schemas.openxmlformats.org/presentationml/2006/main" mc:Ignorable="mv" mc:PreserveAttributes="mv:*" preserve="1">
   <p:cSld name="Detailed Question &amp; Answer">
     <p:spTree>
       <p:nvGrpSpPr>
@@ -17461,13 +17401,12 @@
             <a:lvl1pPr algn="r">
               <a:defRPr/>
             </a:lvl1pPr>
-            <a:extLst/>
           </a:lstStyle>
           <a:p>
             <a:fld id="{FC4E1F84-22AE-408B-8AEE-B5F39E910140}" type="datetimeFigureOut">
               <a:rPr lang="en-US" smtClean="0"/>
               <a:pPr/>
-              <a:t>10/7/2011</a:t>
+              <a:t>10/12/11</a:t>
             </a:fld>
             <a:endParaRPr lang="en-US"/>
           </a:p>
@@ -17486,9 +17425,7 @@
         <p:spPr/>
         <p:txBody>
           <a:bodyPr vert="horz"/>
-          <a:lstStyle>
-            <a:extLst/>
-          </a:lstStyle>
+          <a:lstStyle/>
           <a:p>
             <a:endParaRPr lang="en-US"/>
           </a:p>
@@ -17507,9 +17444,7 @@
         <p:spPr/>
         <p:txBody>
           <a:bodyPr vert="horz"/>
-          <a:lstStyle>
-            <a:extLst/>
-          </a:lstStyle>
+          <a:lstStyle/>
           <a:p>
             <a:fld id="{700068D3-86B4-4F8E-B6AD-2596F9145F76}" type="slidenum">
               <a:rPr lang="en-US" smtClean="0"/>
@@ -17548,7 +17483,6 @@
                 </a:solidFill>
               </a:defRPr>
             </a:lvl1pPr>
-            <a:extLst/>
           </a:lstStyle>
           <a:p>
             <a:r>
@@ -17618,7 +17552,6 @@
                 <a:cs typeface="+mj-cs"/>
               </a:defRPr>
             </a:lvl1pPr>
-            <a:extLst/>
           </a:lstStyle>
           <a:p>
             <a:pPr lvl="0"/>
@@ -17654,7 +17587,6 @@
               <a:buNone/>
               <a:defRPr i="1" baseline="0"/>
             </a:lvl1pPr>
-            <a:extLst/>
           </a:lstStyle>
           <a:p>
             <a:pPr lvl="0"/>
@@ -18045,7 +17977,7 @@
 </file>
 
 <file path=ppt/slideLayouts/slideLayout50.xml><?xml version="1.0" encoding="utf-8"?>
-<p:sldLayout xmlns:a="http://schemas.openxmlformats.org/drawingml/2006/main" xmlns:r="http://schemas.openxmlformats.org/officeDocument/2006/relationships" xmlns:p="http://schemas.openxmlformats.org/presentationml/2006/main" type="blank" preserve="1">
+<p:sldLayout xmlns:a="http://schemas.openxmlformats.org/drawingml/2006/main" xmlns:r="http://schemas.openxmlformats.org/officeDocument/2006/relationships" xmlns:mc="http://schemas.openxmlformats.org/markup-compatibility/2006" xmlns:mv="urn:schemas-microsoft-com:mac:vml" xmlns:p="http://schemas.openxmlformats.org/presentationml/2006/main" mc:Ignorable="mv" mc:PreserveAttributes="mv:*" type="blank" preserve="1">
   <p:cSld name="Blank">
     <p:spTree>
       <p:nvGrpSpPr>
@@ -18079,7 +18011,7 @@
             <a:fld id="{39C41B7C-DC17-4ECC-A2D3-90661E3E8418}" type="datetimeFigureOut">
               <a:rPr lang="en-US" smtClean="0"/>
               <a:pPr/>
-              <a:t>10/7/2011</a:t>
+              <a:t>10/12/11</a:t>
             </a:fld>
             <a:endParaRPr lang="en-US"/>
           </a:p>
@@ -18144,7 +18076,7 @@
 </file>
 
 <file path=ppt/slideLayouts/slideLayout51.xml><?xml version="1.0" encoding="utf-8"?>
-<p:sldLayout xmlns:a="http://schemas.openxmlformats.org/drawingml/2006/main" xmlns:r="http://schemas.openxmlformats.org/officeDocument/2006/relationships" xmlns:p="http://schemas.openxmlformats.org/presentationml/2006/main" showMasterSp="0" type="objTx" preserve="1">
+<p:sldLayout xmlns:a="http://schemas.openxmlformats.org/drawingml/2006/main" xmlns:r="http://schemas.openxmlformats.org/officeDocument/2006/relationships" xmlns:mc="http://schemas.openxmlformats.org/markup-compatibility/2006" xmlns:mv="urn:schemas-microsoft-com:mac:vml" xmlns:p="http://schemas.openxmlformats.org/presentationml/2006/main" mc:Ignorable="mv" mc:PreserveAttributes="mv:*" showMasterSp="0" type="objTx" preserve="1">
   <p:cSld name="Content with Caption">
     <p:bg>
       <p:bgRef idx="1001">
@@ -18605,7 +18537,7 @@
             <a:fld id="{39C41B7C-DC17-4ECC-A2D3-90661E3E8418}" type="datetimeFigureOut">
               <a:rPr lang="en-US" smtClean="0"/>
               <a:pPr/>
-              <a:t>10/7/2011</a:t>
+              <a:t>10/12/11</a:t>
             </a:fld>
             <a:endParaRPr lang="en-US"/>
           </a:p>
@@ -18670,7 +18602,7 @@
 </file>
 
 <file path=ppt/slideLayouts/slideLayout52.xml><?xml version="1.0" encoding="utf-8"?>
-<p:sldLayout xmlns:a="http://schemas.openxmlformats.org/drawingml/2006/main" xmlns:r="http://schemas.openxmlformats.org/officeDocument/2006/relationships" xmlns:p="http://schemas.openxmlformats.org/presentationml/2006/main" showMasterSp="0" type="picTx" preserve="1">
+<p:sldLayout xmlns:a="http://schemas.openxmlformats.org/drawingml/2006/main" xmlns:r="http://schemas.openxmlformats.org/officeDocument/2006/relationships" xmlns:mc="http://schemas.openxmlformats.org/markup-compatibility/2006" xmlns:mv="urn:schemas-microsoft-com:mac:vml" xmlns:p="http://schemas.openxmlformats.org/presentationml/2006/main" mc:Ignorable="mv" mc:PreserveAttributes="mv:*" showMasterSp="0" type="picTx" preserve="1">
   <p:cSld name="Picture with Caption">
     <p:spTree>
       <p:nvGrpSpPr>
@@ -19125,7 +19057,7 @@
             <a:fld id="{39C41B7C-DC17-4ECC-A2D3-90661E3E8418}" type="datetimeFigureOut">
               <a:rPr lang="en-US" smtClean="0"/>
               <a:pPr/>
-              <a:t>10/7/2011</a:t>
+              <a:t>10/12/11</a:t>
             </a:fld>
             <a:endParaRPr lang="en-US"/>
           </a:p>
@@ -19190,7 +19122,7 @@
 </file>
 
 <file path=ppt/slideLayouts/slideLayout53.xml><?xml version="1.0" encoding="utf-8"?>
-<p:sldLayout xmlns:a="http://schemas.openxmlformats.org/drawingml/2006/main" xmlns:r="http://schemas.openxmlformats.org/officeDocument/2006/relationships" xmlns:p="http://schemas.openxmlformats.org/presentationml/2006/main" type="vertTx" preserve="1">
+<p:sldLayout xmlns:a="http://schemas.openxmlformats.org/drawingml/2006/main" xmlns:r="http://schemas.openxmlformats.org/officeDocument/2006/relationships" xmlns:mc="http://schemas.openxmlformats.org/markup-compatibility/2006" xmlns:mv="urn:schemas-microsoft-com:mac:vml" xmlns:p="http://schemas.openxmlformats.org/presentationml/2006/main" mc:Ignorable="mv" mc:PreserveAttributes="mv:*" type="vertTx" preserve="1">
   <p:cSld name="Title and Vertical Text">
     <p:spTree>
       <p:nvGrpSpPr>
@@ -19299,7 +19231,7 @@
             <a:fld id="{39C41B7C-DC17-4ECC-A2D3-90661E3E8418}" type="datetimeFigureOut">
               <a:rPr lang="en-US" smtClean="0"/>
               <a:pPr/>
-              <a:t>10/7/2011</a:t>
+              <a:t>10/12/11</a:t>
             </a:fld>
             <a:endParaRPr lang="en-US"/>
           </a:p>
@@ -19364,7 +19296,7 @@
 </file>
 
 <file path=ppt/slideLayouts/slideLayout54.xml><?xml version="1.0" encoding="utf-8"?>
-<p:sldLayout xmlns:a="http://schemas.openxmlformats.org/drawingml/2006/main" xmlns:r="http://schemas.openxmlformats.org/officeDocument/2006/relationships" xmlns:p="http://schemas.openxmlformats.org/presentationml/2006/main" type="vertTitleAndTx" preserve="1">
+<p:sldLayout xmlns:a="http://schemas.openxmlformats.org/drawingml/2006/main" xmlns:r="http://schemas.openxmlformats.org/officeDocument/2006/relationships" xmlns:mc="http://schemas.openxmlformats.org/markup-compatibility/2006" xmlns:mv="urn:schemas-microsoft-com:mac:vml" xmlns:p="http://schemas.openxmlformats.org/presentationml/2006/main" mc:Ignorable="mv" mc:PreserveAttributes="mv:*" type="vertTitleAndTx" preserve="1">
   <p:cSld name="Vertical Title and Text">
     <p:spTree>
       <p:nvGrpSpPr>
@@ -19483,7 +19415,7 @@
             <a:fld id="{39C41B7C-DC17-4ECC-A2D3-90661E3E8418}" type="datetimeFigureOut">
               <a:rPr lang="en-US" smtClean="0"/>
               <a:pPr/>
-              <a:t>10/7/2011</a:t>
+              <a:t>10/12/11</a:t>
             </a:fld>
             <a:endParaRPr lang="en-US"/>
           </a:p>
@@ -19548,7 +19480,7 @@
 </file>
 
 <file path=ppt/slideLayouts/slideLayout55.xml><?xml version="1.0" encoding="utf-8"?>
-<p:sldLayout xmlns:a="http://schemas.openxmlformats.org/drawingml/2006/main" xmlns:r="http://schemas.openxmlformats.org/officeDocument/2006/relationships" xmlns:p="http://schemas.openxmlformats.org/presentationml/2006/main" showMasterSp="0" type="title" preserve="1">
+<p:sldLayout xmlns:a="http://schemas.openxmlformats.org/drawingml/2006/main" xmlns:r="http://schemas.openxmlformats.org/officeDocument/2006/relationships" xmlns:mc="http://schemas.openxmlformats.org/markup-compatibility/2006" xmlns:mv="urn:schemas-microsoft-com:mac:vml" xmlns:p="http://schemas.openxmlformats.org/presentationml/2006/main" mc:Ignorable="mv" mc:PreserveAttributes="mv:*" showMasterSp="0" type="title" preserve="1">
   <p:cSld name="Title Slide">
     <p:spTree>
       <p:nvGrpSpPr>
@@ -19627,9 +19559,7 @@
         </p:style>
         <p:txBody>
           <a:bodyPr anchor="ctr"/>
-          <a:lstStyle>
-            <a:extLst/>
-          </a:lstStyle>
+          <a:lstStyle/>
           <a:p>
             <a:pPr algn="ctr" eaLnBrk="1" latinLnBrk="0" hangingPunct="1"/>
             <a:endParaRPr kumimoji="0" lang="en-US"/>
@@ -19678,7 +19608,6 @@
                 </a:effectLst>
               </a:defRPr>
             </a:lvl1pPr>
-            <a:extLst/>
           </a:lstStyle>
           <a:p>
             <a:r>
@@ -19740,7 +19669,6 @@
             <a:lvl9pPr marL="3657600" indent="0" algn="ctr">
               <a:buNone/>
             </a:lvl9pPr>
-            <a:extLst/>
           </a:lstStyle>
           <a:p>
             <a:r>
@@ -19842,9 +19770,7 @@
           </p:spPr>
           <p:txBody>
             <a:bodyPr vert="horz" wrap="square" lIns="91440" tIns="45720" rIns="91440" bIns="45720" anchor="t" compatLnSpc="1"/>
-            <a:lstStyle>
-              <a:extLst/>
-            </a:lstStyle>
+            <a:lstStyle/>
             <a:p>
               <a:endParaRPr kumimoji="0" lang="en-US"/>
             </a:p>
@@ -19924,9 +19850,7 @@
           </p:spPr>
           <p:txBody>
             <a:bodyPr vert="horz" wrap="square" lIns="91440" tIns="45720" rIns="91440" bIns="45720" anchor="t" compatLnSpc="1"/>
-            <a:lstStyle>
-              <a:extLst/>
-            </a:lstStyle>
+            <a:lstStyle/>
             <a:p>
               <a:endParaRPr kumimoji="0" lang="en-US"/>
             </a:p>
@@ -20083,9 +20007,7 @@
           </p:style>
           <p:txBody>
             <a:bodyPr vert="horz" wrap="square" lIns="91440" tIns="45720" rIns="91440" bIns="45720" anchor="ctr" compatLnSpc="1"/>
-            <a:lstStyle>
-              <a:extLst/>
-            </a:lstStyle>
+            <a:lstStyle/>
             <a:p>
               <a:pPr algn="ctr" eaLnBrk="1" latinLnBrk="0" hangingPunct="1"/>
               <a:endParaRPr kumimoji="0" lang="en-US"/>
@@ -20167,13 +20089,12 @@
                 </a:solidFill>
               </a:defRPr>
             </a:lvl1pPr>
-            <a:extLst/>
           </a:lstStyle>
           <a:p>
             <a:fld id="{FC4E1F84-22AE-408B-8AEE-B5F39E910140}" type="datetimeFigureOut">
               <a:rPr lang="en-US" smtClean="0"/>
               <a:pPr/>
-              <a:t>10/7/2011</a:t>
+              <a:t>10/12/11</a:t>
             </a:fld>
             <a:endParaRPr lang="en-US"/>
           </a:p>
@@ -20202,7 +20123,6 @@
                 </a:solidFill>
               </a:defRPr>
             </a:lvl1pPr>
-            <a:extLst/>
           </a:lstStyle>
           <a:p>
             <a:endParaRPr lang="en-US"/>
@@ -20230,7 +20150,6 @@
                 </a:solidFill>
               </a:defRPr>
             </a:lvl1pPr>
-            <a:extLst/>
           </a:lstStyle>
           <a:p>
             <a:fld id="{700068D3-86B4-4F8E-B6AD-2596F9145F76}" type="slidenum">
@@ -20258,7 +20177,7 @@
 </file>
 
 <file path=ppt/slideLayouts/slideLayout56.xml><?xml version="1.0" encoding="utf-8"?>
-<p:sldLayout xmlns:a="http://schemas.openxmlformats.org/drawingml/2006/main" xmlns:r="http://schemas.openxmlformats.org/officeDocument/2006/relationships" xmlns:p="http://schemas.openxmlformats.org/presentationml/2006/main" type="obj" preserve="1">
+<p:sldLayout xmlns:a="http://schemas.openxmlformats.org/drawingml/2006/main" xmlns:r="http://schemas.openxmlformats.org/officeDocument/2006/relationships" xmlns:mc="http://schemas.openxmlformats.org/markup-compatibility/2006" xmlns:mv="urn:schemas-microsoft-com:mac:vml" xmlns:p="http://schemas.openxmlformats.org/presentationml/2006/main" mc:Ignorable="mv" mc:PreserveAttributes="mv:*" type="obj" preserve="1">
   <p:cSld name="Title and Content">
     <p:spTree>
       <p:nvGrpSpPr>
@@ -20287,9 +20206,7 @@
         <p:spPr/>
         <p:txBody>
           <a:bodyPr/>
-          <a:lstStyle>
-            <a:extLst/>
-          </a:lstStyle>
+          <a:lstStyle/>
           <a:p>
             <a:pPr lvl="0" eaLnBrk="1" latinLnBrk="0" hangingPunct="1"/>
             <a:r>
@@ -20341,14 +20258,12 @@
         <p:spPr/>
         <p:txBody>
           <a:bodyPr/>
-          <a:lstStyle>
-            <a:extLst/>
-          </a:lstStyle>
+          <a:lstStyle/>
           <a:p>
             <a:fld id="{FC4E1F84-22AE-408B-8AEE-B5F39E910140}" type="datetimeFigureOut">
               <a:rPr lang="en-US" smtClean="0"/>
               <a:pPr/>
-              <a:t>10/7/2011</a:t>
+              <a:t>10/12/11</a:t>
             </a:fld>
             <a:endParaRPr lang="en-US"/>
           </a:p>
@@ -20367,9 +20282,7 @@
         <p:spPr/>
         <p:txBody>
           <a:bodyPr/>
-          <a:lstStyle>
-            <a:extLst/>
-          </a:lstStyle>
+          <a:lstStyle/>
           <a:p>
             <a:endParaRPr lang="en-US"/>
           </a:p>
@@ -20388,9 +20301,7 @@
         <p:spPr/>
         <p:txBody>
           <a:bodyPr/>
-          <a:lstStyle>
-            <a:extLst/>
-          </a:lstStyle>
+          <a:lstStyle/>
           <a:p>
             <a:fld id="{700068D3-86B4-4F8E-B6AD-2596F9145F76}" type="slidenum">
               <a:rPr lang="en-US" smtClean="0"/>
@@ -20414,9 +20325,7 @@
         <p:spPr/>
         <p:txBody>
           <a:bodyPr rtlCol="0"/>
-          <a:lstStyle>
-            <a:extLst/>
-          </a:lstStyle>
+          <a:lstStyle/>
           <a:p>
             <a:r>
               <a:rPr kumimoji="0" lang="en-US" smtClean="0"/>
@@ -20442,7 +20351,7 @@
 </file>
 
 <file path=ppt/slideLayouts/slideLayout57.xml><?xml version="1.0" encoding="utf-8"?>
-<p:sldLayout xmlns:a="http://schemas.openxmlformats.org/drawingml/2006/main" xmlns:r="http://schemas.openxmlformats.org/officeDocument/2006/relationships" xmlns:p="http://schemas.openxmlformats.org/presentationml/2006/main" type="secHead" preserve="1">
+<p:sldLayout xmlns:a="http://schemas.openxmlformats.org/drawingml/2006/main" xmlns:r="http://schemas.openxmlformats.org/officeDocument/2006/relationships" xmlns:mc="http://schemas.openxmlformats.org/markup-compatibility/2006" xmlns:mv="urn:schemas-microsoft-com:mac:vml" xmlns:p="http://schemas.openxmlformats.org/presentationml/2006/main" mc:Ignorable="mv" mc:PreserveAttributes="mv:*" type="secHead" preserve="1">
   <p:cSld name="Section Header">
     <p:bg>
       <p:bgRef idx="1002">
@@ -20503,7 +20412,6 @@
                 </a:effectLst>
               </a:defRPr>
             </a:lvl1pPr>
-            <a:extLst/>
           </a:lstStyle>
           <a:p>
             <a:r>
@@ -20581,7 +20489,6 @@
                 </a:solidFill>
               </a:defRPr>
             </a:lvl5pPr>
-            <a:extLst/>
           </a:lstStyle>
           <a:p>
             <a:pPr lvl="0" eaLnBrk="1" latinLnBrk="0" hangingPunct="1"/>
@@ -20605,14 +20512,12 @@
         <p:spPr/>
         <p:txBody>
           <a:bodyPr/>
-          <a:lstStyle>
-            <a:extLst/>
-          </a:lstStyle>
+          <a:lstStyle/>
           <a:p>
             <a:fld id="{FC4E1F84-22AE-408B-8AEE-B5F39E910140}" type="datetimeFigureOut">
               <a:rPr lang="en-US" smtClean="0"/>
               <a:pPr/>
-              <a:t>10/7/2011</a:t>
+              <a:t>10/12/11</a:t>
             </a:fld>
             <a:endParaRPr lang="en-US"/>
           </a:p>
@@ -20631,9 +20536,7 @@
         <p:spPr/>
         <p:txBody>
           <a:bodyPr/>
-          <a:lstStyle>
-            <a:extLst/>
-          </a:lstStyle>
+          <a:lstStyle/>
           <a:p>
             <a:endParaRPr lang="en-US"/>
           </a:p>
@@ -20652,9 +20555,7 @@
         <p:spPr/>
         <p:txBody>
           <a:bodyPr/>
-          <a:lstStyle>
-            <a:extLst/>
-          </a:lstStyle>
+          <a:lstStyle/>
           <a:p>
             <a:fld id="{700068D3-86B4-4F8E-B6AD-2596F9145F76}" type="slidenum">
               <a:rPr lang="en-US" smtClean="0"/>
@@ -20736,9 +20637,7 @@
         </p:style>
         <p:txBody>
           <a:bodyPr anchor="ctr"/>
-          <a:lstStyle>
-            <a:extLst/>
-          </a:lstStyle>
+          <a:lstStyle/>
           <a:p>
             <a:pPr algn="l" eaLnBrk="1" latinLnBrk="0" hangingPunct="1"/>
             <a:endParaRPr kumimoji="0" lang="en-US"/>
@@ -20816,9 +20715,7 @@
         </p:style>
         <p:txBody>
           <a:bodyPr anchor="ctr"/>
-          <a:lstStyle>
-            <a:extLst/>
-          </a:lstStyle>
+          <a:lstStyle/>
           <a:p>
             <a:pPr algn="l" eaLnBrk="1" latinLnBrk="0" hangingPunct="1"/>
             <a:endParaRPr kumimoji="0" lang="en-US"/>
@@ -20841,7 +20738,7 @@
 </file>
 
 <file path=ppt/slideLayouts/slideLayout58.xml><?xml version="1.0" encoding="utf-8"?>
-<p:sldLayout xmlns:a="http://schemas.openxmlformats.org/drawingml/2006/main" xmlns:r="http://schemas.openxmlformats.org/officeDocument/2006/relationships" xmlns:p="http://schemas.openxmlformats.org/presentationml/2006/main" type="twoObj" preserve="1">
+<p:sldLayout xmlns:a="http://schemas.openxmlformats.org/drawingml/2006/main" xmlns:r="http://schemas.openxmlformats.org/officeDocument/2006/relationships" xmlns:mc="http://schemas.openxmlformats.org/markup-compatibility/2006" xmlns:mv="urn:schemas-microsoft-com:mac:vml" xmlns:p="http://schemas.openxmlformats.org/presentationml/2006/main" mc:Ignorable="mv" mc:PreserveAttributes="mv:*" type="twoObj" preserve="1">
   <p:cSld name="Two Content">
     <p:bg>
       <p:bgRef idx="1002">
@@ -20896,7 +20793,6 @@
             <a:lvl5pPr>
               <a:defRPr sz="1800"/>
             </a:lvl5pPr>
-            <a:extLst/>
           </a:lstStyle>
           <a:p>
             <a:pPr lvl="0" eaLnBrk="1" latinLnBrk="0" hangingPunct="1"/>
@@ -20970,7 +20866,6 @@
             <a:lvl5pPr>
               <a:defRPr sz="1800"/>
             </a:lvl5pPr>
-            <a:extLst/>
           </a:lstStyle>
           <a:p>
             <a:pPr lvl="0" eaLnBrk="1" latinLnBrk="0" hangingPunct="1"/>
@@ -21023,14 +20918,12 @@
         <p:spPr/>
         <p:txBody>
           <a:bodyPr/>
-          <a:lstStyle>
-            <a:extLst/>
-          </a:lstStyle>
+          <a:lstStyle/>
           <a:p>
             <a:fld id="{FC4E1F84-22AE-408B-8AEE-B5F39E910140}" type="datetimeFigureOut">
               <a:rPr lang="en-US" smtClean="0"/>
               <a:pPr/>
-              <a:t>10/7/2011</a:t>
+              <a:t>10/12/11</a:t>
             </a:fld>
             <a:endParaRPr lang="en-US"/>
           </a:p>
@@ -21049,9 +20942,7 @@
         <p:spPr/>
         <p:txBody>
           <a:bodyPr/>
-          <a:lstStyle>
-            <a:extLst/>
-          </a:lstStyle>
+          <a:lstStyle/>
           <a:p>
             <a:endParaRPr lang="en-US"/>
           </a:p>
@@ -21070,9 +20961,7 @@
         <p:spPr/>
         <p:txBody>
           <a:bodyPr/>
-          <a:lstStyle>
-            <a:extLst/>
-          </a:lstStyle>
+          <a:lstStyle/>
           <a:p>
             <a:fld id="{700068D3-86B4-4F8E-B6AD-2596F9145F76}" type="slidenum">
               <a:rPr lang="en-US" smtClean="0"/>
@@ -21096,9 +20985,7 @@
         <p:spPr/>
         <p:txBody>
           <a:bodyPr rtlCol="0"/>
-          <a:lstStyle>
-            <a:extLst/>
-          </a:lstStyle>
+          <a:lstStyle/>
           <a:p>
             <a:r>
               <a:rPr kumimoji="0" lang="en-US" smtClean="0"/>
@@ -21124,7 +21011,7 @@
 </file>
 
 <file path=ppt/slideLayouts/slideLayout59.xml><?xml version="1.0" encoding="utf-8"?>
-<p:sldLayout xmlns:a="http://schemas.openxmlformats.org/drawingml/2006/main" xmlns:r="http://schemas.openxmlformats.org/officeDocument/2006/relationships" xmlns:p="http://schemas.openxmlformats.org/presentationml/2006/main" showMasterSp="0" type="twoTxTwoObj" preserve="1">
+<p:sldLayout xmlns:a="http://schemas.openxmlformats.org/drawingml/2006/main" xmlns:r="http://schemas.openxmlformats.org/officeDocument/2006/relationships" xmlns:mc="http://schemas.openxmlformats.org/markup-compatibility/2006" xmlns:mv="urn:schemas-microsoft-com:mac:vml" xmlns:p="http://schemas.openxmlformats.org/presentationml/2006/main" mc:Ignorable="mv" mc:PreserveAttributes="mv:*" showMasterSp="0" type="twoTxTwoObj" preserve="1">
   <p:cSld name="Comparison">
     <p:bg>
       <p:bgRef idx="1003">
@@ -21167,7 +21054,6 @@
             <a:lvl1pPr>
               <a:defRPr/>
             </a:lvl1pPr>
-            <a:extLst/>
           </a:lstStyle>
           <a:p>
             <a:r>
@@ -21230,7 +21116,6 @@
               <a:buNone/>
               <a:defRPr sz="1600" b="1"/>
             </a:lvl5pPr>
-            <a:extLst/>
           </a:lstStyle>
           <a:p>
             <a:pPr lvl="0" eaLnBrk="1" latinLnBrk="0" hangingPunct="1"/>
@@ -21293,7 +21178,6 @@
               <a:buNone/>
               <a:defRPr sz="1600" b="1"/>
             </a:lvl5pPr>
-            <a:extLst/>
           </a:lstStyle>
           <a:p>
             <a:pPr lvl="0" eaLnBrk="1" latinLnBrk="0" hangingPunct="1"/>
@@ -21343,7 +21227,6 @@
             <a:lvl5pPr>
               <a:defRPr sz="1600"/>
             </a:lvl5pPr>
-            <a:extLst/>
           </a:lstStyle>
           <a:p>
             <a:pPr lvl="0" eaLnBrk="1" latinLnBrk="0" hangingPunct="1"/>
@@ -21425,7 +21308,6 @@
             <a:lvl5pPr>
               <a:defRPr sz="1600"/>
             </a:lvl5pPr>
-            <a:extLst/>
           </a:lstStyle>
           <a:p>
             <a:pPr lvl="0" eaLnBrk="1" latinLnBrk="0" hangingPunct="1"/>
@@ -21478,14 +21360,12 @@
         <p:spPr/>
         <p:txBody>
           <a:bodyPr/>
-          <a:lstStyle>
-            <a:extLst/>
-          </a:lstStyle>
+          <a:lstStyle/>
           <a:p>
             <a:fld id="{FC4E1F84-22AE-408B-8AEE-B5F39E910140}" type="datetimeFigureOut">
               <a:rPr lang="en-US" smtClean="0"/>
               <a:pPr/>
-              <a:t>10/7/2011</a:t>
+              <a:t>10/12/11</a:t>
             </a:fld>
             <a:endParaRPr lang="en-US"/>
           </a:p>
@@ -21504,9 +21384,7 @@
         <p:spPr/>
         <p:txBody>
           <a:bodyPr/>
-          <a:lstStyle>
-            <a:extLst/>
-          </a:lstStyle>
+          <a:lstStyle/>
           <a:p>
             <a:endParaRPr lang="en-US"/>
           </a:p>
@@ -21525,9 +21403,7 @@
         <p:spPr/>
         <p:txBody>
           <a:bodyPr/>
-          <a:lstStyle>
-            <a:extLst/>
-          </a:lstStyle>
+          <a:lstStyle/>
           <a:p>
             <a:fld id="{700068D3-86B4-4F8E-B6AD-2596F9145F76}" type="slidenum">
               <a:rPr lang="en-US" smtClean="0"/>
@@ -21554,7 +21430,7 @@
 </file>
 
 <file path=ppt/slideLayouts/slideLayout6.xml><?xml version="1.0" encoding="utf-8"?>
-<p:sldLayout xmlns:a="http://schemas.openxmlformats.org/drawingml/2006/main" xmlns:r="http://schemas.openxmlformats.org/officeDocument/2006/relationships" xmlns:p="http://schemas.openxmlformats.org/presentationml/2006/main" preserve="1">
+<p:sldLayout xmlns:a="http://schemas.openxmlformats.org/drawingml/2006/main" xmlns:r="http://schemas.openxmlformats.org/officeDocument/2006/relationships" xmlns:mc="http://schemas.openxmlformats.org/markup-compatibility/2006" xmlns:mv="urn:schemas-microsoft-com:mac:vml" xmlns:p="http://schemas.openxmlformats.org/presentationml/2006/main" mc:Ignorable="mv" mc:PreserveAttributes="mv:*" preserve="1">
   <p:cSld name="True or False Question (Answer: True)">
     <p:spTree>
       <p:nvGrpSpPr>
@@ -21587,13 +21463,12 @@
             <a:lvl1pPr algn="r">
               <a:defRPr/>
             </a:lvl1pPr>
-            <a:extLst/>
           </a:lstStyle>
           <a:p>
             <a:fld id="{FC4E1F84-22AE-408B-8AEE-B5F39E910140}" type="datetimeFigureOut">
               <a:rPr lang="en-US" smtClean="0"/>
               <a:pPr/>
-              <a:t>10/7/2011</a:t>
+              <a:t>10/12/11</a:t>
             </a:fld>
             <a:endParaRPr lang="en-US"/>
           </a:p>
@@ -21612,9 +21487,7 @@
         <p:spPr/>
         <p:txBody>
           <a:bodyPr vert="horz"/>
-          <a:lstStyle>
-            <a:extLst/>
-          </a:lstStyle>
+          <a:lstStyle/>
           <a:p>
             <a:endParaRPr lang="en-US"/>
           </a:p>
@@ -21633,9 +21506,7 @@
         <p:spPr/>
         <p:txBody>
           <a:bodyPr vert="horz"/>
-          <a:lstStyle>
-            <a:extLst/>
-          </a:lstStyle>
+          <a:lstStyle/>
           <a:p>
             <a:fld id="{700068D3-86B4-4F8E-B6AD-2596F9145F76}" type="slidenum">
               <a:rPr lang="en-US" smtClean="0"/>
@@ -21674,7 +21545,6 @@
                 </a:solidFill>
               </a:defRPr>
             </a:lvl1pPr>
-            <a:extLst/>
           </a:lstStyle>
           <a:p>
             <a:r>
@@ -21705,9 +21575,7 @@
           <a:bodyPr wrap="square">
             <a:noAutofit/>
           </a:bodyPr>
-          <a:lstStyle>
-            <a:extLst/>
-          </a:lstStyle>
+          <a:lstStyle/>
           <a:p>
             <a:pPr marL="0" indent="0" algn="ctr" rtl="0" latinLnBrk="0">
               <a:spcBef>
@@ -21774,9 +21642,7 @@
           <a:bodyPr wrap="square">
             <a:spAutoFit/>
           </a:bodyPr>
-          <a:lstStyle>
-            <a:extLst/>
-          </a:lstStyle>
+          <a:lstStyle/>
           <a:p>
             <a:pPr indent="0" algn="ctr" latinLnBrk="0">
               <a:spcBef>
@@ -21967,7 +21833,7 @@
 </file>
 
 <file path=ppt/slideLayouts/slideLayout60.xml><?xml version="1.0" encoding="utf-8"?>
-<p:sldLayout xmlns:a="http://schemas.openxmlformats.org/drawingml/2006/main" xmlns:r="http://schemas.openxmlformats.org/officeDocument/2006/relationships" xmlns:p="http://schemas.openxmlformats.org/presentationml/2006/main" type="titleOnly" preserve="1">
+<p:sldLayout xmlns:a="http://schemas.openxmlformats.org/drawingml/2006/main" xmlns:r="http://schemas.openxmlformats.org/officeDocument/2006/relationships" xmlns:mc="http://schemas.openxmlformats.org/markup-compatibility/2006" xmlns:mv="urn:schemas-microsoft-com:mac:vml" xmlns:p="http://schemas.openxmlformats.org/presentationml/2006/main" mc:Ignorable="mv" mc:PreserveAttributes="mv:*" type="titleOnly" preserve="1">
   <p:cSld name="Title Only">
     <p:bg>
       <p:bgRef idx="1002">
@@ -22001,14 +21867,12 @@
         <p:spPr/>
         <p:txBody>
           <a:bodyPr/>
-          <a:lstStyle>
-            <a:extLst/>
-          </a:lstStyle>
+          <a:lstStyle/>
           <a:p>
             <a:fld id="{FC4E1F84-22AE-408B-8AEE-B5F39E910140}" type="datetimeFigureOut">
               <a:rPr lang="en-US" smtClean="0"/>
               <a:pPr/>
-              <a:t>10/7/2011</a:t>
+              <a:t>10/12/11</a:t>
             </a:fld>
             <a:endParaRPr lang="en-US"/>
           </a:p>
@@ -22027,9 +21891,7 @@
         <p:spPr/>
         <p:txBody>
           <a:bodyPr/>
-          <a:lstStyle>
-            <a:extLst/>
-          </a:lstStyle>
+          <a:lstStyle/>
           <a:p>
             <a:endParaRPr lang="en-US"/>
           </a:p>
@@ -22048,9 +21910,7 @@
         <p:spPr/>
         <p:txBody>
           <a:bodyPr/>
-          <a:lstStyle>
-            <a:extLst/>
-          </a:lstStyle>
+          <a:lstStyle/>
           <a:p>
             <a:fld id="{700068D3-86B4-4F8E-B6AD-2596F9145F76}" type="slidenum">
               <a:rPr lang="en-US" smtClean="0"/>
@@ -22074,9 +21934,7 @@
         <p:spPr/>
         <p:txBody>
           <a:bodyPr rtlCol="0"/>
-          <a:lstStyle>
-            <a:extLst/>
-          </a:lstStyle>
+          <a:lstStyle/>
           <a:p>
             <a:r>
               <a:rPr kumimoji="0" lang="en-US" smtClean="0"/>
@@ -22102,7 +21960,7 @@
 </file>
 
 <file path=ppt/slideLayouts/slideLayout61.xml><?xml version="1.0" encoding="utf-8"?>
-<p:sldLayout xmlns:a="http://schemas.openxmlformats.org/drawingml/2006/main" xmlns:r="http://schemas.openxmlformats.org/officeDocument/2006/relationships" xmlns:p="http://schemas.openxmlformats.org/presentationml/2006/main" type="blank" preserve="1">
+<p:sldLayout xmlns:a="http://schemas.openxmlformats.org/drawingml/2006/main" xmlns:r="http://schemas.openxmlformats.org/officeDocument/2006/relationships" xmlns:mc="http://schemas.openxmlformats.org/markup-compatibility/2006" xmlns:mv="urn:schemas-microsoft-com:mac:vml" xmlns:p="http://schemas.openxmlformats.org/presentationml/2006/main" mc:Ignorable="mv" mc:PreserveAttributes="mv:*" type="blank" preserve="1">
   <p:cSld name="Blank">
     <p:spTree>
       <p:nvGrpSpPr>
@@ -22131,14 +21989,12 @@
         <p:spPr/>
         <p:txBody>
           <a:bodyPr/>
-          <a:lstStyle>
-            <a:extLst/>
-          </a:lstStyle>
+          <a:lstStyle/>
           <a:p>
             <a:fld id="{FC4E1F84-22AE-408B-8AEE-B5F39E910140}" type="datetimeFigureOut">
               <a:rPr lang="en-US" smtClean="0"/>
               <a:pPr/>
-              <a:t>10/7/2011</a:t>
+              <a:t>10/12/11</a:t>
             </a:fld>
             <a:endParaRPr lang="en-US"/>
           </a:p>
@@ -22157,9 +22013,7 @@
         <p:spPr/>
         <p:txBody>
           <a:bodyPr/>
-          <a:lstStyle>
-            <a:extLst/>
-          </a:lstStyle>
+          <a:lstStyle/>
           <a:p>
             <a:endParaRPr lang="en-US"/>
           </a:p>
@@ -22178,9 +22032,7 @@
         <p:spPr/>
         <p:txBody>
           <a:bodyPr/>
-          <a:lstStyle>
-            <a:extLst/>
-          </a:lstStyle>
+          <a:lstStyle/>
           <a:p>
             <a:fld id="{700068D3-86B4-4F8E-B6AD-2596F9145F76}" type="slidenum">
               <a:rPr lang="en-US" smtClean="0"/>
@@ -22207,7 +22059,7 @@
 </file>
 
 <file path=ppt/slideLayouts/slideLayout62.xml><?xml version="1.0" encoding="utf-8"?>
-<p:sldLayout xmlns:a="http://schemas.openxmlformats.org/drawingml/2006/main" xmlns:r="http://schemas.openxmlformats.org/officeDocument/2006/relationships" xmlns:p="http://schemas.openxmlformats.org/presentationml/2006/main" showMasterSp="0" type="objTx" preserve="1">
+<p:sldLayout xmlns:a="http://schemas.openxmlformats.org/drawingml/2006/main" xmlns:r="http://schemas.openxmlformats.org/officeDocument/2006/relationships" xmlns:mc="http://schemas.openxmlformats.org/markup-compatibility/2006" xmlns:mv="urn:schemas-microsoft-com:mac:vml" xmlns:p="http://schemas.openxmlformats.org/presentationml/2006/main" mc:Ignorable="mv" mc:PreserveAttributes="mv:*" showMasterSp="0" type="objTx" preserve="1">
   <p:cSld name="Content with Caption">
     <p:bg>
       <p:bgRef idx="1003">
@@ -22261,7 +22113,6 @@
                 <a:effectLst/>
               </a:defRPr>
             </a:lvl1pPr>
-            <a:extLst/>
           </a:lstStyle>
           <a:p>
             <a:r>
@@ -22311,7 +22162,6 @@
               <a:buNone/>
               <a:defRPr sz="900"/>
             </a:lvl5pPr>
-            <a:extLst/>
           </a:lstStyle>
           <a:p>
             <a:pPr lvl="0" eaLnBrk="1" latinLnBrk="0" hangingPunct="1"/>
@@ -22356,7 +22206,6 @@
             <a:lvl5pPr>
               <a:defRPr sz="2000"/>
             </a:lvl5pPr>
-            <a:extLst/>
           </a:lstStyle>
           <a:p>
             <a:pPr lvl="0" eaLnBrk="1" latinLnBrk="0" hangingPunct="1"/>
@@ -22414,14 +22263,12 @@
         </p:spPr>
         <p:txBody>
           <a:bodyPr/>
-          <a:lstStyle>
-            <a:extLst/>
-          </a:lstStyle>
+          <a:lstStyle/>
           <a:p>
             <a:fld id="{FC4E1F84-22AE-408B-8AEE-B5F39E910140}" type="datetimeFigureOut">
               <a:rPr lang="en-US" smtClean="0"/>
               <a:pPr/>
-              <a:t>10/7/2011</a:t>
+              <a:t>10/12/11</a:t>
             </a:fld>
             <a:endParaRPr lang="en-US"/>
           </a:p>
@@ -22440,9 +22287,7 @@
         <p:spPr/>
         <p:txBody>
           <a:bodyPr/>
-          <a:lstStyle>
-            <a:extLst/>
-          </a:lstStyle>
+          <a:lstStyle/>
           <a:p>
             <a:endParaRPr lang="en-US"/>
           </a:p>
@@ -22461,9 +22306,7 @@
         <p:spPr/>
         <p:txBody>
           <a:bodyPr/>
-          <a:lstStyle>
-            <a:extLst/>
-          </a:lstStyle>
+          <a:lstStyle/>
           <a:p>
             <a:fld id="{700068D3-86B4-4F8E-B6AD-2596F9145F76}" type="slidenum">
               <a:rPr lang="en-US" smtClean="0"/>
@@ -22490,7 +22333,7 @@
 </file>
 
 <file path=ppt/slideLayouts/slideLayout63.xml><?xml version="1.0" encoding="utf-8"?>
-<p:sldLayout xmlns:a="http://schemas.openxmlformats.org/drawingml/2006/main" xmlns:r="http://schemas.openxmlformats.org/officeDocument/2006/relationships" xmlns:p="http://schemas.openxmlformats.org/presentationml/2006/main" showMasterSp="0" type="picTx" preserve="1">
+<p:sldLayout xmlns:a="http://schemas.openxmlformats.org/drawingml/2006/main" xmlns:r="http://schemas.openxmlformats.org/officeDocument/2006/relationships" xmlns:mc="http://schemas.openxmlformats.org/markup-compatibility/2006" xmlns:mv="urn:schemas-microsoft-com:mac:vml" xmlns:p="http://schemas.openxmlformats.org/presentationml/2006/main" mc:Ignorable="mv" mc:PreserveAttributes="mv:*" showMasterSp="0" type="picTx" preserve="1">
   <p:cSld name="Picture with Caption">
     <p:bg>
       <p:bgRef idx="1002">
@@ -22547,7 +22390,6 @@
             <a:lvl5pPr>
               <a:defRPr sz="900"/>
             </a:lvl5pPr>
-            <a:extLst/>
           </a:lstStyle>
           <a:p>
             <a:pPr lvl="0" eaLnBrk="1" latinLnBrk="0" hangingPunct="1"/>
@@ -22597,7 +22439,6 @@
               <a:buNone/>
               <a:defRPr sz="3200"/>
             </a:lvl1pPr>
-            <a:extLst/>
           </a:lstStyle>
           <a:p>
             <a:r>
@@ -22629,13 +22470,12 @@
                 </a:solidFill>
               </a:defRPr>
             </a:lvl1pPr>
-            <a:extLst/>
           </a:lstStyle>
           <a:p>
             <a:fld id="{FC4E1F84-22AE-408B-8AEE-B5F39E910140}" type="datetimeFigureOut">
               <a:rPr lang="en-US" smtClean="0"/>
               <a:pPr/>
-              <a:t>10/7/2011</a:t>
+              <a:t>10/12/11</a:t>
             </a:fld>
             <a:endParaRPr lang="en-US"/>
           </a:p>
@@ -22667,7 +22507,6 @@
                 </a:solidFill>
               </a:defRPr>
             </a:lvl1pPr>
-            <a:extLst/>
           </a:lstStyle>
           <a:p>
             <a:endParaRPr lang="en-US"/>
@@ -22695,7 +22534,6 @@
                 </a:solidFill>
               </a:defRPr>
             </a:lvl1pPr>
-            <a:extLst/>
           </a:lstStyle>
           <a:p>
             <a:fld id="{700068D3-86B4-4F8E-B6AD-2596F9145F76}" type="slidenum">
@@ -22744,7 +22582,6 @@
                 </a:effectLst>
               </a:defRPr>
             </a:lvl1pPr>
-            <a:extLst/>
           </a:lstStyle>
           <a:p>
             <a:r>
@@ -22831,9 +22668,7 @@
         </p:spPr>
         <p:txBody>
           <a:bodyPr vert="horz" wrap="square" lIns="91440" tIns="45720" rIns="91440" bIns="45720" anchor="t" compatLnSpc="1"/>
-          <a:lstStyle>
-            <a:extLst/>
-          </a:lstStyle>
+          <a:lstStyle/>
           <a:p>
             <a:endParaRPr kumimoji="0" lang="en-US"/>
           </a:p>
@@ -22913,9 +22748,7 @@
         </p:spPr>
         <p:txBody>
           <a:bodyPr vert="horz" wrap="square" lIns="91440" tIns="45720" rIns="91440" bIns="45720" anchor="t" compatLnSpc="1"/>
-          <a:lstStyle>
-            <a:extLst/>
-          </a:lstStyle>
+          <a:lstStyle/>
           <a:p>
             <a:endParaRPr kumimoji="0" lang="en-US"/>
           </a:p>
@@ -23023,9 +22856,7 @@
         </p:style>
         <p:txBody>
           <a:bodyPr vert="horz" wrap="square" lIns="91440" tIns="45720" rIns="91440" bIns="45720" anchor="ctr" compatLnSpc="1"/>
-          <a:lstStyle>
-            <a:extLst/>
-          </a:lstStyle>
+          <a:lstStyle/>
           <a:p>
             <a:pPr algn="ctr" eaLnBrk="1" latinLnBrk="0" hangingPunct="1"/>
             <a:endParaRPr kumimoji="0" lang="en-US"/>
@@ -23156,9 +22987,7 @@
         </p:style>
         <p:txBody>
           <a:bodyPr anchor="ctr"/>
-          <a:lstStyle>
-            <a:extLst/>
-          </a:lstStyle>
+          <a:lstStyle/>
           <a:p>
             <a:pPr algn="l" eaLnBrk="1" latinLnBrk="0" hangingPunct="1"/>
             <a:endParaRPr kumimoji="0" lang="en-US"/>
@@ -23236,9 +23065,7 @@
         </p:style>
         <p:txBody>
           <a:bodyPr anchor="ctr"/>
-          <a:lstStyle>
-            <a:extLst/>
-          </a:lstStyle>
+          <a:lstStyle/>
           <a:p>
             <a:pPr algn="l" eaLnBrk="1" latinLnBrk="0" hangingPunct="1"/>
             <a:endParaRPr kumimoji="0" lang="en-US"/>
@@ -23261,7 +23088,7 @@
 </file>
 
 <file path=ppt/slideLayouts/slideLayout64.xml><?xml version="1.0" encoding="utf-8"?>
-<p:sldLayout xmlns:a="http://schemas.openxmlformats.org/drawingml/2006/main" xmlns:r="http://schemas.openxmlformats.org/officeDocument/2006/relationships" xmlns:p="http://schemas.openxmlformats.org/presentationml/2006/main" type="vertTx" preserve="1">
+<p:sldLayout xmlns:a="http://schemas.openxmlformats.org/drawingml/2006/main" xmlns:r="http://schemas.openxmlformats.org/officeDocument/2006/relationships" xmlns:mc="http://schemas.openxmlformats.org/markup-compatibility/2006" xmlns:mv="urn:schemas-microsoft-com:mac:vml" xmlns:p="http://schemas.openxmlformats.org/presentationml/2006/main" mc:Ignorable="mv" mc:PreserveAttributes="mv:*" type="vertTx" preserve="1">
   <p:cSld name="Title and Vertical Text">
     <p:spTree>
       <p:nvGrpSpPr>
@@ -23290,9 +23117,7 @@
         <p:spPr/>
         <p:txBody>
           <a:bodyPr/>
-          <a:lstStyle>
-            <a:extLst/>
-          </a:lstStyle>
+          <a:lstStyle/>
           <a:p>
             <a:r>
               <a:rPr kumimoji="0" lang="en-US" smtClean="0"/>
@@ -23320,9 +23145,7 @@
         </p:spPr>
         <p:txBody>
           <a:bodyPr vert="eaVert"/>
-          <a:lstStyle>
-            <a:extLst/>
-          </a:lstStyle>
+          <a:lstStyle/>
           <a:p>
             <a:pPr lvl="0" eaLnBrk="1" latinLnBrk="0" hangingPunct="1"/>
             <a:r>
@@ -23374,14 +23197,12 @@
         <p:spPr/>
         <p:txBody>
           <a:bodyPr/>
-          <a:lstStyle>
-            <a:extLst/>
-          </a:lstStyle>
+          <a:lstStyle/>
           <a:p>
             <a:fld id="{FC4E1F84-22AE-408B-8AEE-B5F39E910140}" type="datetimeFigureOut">
               <a:rPr lang="en-US" smtClean="0"/>
               <a:pPr/>
-              <a:t>10/7/2011</a:t>
+              <a:t>10/12/11</a:t>
             </a:fld>
             <a:endParaRPr lang="en-US"/>
           </a:p>
@@ -23400,9 +23221,7 @@
         <p:spPr/>
         <p:txBody>
           <a:bodyPr/>
-          <a:lstStyle>
-            <a:extLst/>
-          </a:lstStyle>
+          <a:lstStyle/>
           <a:p>
             <a:endParaRPr lang="en-US"/>
           </a:p>
@@ -23421,9 +23240,7 @@
         <p:spPr/>
         <p:txBody>
           <a:bodyPr/>
-          <a:lstStyle>
-            <a:extLst/>
-          </a:lstStyle>
+          <a:lstStyle/>
           <a:p>
             <a:fld id="{700068D3-86B4-4F8E-B6AD-2596F9145F76}" type="slidenum">
               <a:rPr lang="en-US" smtClean="0"/>
@@ -23450,7 +23267,7 @@
 </file>
 
 <file path=ppt/slideLayouts/slideLayout65.xml><?xml version="1.0" encoding="utf-8"?>
-<p:sldLayout xmlns:a="http://schemas.openxmlformats.org/drawingml/2006/main" xmlns:r="http://schemas.openxmlformats.org/officeDocument/2006/relationships" xmlns:p="http://schemas.openxmlformats.org/presentationml/2006/main" type="vertTitleAndTx" preserve="1">
+<p:sldLayout xmlns:a="http://schemas.openxmlformats.org/drawingml/2006/main" xmlns:r="http://schemas.openxmlformats.org/officeDocument/2006/relationships" xmlns:mc="http://schemas.openxmlformats.org/markup-compatibility/2006" xmlns:mv="urn:schemas-microsoft-com:mac:vml" xmlns:p="http://schemas.openxmlformats.org/presentationml/2006/main" mc:Ignorable="mv" mc:PreserveAttributes="mv:*" type="vertTitleAndTx" preserve="1">
   <p:cSld name="Vertical Title and Text">
     <p:spTree>
       <p:nvGrpSpPr>
@@ -23484,9 +23301,7 @@
         </p:spPr>
         <p:txBody>
           <a:bodyPr vert="eaVert"/>
-          <a:lstStyle>
-            <a:extLst/>
-          </a:lstStyle>
+          <a:lstStyle/>
           <a:p>
             <a:r>
               <a:rPr kumimoji="0" lang="en-US" smtClean="0"/>
@@ -23514,9 +23329,7 @@
         </p:spPr>
         <p:txBody>
           <a:bodyPr vert="eaVert"/>
-          <a:lstStyle>
-            <a:extLst/>
-          </a:lstStyle>
+          <a:lstStyle/>
           <a:p>
             <a:pPr lvl="0" eaLnBrk="1" latinLnBrk="0" hangingPunct="1"/>
             <a:r>
@@ -23568,14 +23381,12 @@
         <p:spPr/>
         <p:txBody>
           <a:bodyPr/>
-          <a:lstStyle>
-            <a:extLst/>
-          </a:lstStyle>
+          <a:lstStyle/>
           <a:p>
             <a:fld id="{FC4E1F84-22AE-408B-8AEE-B5F39E910140}" type="datetimeFigureOut">
               <a:rPr lang="en-US" smtClean="0"/>
               <a:pPr/>
-              <a:t>10/7/2011</a:t>
+              <a:t>10/12/11</a:t>
             </a:fld>
             <a:endParaRPr lang="en-US"/>
           </a:p>
@@ -23594,9 +23405,7 @@
         <p:spPr/>
         <p:txBody>
           <a:bodyPr/>
-          <a:lstStyle>
-            <a:extLst/>
-          </a:lstStyle>
+          <a:lstStyle/>
           <a:p>
             <a:endParaRPr lang="en-US"/>
           </a:p>
@@ -23615,9 +23424,7 @@
         <p:spPr/>
         <p:txBody>
           <a:bodyPr/>
-          <a:lstStyle>
-            <a:extLst/>
-          </a:lstStyle>
+          <a:lstStyle/>
           <a:p>
             <a:fld id="{700068D3-86B4-4F8E-B6AD-2596F9145F76}" type="slidenum">
               <a:rPr lang="en-US" smtClean="0"/>
@@ -23644,7 +23451,7 @@
 </file>
 
 <file path=ppt/slideLayouts/slideLayout7.xml><?xml version="1.0" encoding="utf-8"?>
-<p:sldLayout xmlns:a="http://schemas.openxmlformats.org/drawingml/2006/main" xmlns:r="http://schemas.openxmlformats.org/officeDocument/2006/relationships" xmlns:p="http://schemas.openxmlformats.org/presentationml/2006/main" preserve="1">
+<p:sldLayout xmlns:a="http://schemas.openxmlformats.org/drawingml/2006/main" xmlns:r="http://schemas.openxmlformats.org/officeDocument/2006/relationships" xmlns:mc="http://schemas.openxmlformats.org/markup-compatibility/2006" xmlns:mv="urn:schemas-microsoft-com:mac:vml" xmlns:p="http://schemas.openxmlformats.org/presentationml/2006/main" mc:Ignorable="mv" mc:PreserveAttributes="mv:*" preserve="1">
   <p:cSld name="True or False Question (Answer: False)">
     <p:spTree>
       <p:nvGrpSpPr>
@@ -23677,13 +23484,12 @@
             <a:lvl1pPr algn="r">
               <a:defRPr/>
             </a:lvl1pPr>
-            <a:extLst/>
           </a:lstStyle>
           <a:p>
             <a:fld id="{FC4E1F84-22AE-408B-8AEE-B5F39E910140}" type="datetimeFigureOut">
               <a:rPr lang="en-US" smtClean="0"/>
               <a:pPr/>
-              <a:t>10/7/2011</a:t>
+              <a:t>10/12/11</a:t>
             </a:fld>
             <a:endParaRPr lang="en-US"/>
           </a:p>
@@ -23702,9 +23508,7 @@
         <p:spPr/>
         <p:txBody>
           <a:bodyPr vert="horz"/>
-          <a:lstStyle>
-            <a:extLst/>
-          </a:lstStyle>
+          <a:lstStyle/>
           <a:p>
             <a:endParaRPr lang="en-US"/>
           </a:p>
@@ -23723,9 +23527,7 @@
         <p:spPr/>
         <p:txBody>
           <a:bodyPr vert="horz"/>
-          <a:lstStyle>
-            <a:extLst/>
-          </a:lstStyle>
+          <a:lstStyle/>
           <a:p>
             <a:fld id="{700068D3-86B4-4F8E-B6AD-2596F9145F76}" type="slidenum">
               <a:rPr lang="en-US" smtClean="0"/>
@@ -23764,7 +23566,6 @@
                 </a:solidFill>
               </a:defRPr>
             </a:lvl1pPr>
-            <a:extLst/>
           </a:lstStyle>
           <a:p>
             <a:r>
@@ -23795,9 +23596,7 @@
           <a:bodyPr wrap="square">
             <a:noAutofit/>
           </a:bodyPr>
-          <a:lstStyle>
-            <a:extLst/>
-          </a:lstStyle>
+          <a:lstStyle/>
           <a:p>
             <a:pPr marL="0" indent="0" algn="ctr" rtl="0" latinLnBrk="0">
               <a:spcBef>
@@ -23864,9 +23663,7 @@
           <a:bodyPr wrap="square">
             <a:spAutoFit/>
           </a:bodyPr>
-          <a:lstStyle>
-            <a:extLst/>
-          </a:lstStyle>
+          <a:lstStyle/>
           <a:p>
             <a:pPr algn="ctr"/>
             <a:r>
@@ -24064,7 +23861,7 @@
 </file>
 
 <file path=ppt/slideLayouts/slideLayout8.xml><?xml version="1.0" encoding="utf-8"?>
-<p:sldLayout xmlns:a="http://schemas.openxmlformats.org/drawingml/2006/main" xmlns:r="http://schemas.openxmlformats.org/officeDocument/2006/relationships" xmlns:p="http://schemas.openxmlformats.org/presentationml/2006/main">
+<p:sldLayout xmlns:a="http://schemas.openxmlformats.org/drawingml/2006/main" xmlns:r="http://schemas.openxmlformats.org/officeDocument/2006/relationships" xmlns:mc="http://schemas.openxmlformats.org/markup-compatibility/2006" xmlns:mv="urn:schemas-microsoft-com:mac:vml" xmlns:p="http://schemas.openxmlformats.org/presentationml/2006/main" mc:Ignorable="mv" mc:PreserveAttributes="mv:*">
   <p:cSld name="Multiple Choice">
     <p:spTree>
       <p:nvGrpSpPr>
@@ -24102,7 +23899,6 @@
             <a:lvl1pPr algn="l">
               <a:defRPr i="1" baseline="0"/>
             </a:lvl1pPr>
-            <a:extLst/>
           </a:lstStyle>
           <a:p>
             <a:r>
@@ -24130,13 +23926,12 @@
             <a:lvl1pPr algn="r">
               <a:defRPr/>
             </a:lvl1pPr>
-            <a:extLst/>
           </a:lstStyle>
           <a:p>
             <a:fld id="{FC4E1F84-22AE-408B-8AEE-B5F39E910140}" type="datetimeFigureOut">
               <a:rPr lang="en-US" smtClean="0"/>
               <a:pPr/>
-              <a:t>10/7/2011</a:t>
+              <a:t>10/12/11</a:t>
             </a:fld>
             <a:endParaRPr lang="en-US"/>
           </a:p>
@@ -24155,9 +23950,7 @@
         <p:spPr/>
         <p:txBody>
           <a:bodyPr vert="horz"/>
-          <a:lstStyle>
-            <a:extLst/>
-          </a:lstStyle>
+          <a:lstStyle/>
           <a:p>
             <a:endParaRPr lang="en-US"/>
           </a:p>
@@ -24176,9 +23969,7 @@
         <p:spPr/>
         <p:txBody>
           <a:bodyPr vert="horz"/>
-          <a:lstStyle>
-            <a:extLst/>
-          </a:lstStyle>
+          <a:lstStyle/>
           <a:p>
             <a:fld id="{700068D3-86B4-4F8E-B6AD-2596F9145F76}" type="slidenum">
               <a:rPr lang="en-US" smtClean="0"/>
@@ -24209,9 +24000,7 @@
           <a:bodyPr wrap="square" tIns="91440" bIns="91440" rtlCol="0">
             <a:spAutoFit/>
           </a:bodyPr>
-          <a:lstStyle>
-            <a:extLst/>
-          </a:lstStyle>
+          <a:lstStyle/>
           <a:p>
             <a:pPr algn="r">
               <a:lnSpc>
@@ -24265,7 +24054,6 @@
               <a:buNone/>
               <a:defRPr i="0" baseline="0"/>
             </a:lvl1pPr>
-            <a:extLst/>
           </a:lstStyle>
           <a:p>
             <a:pPr lvl="0"/>
@@ -24301,7 +24089,6 @@
               <a:buNone/>
               <a:defRPr i="0" baseline="0"/>
             </a:lvl1pPr>
-            <a:extLst/>
           </a:lstStyle>
           <a:p>
             <a:pPr lvl="0"/>
@@ -24337,7 +24124,6 @@
               <a:buNone/>
               <a:defRPr i="0" baseline="0"/>
             </a:lvl1pPr>
-            <a:extLst/>
           </a:lstStyle>
           <a:p>
             <a:pPr lvl="0"/>
@@ -24373,7 +24159,6 @@
               <a:buNone/>
               <a:defRPr i="0" baseline="0"/>
             </a:lvl1pPr>
-            <a:extLst/>
           </a:lstStyle>
           <a:p>
             <a:pPr lvl="0"/>
@@ -24409,7 +24194,6 @@
               <a:buNone/>
               <a:defRPr i="0" baseline="0"/>
             </a:lvl1pPr>
-            <a:extLst/>
           </a:lstStyle>
           <a:p>
             <a:pPr lvl="0"/>
@@ -24441,9 +24225,7 @@
           <a:bodyPr wrap="square" tIns="91440" bIns="91440" rtlCol="0">
             <a:spAutoFit/>
           </a:bodyPr>
-          <a:lstStyle>
-            <a:extLst/>
-          </a:lstStyle>
+          <a:lstStyle/>
           <a:p>
             <a:pPr algn="r">
               <a:lnSpc>
@@ -24493,9 +24275,7 @@
           <a:bodyPr wrap="square" tIns="91440" bIns="91440" rtlCol="0">
             <a:spAutoFit/>
           </a:bodyPr>
-          <a:lstStyle>
-            <a:extLst/>
-          </a:lstStyle>
+          <a:lstStyle/>
           <a:p>
             <a:pPr algn="r">
               <a:lnSpc>
@@ -24545,9 +24325,7 @@
           <a:bodyPr wrap="square" tIns="91440" bIns="91440" rtlCol="0">
             <a:spAutoFit/>
           </a:bodyPr>
-          <a:lstStyle>
-            <a:extLst/>
-          </a:lstStyle>
+          <a:lstStyle/>
           <a:p>
             <a:pPr algn="r">
               <a:lnSpc>
@@ -24597,9 +24375,7 @@
           <a:bodyPr wrap="square" tIns="91440" bIns="91440" rtlCol="0">
             <a:spAutoFit/>
           </a:bodyPr>
-          <a:lstStyle>
-            <a:extLst/>
-          </a:lstStyle>
+          <a:lstStyle/>
           <a:p>
             <a:pPr algn="r">
               <a:lnSpc>
@@ -25059,7 +24835,7 @@
 </file>
 
 <file path=ppt/slideLayouts/slideLayout9.xml><?xml version="1.0" encoding="utf-8"?>
-<p:sldLayout xmlns:a="http://schemas.openxmlformats.org/drawingml/2006/main" xmlns:r="http://schemas.openxmlformats.org/officeDocument/2006/relationships" xmlns:p="http://schemas.openxmlformats.org/presentationml/2006/main" preserve="1">
+<p:sldLayout xmlns:a="http://schemas.openxmlformats.org/drawingml/2006/main" xmlns:r="http://schemas.openxmlformats.org/officeDocument/2006/relationships" xmlns:mc="http://schemas.openxmlformats.org/markup-compatibility/2006" xmlns:mv="urn:schemas-microsoft-com:mac:vml" xmlns:p="http://schemas.openxmlformats.org/presentationml/2006/main" mc:Ignorable="mv" mc:PreserveAttributes="mv:*" preserve="1">
   <p:cSld name="Item Match Up">
     <p:spTree>
       <p:nvGrpSpPr>
@@ -25088,9 +24864,7 @@
         <p:spPr/>
         <p:txBody>
           <a:bodyPr vert="horz"/>
-          <a:lstStyle>
-            <a:extLst/>
-          </a:lstStyle>
+          <a:lstStyle/>
           <a:p>
             <a:endParaRPr lang="en-US"/>
           </a:p>
@@ -25159,7 +24933,6 @@
               <a:buChar char="•"/>
               <a:defRPr/>
             </a:lvl5pPr>
-            <a:extLst/>
           </a:lstStyle>
           <a:p>
             <a:pPr lvl="0"/>
@@ -25234,7 +25007,6 @@
               <a:buChar char="•"/>
               <a:defRPr/>
             </a:lvl5pPr>
-            <a:extLst/>
           </a:lstStyle>
           <a:p>
             <a:pPr lvl="0"/>
@@ -25309,7 +25081,6 @@
               <a:buChar char="•"/>
               <a:defRPr/>
             </a:lvl5pPr>
-            <a:extLst/>
           </a:lstStyle>
           <a:p>
             <a:pPr lvl="0"/>
@@ -25384,7 +25155,6 @@
               <a:buChar char="•"/>
               <a:defRPr/>
             </a:lvl5pPr>
-            <a:extLst/>
           </a:lstStyle>
           <a:p>
             <a:pPr lvl="0"/>
@@ -25459,7 +25229,6 @@
               <a:buChar char="•"/>
               <a:defRPr/>
             </a:lvl5pPr>
-            <a:extLst/>
           </a:lstStyle>
           <a:p>
             <a:pPr lvl="0"/>
@@ -25488,13 +25257,12 @@
             <a:lvl1pPr algn="r">
               <a:defRPr/>
             </a:lvl1pPr>
-            <a:extLst/>
           </a:lstStyle>
           <a:p>
             <a:fld id="{FC4E1F84-22AE-408B-8AEE-B5F39E910140}" type="datetimeFigureOut">
               <a:rPr lang="en-US" smtClean="0"/>
               <a:pPr/>
-              <a:t>10/7/2011</a:t>
+              <a:t>10/12/11</a:t>
             </a:fld>
             <a:endParaRPr lang="en-US"/>
           </a:p>
@@ -25563,7 +25331,6 @@
               <a:buChar char="•"/>
               <a:defRPr/>
             </a:lvl5pPr>
-            <a:extLst/>
           </a:lstStyle>
           <a:p>
             <a:pPr lvl="0"/>
@@ -25638,7 +25405,6 @@
               <a:buChar char="•"/>
               <a:defRPr/>
             </a:lvl5pPr>
-            <a:extLst/>
           </a:lstStyle>
           <a:p>
             <a:pPr lvl="0"/>
@@ -25713,7 +25479,6 @@
               <a:buChar char="•"/>
               <a:defRPr/>
             </a:lvl5pPr>
-            <a:extLst/>
           </a:lstStyle>
           <a:p>
             <a:pPr lvl="0"/>
@@ -25788,7 +25553,6 @@
               <a:buChar char="•"/>
               <a:defRPr/>
             </a:lvl5pPr>
-            <a:extLst/>
           </a:lstStyle>
           <a:p>
             <a:pPr lvl="0"/>
@@ -25863,7 +25627,6 @@
               <a:buChar char="•"/>
               <a:defRPr/>
             </a:lvl5pPr>
-            <a:extLst/>
           </a:lstStyle>
           <a:p>
             <a:pPr lvl="0"/>
@@ -25892,7 +25655,6 @@
             <a:lvl1pPr algn="l">
               <a:defRPr i="1" baseline="0"/>
             </a:lvl1pPr>
-            <a:extLst/>
           </a:lstStyle>
           <a:p>
             <a:r>
@@ -25916,9 +25678,7 @@
         <p:spPr/>
         <p:txBody>
           <a:bodyPr vert="horz"/>
-          <a:lstStyle>
-            <a:extLst/>
-          </a:lstStyle>
+          <a:lstStyle/>
           <a:p>
             <a:fld id="{700068D3-86B4-4F8E-B6AD-2596F9145F76}" type="slidenum">
               <a:rPr lang="en-US" smtClean="0"/>
@@ -26448,7 +26208,7 @@
 </file>
 
 <file path=ppt/slideMasters/slideMaster1.xml><?xml version="1.0" encoding="utf-8"?>
-<p:sldMaster xmlns:a="http://schemas.openxmlformats.org/drawingml/2006/main" xmlns:r="http://schemas.openxmlformats.org/officeDocument/2006/relationships" xmlns:p="http://schemas.openxmlformats.org/presentationml/2006/main" preserve="1">
+<p:sldMaster xmlns:a="http://schemas.openxmlformats.org/drawingml/2006/main" xmlns:r="http://schemas.openxmlformats.org/officeDocument/2006/relationships" xmlns:mc="http://schemas.openxmlformats.org/markup-compatibility/2006" xmlns:mv="urn:schemas-microsoft-com:mac:vml" xmlns:p="http://schemas.openxmlformats.org/presentationml/2006/main" mc:Ignorable="mv" mc:PreserveAttributes="mv:*" preserve="1">
   <p:cSld>
     <p:bg>
       <p:bgRef idx="1002">
@@ -26492,9 +26252,7 @@
           <a:bodyPr vert="horz" anchor="b">
             <a:normAutofit/>
           </a:bodyPr>
-          <a:lstStyle>
-            <a:extLst/>
-          </a:lstStyle>
+          <a:lstStyle/>
           <a:p>
             <a:r>
               <a:rPr lang="en-US" smtClean="0"/>
@@ -26527,9 +26285,7 @@
           <a:bodyPr vert="horz">
             <a:normAutofit/>
           </a:bodyPr>
-          <a:lstStyle>
-            <a:extLst/>
-          </a:lstStyle>
+          <a:lstStyle/>
           <a:p>
             <a:pPr lvl="0"/>
             <a:r>
@@ -26593,13 +26349,12 @@
             <a:lvl1pPr>
               <a:defRPr sz="1100"/>
             </a:lvl1pPr>
-            <a:extLst/>
           </a:lstStyle>
           <a:p>
             <a:fld id="{FC4E1F84-22AE-408B-8AEE-B5F39E910140}" type="datetimeFigureOut">
               <a:rPr lang="en-US" smtClean="0"/>
               <a:pPr/>
-              <a:t>10/7/2011</a:t>
+              <a:t>10/12/11</a:t>
             </a:fld>
             <a:endParaRPr lang="en-US"/>
           </a:p>
@@ -26630,7 +26385,6 @@
             <a:lvl1pPr>
               <a:defRPr sz="1200"/>
             </a:lvl1pPr>
-            <a:extLst/>
           </a:lstStyle>
           <a:p>
             <a:endParaRPr lang="en-US"/>
@@ -26662,7 +26416,6 @@
             <a:lvl1pPr>
               <a:defRPr sz="1200"/>
             </a:lvl1pPr>
-            <a:extLst/>
           </a:lstStyle>
           <a:p>
             <a:fld id="{700068D3-86B4-4F8E-B6AD-2596F9145F76}" type="slidenum">
@@ -26719,9 +26472,7 @@
           </p:style>
           <p:txBody>
             <a:bodyPr anchor="ctr"/>
-            <a:lstStyle>
-              <a:extLst/>
-            </a:lstStyle>
+            <a:lstStyle/>
             <a:p>
               <a:pPr algn="ctr"/>
               <a:endParaRPr lang="en-US"/>
@@ -26759,9 +26510,7 @@
           </p:style>
           <p:txBody>
             <a:bodyPr anchor="ctr"/>
-            <a:lstStyle>
-              <a:extLst/>
-            </a:lstStyle>
+            <a:lstStyle/>
             <a:p>
               <a:pPr algn="ctr"/>
               <a:endParaRPr lang="en-US"/>
@@ -26799,9 +26548,7 @@
           </p:style>
           <p:txBody>
             <a:bodyPr anchor="ctr"/>
-            <a:lstStyle>
-              <a:extLst/>
-            </a:lstStyle>
+            <a:lstStyle/>
             <a:p>
               <a:pPr algn="ctr"/>
               <a:endParaRPr lang="en-US"/>
@@ -26839,9 +26586,7 @@
           </p:style>
           <p:txBody>
             <a:bodyPr anchor="ctr"/>
-            <a:lstStyle>
-              <a:extLst/>
-            </a:lstStyle>
+            <a:lstStyle/>
             <a:p>
               <a:pPr algn="ctr"/>
               <a:endParaRPr lang="en-US"/>
@@ -26879,9 +26624,7 @@
           </p:style>
           <p:txBody>
             <a:bodyPr anchor="ctr"/>
-            <a:lstStyle>
-              <a:extLst/>
-            </a:lstStyle>
+            <a:lstStyle/>
             <a:p>
               <a:pPr algn="ctr"/>
               <a:endParaRPr lang="en-US"/>
@@ -26919,9 +26662,7 @@
           </p:style>
           <p:txBody>
             <a:bodyPr anchor="ctr"/>
-            <a:lstStyle>
-              <a:extLst/>
-            </a:lstStyle>
+            <a:lstStyle/>
             <a:p>
               <a:pPr algn="ctr"/>
               <a:endParaRPr lang="en-US"/>
@@ -26959,9 +26700,7 @@
           </p:style>
           <p:txBody>
             <a:bodyPr anchor="ctr"/>
-            <a:lstStyle>
-              <a:extLst/>
-            </a:lstStyle>
+            <a:lstStyle/>
             <a:p>
               <a:pPr algn="ctr"/>
               <a:endParaRPr lang="en-US"/>
@@ -27014,9 +26753,7 @@
           </p:style>
           <p:txBody>
             <a:bodyPr anchor="ctr"/>
-            <a:lstStyle>
-              <a:extLst/>
-            </a:lstStyle>
+            <a:lstStyle/>
             <a:p>
               <a:pPr algn="ctr"/>
               <a:endParaRPr lang="en-US"/>
@@ -27054,9 +26791,7 @@
           </p:style>
           <p:txBody>
             <a:bodyPr anchor="ctr"/>
-            <a:lstStyle>
-              <a:extLst/>
-            </a:lstStyle>
+            <a:lstStyle/>
             <a:p>
               <a:pPr algn="ctr"/>
               <a:endParaRPr lang="en-US"/>
@@ -27094,9 +26829,7 @@
           </p:style>
           <p:txBody>
             <a:bodyPr anchor="ctr"/>
-            <a:lstStyle>
-              <a:extLst/>
-            </a:lstStyle>
+            <a:lstStyle/>
             <a:p>
               <a:pPr algn="ctr"/>
               <a:endParaRPr lang="en-US" dirty="0"/>
@@ -27134,9 +26867,7 @@
           </p:style>
           <p:txBody>
             <a:bodyPr anchor="ctr"/>
-            <a:lstStyle>
-              <a:extLst/>
-            </a:lstStyle>
+            <a:lstStyle/>
             <a:p>
               <a:pPr algn="ctr"/>
               <a:endParaRPr lang="en-US" dirty="0"/>
@@ -27174,9 +26905,7 @@
           </p:style>
           <p:txBody>
             <a:bodyPr anchor="ctr"/>
-            <a:lstStyle>
-              <a:extLst/>
-            </a:lstStyle>
+            <a:lstStyle/>
             <a:p>
               <a:pPr algn="ctr"/>
               <a:endParaRPr lang="en-US"/>
@@ -27214,9 +26943,7 @@
           </p:style>
           <p:txBody>
             <a:bodyPr anchor="ctr"/>
-            <a:lstStyle>
-              <a:extLst/>
-            </a:lstStyle>
+            <a:lstStyle/>
             <a:p>
               <a:pPr algn="ctr"/>
               <a:endParaRPr lang="en-US"/>
@@ -27254,9 +26981,7 @@
           </p:style>
           <p:txBody>
             <a:bodyPr anchor="ctr"/>
-            <a:lstStyle>
-              <a:extLst/>
-            </a:lstStyle>
+            <a:lstStyle/>
             <a:p>
               <a:pPr algn="ctr"/>
               <a:endParaRPr lang="en-US"/>
@@ -27296,9 +27021,7 @@
         </p:style>
         <p:txBody>
           <a:bodyPr anchor="ctr"/>
-          <a:lstStyle>
-            <a:extLst/>
-          </a:lstStyle>
+          <a:lstStyle/>
           <a:p>
             <a:pPr algn="ctr"/>
             <a:endParaRPr lang="en-US"/>
@@ -27402,7 +27125,6 @@
           </a:solidFill>
         </a:defRPr>
       </a:lvl9pPr>
-      <a:extLst/>
     </p:titleStyle>
     <p:bodyStyle>
       <a:lvl1pPr marL="342900" indent="-342900" algn="l" rtl="0" eaLnBrk="1" latinLnBrk="0" hangingPunct="1">
@@ -27531,7 +27253,6 @@
           <a:cs typeface="+mn-cs"/>
         </a:defRPr>
       </a:lvl9pPr>
-      <a:extLst/>
     </p:bodyStyle>
     <p:otherStyle>
       <a:lvl1pPr marL="0" algn="l" rtl="0" eaLnBrk="1" hangingPunct="1">
@@ -27624,14 +27345,13 @@
           <a:cs typeface="+mn-cs"/>
         </a:defRPr>
       </a:lvl9pPr>
-      <a:extLst/>
     </p:otherStyle>
   </p:txStyles>
 </p:sldMaster>
 </file>
 
 <file path=ppt/slideMasters/slideMaster2.xml><?xml version="1.0" encoding="utf-8"?>
-<p:sldMaster xmlns:a="http://schemas.openxmlformats.org/drawingml/2006/main" xmlns:r="http://schemas.openxmlformats.org/officeDocument/2006/relationships" xmlns:p="http://schemas.openxmlformats.org/presentationml/2006/main" preserve="1">
+<p:sldMaster xmlns:a="http://schemas.openxmlformats.org/drawingml/2006/main" xmlns:r="http://schemas.openxmlformats.org/officeDocument/2006/relationships" xmlns:mc="http://schemas.openxmlformats.org/markup-compatibility/2006" xmlns:mv="urn:schemas-microsoft-com:mac:vml" xmlns:p="http://schemas.openxmlformats.org/presentationml/2006/main" mc:Ignorable="mv" mc:PreserveAttributes="mv:*" preserve="1">
   <p:cSld>
     <p:bg>
       <p:bgRef idx="1001">
@@ -27820,7 +27540,7 @@
             <a:fld id="{39C41B7C-DC17-4ECC-A2D3-90661E3E8418}" type="datetimeFigureOut">
               <a:rPr lang="en-US" smtClean="0"/>
               <a:pPr/>
-              <a:t>10/7/2011</a:t>
+              <a:t>10/12/11</a:t>
             </a:fld>
             <a:endParaRPr lang="en-US"/>
           </a:p>
@@ -28420,7 +28140,7 @@
 </file>
 
 <file path=ppt/slideMasters/slideMaster3.xml><?xml version="1.0" encoding="utf-8"?>
-<p:sldMaster xmlns:a="http://schemas.openxmlformats.org/drawingml/2006/main" xmlns:r="http://schemas.openxmlformats.org/officeDocument/2006/relationships" xmlns:p="http://schemas.openxmlformats.org/presentationml/2006/main" preserve="1">
+<p:sldMaster xmlns:a="http://schemas.openxmlformats.org/drawingml/2006/main" xmlns:r="http://schemas.openxmlformats.org/officeDocument/2006/relationships" xmlns:mc="http://schemas.openxmlformats.org/markup-compatibility/2006" xmlns:mv="urn:schemas-microsoft-com:mac:vml" xmlns:p="http://schemas.openxmlformats.org/presentationml/2006/main" mc:Ignorable="mv" mc:PreserveAttributes="mv:*" preserve="1">
   <p:cSld>
     <p:bg>
       <p:bgRef idx="1001">
@@ -28609,7 +28329,7 @@
             <a:fld id="{39C41B7C-DC17-4ECC-A2D3-90661E3E8418}" type="datetimeFigureOut">
               <a:rPr lang="en-US" smtClean="0"/>
               <a:pPr/>
-              <a:t>10/7/2011</a:t>
+              <a:t>10/12/11</a:t>
             </a:fld>
             <a:endParaRPr lang="en-US"/>
           </a:p>
@@ -29209,7 +28929,7 @@
 </file>
 
 <file path=ppt/slideMasters/slideMaster4.xml><?xml version="1.0" encoding="utf-8"?>
-<p:sldMaster xmlns:a="http://schemas.openxmlformats.org/drawingml/2006/main" xmlns:r="http://schemas.openxmlformats.org/officeDocument/2006/relationships" xmlns:p="http://schemas.openxmlformats.org/presentationml/2006/main" preserve="1">
+<p:sldMaster xmlns:a="http://schemas.openxmlformats.org/drawingml/2006/main" xmlns:r="http://schemas.openxmlformats.org/officeDocument/2006/relationships" xmlns:mc="http://schemas.openxmlformats.org/markup-compatibility/2006" xmlns:mv="urn:schemas-microsoft-com:mac:vml" xmlns:p="http://schemas.openxmlformats.org/presentationml/2006/main" mc:Ignorable="mv" mc:PreserveAttributes="mv:*" preserve="1">
   <p:cSld>
     <p:bg>
       <p:bgRef idx="1001">
@@ -29398,7 +29118,7 @@
             <a:fld id="{39C41B7C-DC17-4ECC-A2D3-90661E3E8418}" type="datetimeFigureOut">
               <a:rPr lang="en-US" smtClean="0"/>
               <a:pPr/>
-              <a:t>10/7/2011</a:t>
+              <a:t>10/12/11</a:t>
             </a:fld>
             <a:endParaRPr lang="en-US"/>
           </a:p>
@@ -29998,7 +29718,7 @@
 </file>
 
 <file path=ppt/slideMasters/slideMaster5.xml><?xml version="1.0" encoding="utf-8"?>
-<p:sldMaster xmlns:a="http://schemas.openxmlformats.org/drawingml/2006/main" xmlns:r="http://schemas.openxmlformats.org/officeDocument/2006/relationships" xmlns:p="http://schemas.openxmlformats.org/presentationml/2006/main" preserve="1">
+<p:sldMaster xmlns:a="http://schemas.openxmlformats.org/drawingml/2006/main" xmlns:r="http://schemas.openxmlformats.org/officeDocument/2006/relationships" xmlns:mc="http://schemas.openxmlformats.org/markup-compatibility/2006" xmlns:mv="urn:schemas-microsoft-com:mac:vml" xmlns:p="http://schemas.openxmlformats.org/presentationml/2006/main" mc:Ignorable="mv" mc:PreserveAttributes="mv:*" preserve="1">
   <p:cSld>
     <p:bg>
       <p:bgRef idx="1001">
@@ -30187,7 +29907,7 @@
             <a:fld id="{39C41B7C-DC17-4ECC-A2D3-90661E3E8418}" type="datetimeFigureOut">
               <a:rPr lang="en-US" smtClean="0"/>
               <a:pPr/>
-              <a:t>10/7/2011</a:t>
+              <a:t>10/12/11</a:t>
             </a:fld>
             <a:endParaRPr lang="en-US"/>
           </a:p>
@@ -30787,7 +30507,7 @@
 </file>
 
 <file path=ppt/slideMasters/slideMaster6.xml><?xml version="1.0" encoding="utf-8"?>
-<p:sldMaster xmlns:a="http://schemas.openxmlformats.org/drawingml/2006/main" xmlns:r="http://schemas.openxmlformats.org/officeDocument/2006/relationships" xmlns:p="http://schemas.openxmlformats.org/presentationml/2006/main">
+<p:sldMaster xmlns:a="http://schemas.openxmlformats.org/drawingml/2006/main" xmlns:r="http://schemas.openxmlformats.org/officeDocument/2006/relationships" xmlns:mc="http://schemas.openxmlformats.org/markup-compatibility/2006" xmlns:mv="urn:schemas-microsoft-com:mac:vml" xmlns:p="http://schemas.openxmlformats.org/presentationml/2006/main" mc:Ignorable="mv" mc:PreserveAttributes="mv:*">
   <p:cSld>
     <p:bg>
       <p:bgRef idx="1001">
@@ -30884,9 +30604,7 @@
         </p:spPr>
         <p:txBody>
           <a:bodyPr vert="horz" wrap="square" lIns="91440" tIns="45720" rIns="91440" bIns="45720" anchor="t" compatLnSpc="1"/>
-          <a:lstStyle>
-            <a:extLst/>
-          </a:lstStyle>
+          <a:lstStyle/>
           <a:p>
             <a:endParaRPr kumimoji="0" lang="en-US"/>
           </a:p>
@@ -30966,9 +30684,7 @@
         </p:spPr>
         <p:txBody>
           <a:bodyPr vert="horz" wrap="square" lIns="91440" tIns="45720" rIns="91440" bIns="45720" anchor="t" compatLnSpc="1"/>
-          <a:lstStyle>
-            <a:extLst/>
-          </a:lstStyle>
+          <a:lstStyle/>
           <a:p>
             <a:endParaRPr kumimoji="0" lang="en-US"/>
           </a:p>
@@ -31076,9 +30792,7 @@
         </p:style>
         <p:txBody>
           <a:bodyPr vert="horz" wrap="square" lIns="91440" tIns="45720" rIns="91440" bIns="45720" anchor="ctr" compatLnSpc="1"/>
-          <a:lstStyle>
-            <a:extLst/>
-          </a:lstStyle>
+          <a:lstStyle/>
           <a:p>
             <a:pPr algn="ctr" eaLnBrk="1" latinLnBrk="0" hangingPunct="1"/>
             <a:endParaRPr kumimoji="0" lang="en-US"/>
@@ -31168,9 +30882,7 @@
               <a:bevelT w="25400" h="25400"/>
             </a:sp3d>
           </a:bodyPr>
-          <a:lstStyle>
-            <a:extLst/>
-          </a:lstStyle>
+          <a:lstStyle/>
           <a:p>
             <a:r>
               <a:rPr kumimoji="0" lang="en-US" smtClean="0"/>
@@ -31203,9 +30915,7 @@
           <a:bodyPr vert="horz">
             <a:normAutofit/>
           </a:bodyPr>
-          <a:lstStyle>
-            <a:extLst/>
-          </a:lstStyle>
+          <a:lstStyle/>
           <a:p>
             <a:pPr lvl="0" eaLnBrk="1" latinLnBrk="0" hangingPunct="1"/>
             <a:r>
@@ -31273,13 +30983,12 @@
                 </a:solidFill>
               </a:defRPr>
             </a:lvl1pPr>
-            <a:extLst/>
           </a:lstStyle>
           <a:p>
             <a:fld id="{FC4E1F84-22AE-408B-8AEE-B5F39E910140}" type="datetimeFigureOut">
               <a:rPr lang="en-US" smtClean="0"/>
               <a:pPr/>
-              <a:t>10/7/2011</a:t>
+              <a:t>10/12/11</a:t>
             </a:fld>
             <a:endParaRPr lang="en-US"/>
           </a:p>
@@ -31314,7 +31023,6 @@
                 </a:solidFill>
               </a:defRPr>
             </a:lvl1pPr>
-            <a:extLst/>
           </a:lstStyle>
           <a:p>
             <a:endParaRPr lang="en-US"/>
@@ -31350,7 +31058,6 @@
                 </a:solidFill>
               </a:defRPr>
             </a:lvl1pPr>
-            <a:extLst/>
           </a:lstStyle>
           <a:p>
             <a:fld id="{700068D3-86B4-4F8E-B6AD-2596F9145F76}" type="slidenum">
@@ -31411,7 +31118,6 @@
           <a:cs typeface="+mj-cs"/>
         </a:defRPr>
       </a:lvl1pPr>
-      <a:extLst/>
     </p:titleStyle>
     <p:bodyStyle>
       <a:lvl1pPr marL="365760" indent="-256032" algn="l" rtl="0" eaLnBrk="1" latinLnBrk="0" hangingPunct="1">
@@ -31581,7 +31287,6 @@
           <a:cs typeface="+mn-cs"/>
         </a:defRPr>
       </a:lvl9pPr>
-      <a:extLst/>
     </p:bodyStyle>
     <p:otherStyle>
       <a:lvl1pPr marL="0" algn="l" rtl="0" eaLnBrk="1" latinLnBrk="0" hangingPunct="1">
@@ -31674,14 +31379,13 @@
           <a:cs typeface="+mn-cs"/>
         </a:defRPr>
       </a:lvl9pPr>
-      <a:extLst/>
     </p:otherStyle>
   </p:txStyles>
 </p:sldMaster>
 </file>
 
 <file path=ppt/slides/slide1.xml><?xml version="1.0" encoding="utf-8"?>
-<p:sld xmlns:a="http://schemas.openxmlformats.org/drawingml/2006/main" xmlns:r="http://schemas.openxmlformats.org/officeDocument/2006/relationships" xmlns:p="http://schemas.openxmlformats.org/presentationml/2006/main">
+<p:sld xmlns:a="http://schemas.openxmlformats.org/drawingml/2006/main" xmlns:r="http://schemas.openxmlformats.org/officeDocument/2006/relationships" xmlns:mc="http://schemas.openxmlformats.org/markup-compatibility/2006" xmlns:mv="urn:schemas-microsoft-com:mac:vml" xmlns:p="http://schemas.openxmlformats.org/presentationml/2006/main" mc:Ignorable="mv" mc:PreserveAttributes="mv:*">
   <p:cSld>
     <p:spTree>
       <p:nvGrpSpPr>
@@ -31721,11 +31425,7 @@
             </a:br>
             <a:r>
               <a:rPr lang="en-US" dirty="0" smtClean="0"/>
-              <a:t>Genotype to </a:t>
-            </a:r>
-            <a:r>
-              <a:rPr lang="en-US" dirty="0" smtClean="0"/>
-              <a:t>Phenotype</a:t>
+              <a:t>Genotype to Phenotype</a:t>
             </a:r>
             <a:endParaRPr lang="en-US" dirty="0"/>
           </a:p>
@@ -31785,8 +31485,1204 @@
 </p:sld>
 </file>
 
+<file path=ppt/slides/slide10.xml><?xml version="1.0" encoding="utf-8"?>
+<p:sld xmlns:a="http://schemas.openxmlformats.org/drawingml/2006/main" xmlns:r="http://schemas.openxmlformats.org/officeDocument/2006/relationships" xmlns:mc="http://schemas.openxmlformats.org/markup-compatibility/2006" xmlns:mv="urn:schemas-microsoft-com:mac:vml" xmlns:p="http://schemas.openxmlformats.org/presentationml/2006/main" mc:Ignorable="mv" mc:PreserveAttributes="mv:*">
+  <p:cSld>
+    <p:spTree>
+      <p:nvGrpSpPr>
+        <p:cNvPr id="1" name=""/>
+        <p:cNvGrpSpPr/>
+        <p:nvPr/>
+      </p:nvGrpSpPr>
+      <p:grpSpPr>
+        <a:xfrm>
+          <a:off x="0" y="0"/>
+          <a:ext cx="0" cy="0"/>
+          <a:chOff x="0" y="0"/>
+          <a:chExt cx="0" cy="0"/>
+        </a:xfrm>
+      </p:grpSpPr>
+      <p:sp>
+        <p:nvSpPr>
+          <p:cNvPr id="3" name="Title 2"/>
+          <p:cNvSpPr>
+            <a:spLocks noGrp="1"/>
+          </p:cNvSpPr>
+          <p:nvPr>
+            <p:ph type="title"/>
+          </p:nvPr>
+        </p:nvSpPr>
+        <p:spPr/>
+        <p:txBody>
+          <a:bodyPr>
+            <a:normAutofit fontScale="90000"/>
+          </a:bodyPr>
+          <a:lstStyle/>
+          <a:p>
+            <a:r>
+              <a:rPr lang="en-US" dirty="0" smtClean="0"/>
+              <a:t>Some previous work to consider</a:t>
+            </a:r>
+            <a:endParaRPr lang="en-US" dirty="0"/>
+          </a:p>
+        </p:txBody>
+      </p:sp>
+    </p:spTree>
+  </p:cSld>
+  <p:clrMapOvr>
+    <a:masterClrMapping/>
+  </p:clrMapOvr>
+  <p:transition>
+    <p:fade/>
+  </p:transition>
+</p:sld>
+</file>
+
+<file path=ppt/slides/slide11.xml><?xml version="1.0" encoding="utf-8"?>
+<p:sld xmlns:a="http://schemas.openxmlformats.org/drawingml/2006/main" xmlns:r="http://schemas.openxmlformats.org/officeDocument/2006/relationships" xmlns:mc="http://schemas.openxmlformats.org/markup-compatibility/2006" xmlns:mv="urn:schemas-microsoft-com:mac:vml" xmlns:p="http://schemas.openxmlformats.org/presentationml/2006/main" mc:Ignorable="mv" mc:PreserveAttributes="mv:*">
+  <p:cSld>
+    <p:spTree>
+      <p:nvGrpSpPr>
+        <p:cNvPr id="1" name=""/>
+        <p:cNvGrpSpPr/>
+        <p:nvPr/>
+      </p:nvGrpSpPr>
+      <p:grpSpPr>
+        <a:xfrm>
+          <a:off x="0" y="0"/>
+          <a:ext cx="0" cy="0"/>
+          <a:chOff x="0" y="0"/>
+          <a:chExt cx="0" cy="0"/>
+        </a:xfrm>
+      </p:grpSpPr>
+      <p:sp>
+        <p:nvSpPr>
+          <p:cNvPr id="3" name="Title 2"/>
+          <p:cNvSpPr>
+            <a:spLocks noGrp="1"/>
+          </p:cNvSpPr>
+          <p:nvPr>
+            <p:ph type="title"/>
+          </p:nvPr>
+        </p:nvSpPr>
+        <p:spPr/>
+        <p:txBody>
+          <a:bodyPr>
+            <a:normAutofit fontScale="90000"/>
+          </a:bodyPr>
+          <a:lstStyle/>
+          <a:p>
+            <a:r>
+              <a:rPr lang="en-US" dirty="0" smtClean="0"/>
+              <a:t>Entity-quality model of phenotype representation</a:t>
+            </a:r>
+            <a:endParaRPr lang="en-US" dirty="0"/>
+          </a:p>
+        </p:txBody>
+      </p:sp>
+      <p:pic>
+        <p:nvPicPr>
+          <p:cNvPr id="4" name="Picture 3"/>
+          <p:cNvPicPr>
+            <a:picLocks noChangeAspect="1"/>
+          </p:cNvPicPr>
+          <p:nvPr/>
+        </p:nvPicPr>
+        <p:blipFill>
+          <a:blip r:embed="rId2"/>
+          <a:stretch>
+            <a:fillRect/>
+          </a:stretch>
+        </p:blipFill>
+        <p:spPr>
+          <a:xfrm>
+            <a:off x="2819400" y="2743200"/>
+            <a:ext cx="3556000" cy="2222500"/>
+          </a:xfrm>
+          <a:prstGeom prst="rect">
+            <a:avLst/>
+          </a:prstGeom>
+        </p:spPr>
+      </p:pic>
+      <p:sp>
+        <p:nvSpPr>
+          <p:cNvPr id="5" name="TextBox 4"/>
+          <p:cNvSpPr txBox="1"/>
+          <p:nvPr/>
+        </p:nvSpPr>
+        <p:spPr>
+          <a:xfrm>
+            <a:off x="3195053" y="2192421"/>
+            <a:ext cx="813043" cy="369332"/>
+          </a:xfrm>
+          <a:prstGeom prst="rect">
+            <a:avLst/>
+          </a:prstGeom>
+          <a:noFill/>
+        </p:spPr>
+        <p:txBody>
+          <a:bodyPr wrap="none" rtlCol="0">
+            <a:spAutoFit/>
+          </a:bodyPr>
+          <a:lstStyle/>
+          <a:p>
+            <a:r>
+              <a:rPr lang="en-US" dirty="0" smtClean="0"/>
+              <a:t>Entity</a:t>
+            </a:r>
+            <a:endParaRPr lang="en-US" dirty="0"/>
+          </a:p>
+        </p:txBody>
+      </p:sp>
+      <p:sp>
+        <p:nvSpPr>
+          <p:cNvPr id="6" name="TextBox 5"/>
+          <p:cNvSpPr txBox="1"/>
+          <p:nvPr/>
+        </p:nvSpPr>
+        <p:spPr>
+          <a:xfrm>
+            <a:off x="5181600" y="2209800"/>
+            <a:ext cx="975109" cy="369332"/>
+          </a:xfrm>
+          <a:prstGeom prst="rect">
+            <a:avLst/>
+          </a:prstGeom>
+          <a:noFill/>
+        </p:spPr>
+        <p:txBody>
+          <a:bodyPr wrap="none" rtlCol="0">
+            <a:spAutoFit/>
+          </a:bodyPr>
+          <a:lstStyle/>
+          <a:p>
+            <a:r>
+              <a:rPr lang="en-US" dirty="0" smtClean="0"/>
+              <a:t>Quality</a:t>
+            </a:r>
+            <a:endParaRPr lang="en-US" dirty="0"/>
+          </a:p>
+        </p:txBody>
+      </p:sp>
+      <p:sp>
+        <p:nvSpPr>
+          <p:cNvPr id="7" name="TextBox 6"/>
+          <p:cNvSpPr txBox="1"/>
+          <p:nvPr/>
+        </p:nvSpPr>
+        <p:spPr>
+          <a:xfrm>
+            <a:off x="5962316" y="5735053"/>
+            <a:ext cx="2871324" cy="400110"/>
+          </a:xfrm>
+          <a:prstGeom prst="rect">
+            <a:avLst/>
+          </a:prstGeom>
+          <a:noFill/>
+        </p:spPr>
+        <p:txBody>
+          <a:bodyPr wrap="none" rtlCol="0">
+            <a:spAutoFit/>
+          </a:bodyPr>
+          <a:lstStyle/>
+          <a:p>
+            <a:r>
+              <a:rPr lang="en-US" sz="2000" dirty="0" err="1" smtClean="0"/>
+              <a:t>Mungall</a:t>
+            </a:r>
+            <a:r>
+              <a:rPr lang="en-US" sz="2000" dirty="0" smtClean="0"/>
+              <a:t> OWLED 2007</a:t>
+            </a:r>
+            <a:endParaRPr lang="en-US" sz="2000" dirty="0"/>
+          </a:p>
+        </p:txBody>
+      </p:sp>
+    </p:spTree>
+  </p:cSld>
+  <p:clrMapOvr>
+    <a:masterClrMapping/>
+  </p:clrMapOvr>
+  <p:transition>
+    <p:fade/>
+  </p:transition>
+</p:sld>
+</file>
+
+<file path=ppt/slides/slide12.xml><?xml version="1.0" encoding="utf-8"?>
+<p:sld xmlns:a="http://schemas.openxmlformats.org/drawingml/2006/main" xmlns:r="http://schemas.openxmlformats.org/officeDocument/2006/relationships" xmlns:mc="http://schemas.openxmlformats.org/markup-compatibility/2006" xmlns:mv="urn:schemas-microsoft-com:mac:vml" xmlns:p="http://schemas.openxmlformats.org/presentationml/2006/main" mc:Ignorable="mv" mc:PreserveAttributes="mv:*">
+  <p:cSld>
+    <p:spTree>
+      <p:nvGrpSpPr>
+        <p:cNvPr id="1" name=""/>
+        <p:cNvGrpSpPr/>
+        <p:nvPr/>
+      </p:nvGrpSpPr>
+      <p:grpSpPr>
+        <a:xfrm>
+          <a:off x="0" y="0"/>
+          <a:ext cx="0" cy="0"/>
+          <a:chOff x="0" y="0"/>
+          <a:chExt cx="0" cy="0"/>
+        </a:xfrm>
+      </p:grpSpPr>
+      <p:sp>
+        <p:nvSpPr>
+          <p:cNvPr id="3" name="Title 2"/>
+          <p:cNvSpPr>
+            <a:spLocks noGrp="1"/>
+          </p:cNvSpPr>
+          <p:nvPr>
+            <p:ph type="title"/>
+          </p:nvPr>
+        </p:nvSpPr>
+        <p:spPr/>
+        <p:txBody>
+          <a:bodyPr/>
+          <a:lstStyle/>
+          <a:p>
+            <a:pPr algn="ctr"/>
+            <a:r>
+              <a:rPr lang="en-US" dirty="0" smtClean="0"/>
+              <a:t>EQ examples</a:t>
+            </a:r>
+            <a:endParaRPr lang="en-US" dirty="0"/>
+          </a:p>
+        </p:txBody>
+      </p:sp>
+      <p:pic>
+        <p:nvPicPr>
+          <p:cNvPr id="4" name="Picture 3"/>
+          <p:cNvPicPr>
+            <a:picLocks noChangeAspect="1"/>
+          </p:cNvPicPr>
+          <p:nvPr/>
+        </p:nvPicPr>
+        <p:blipFill>
+          <a:blip r:embed="rId2"/>
+          <a:stretch>
+            <a:fillRect/>
+          </a:stretch>
+        </p:blipFill>
+        <p:spPr>
+          <a:xfrm>
+            <a:off x="1828800" y="1752600"/>
+            <a:ext cx="5347677" cy="4089400"/>
+          </a:xfrm>
+          <a:prstGeom prst="rect">
+            <a:avLst/>
+          </a:prstGeom>
+        </p:spPr>
+      </p:pic>
+    </p:spTree>
+  </p:cSld>
+  <p:clrMapOvr>
+    <a:masterClrMapping/>
+  </p:clrMapOvr>
+  <p:transition>
+    <p:fade/>
+  </p:transition>
+</p:sld>
+</file>
+
+<file path=ppt/slides/slide13.xml><?xml version="1.0" encoding="utf-8"?>
+<p:sld xmlns:a="http://schemas.openxmlformats.org/drawingml/2006/main" xmlns:r="http://schemas.openxmlformats.org/officeDocument/2006/relationships" xmlns:mc="http://schemas.openxmlformats.org/markup-compatibility/2006" xmlns:mv="urn:schemas-microsoft-com:mac:vml" xmlns:p="http://schemas.openxmlformats.org/presentationml/2006/main" mc:Ignorable="mv" mc:PreserveAttributes="mv:*">
+  <p:cSld>
+    <p:spTree>
+      <p:nvGrpSpPr>
+        <p:cNvPr id="1" name=""/>
+        <p:cNvGrpSpPr/>
+        <p:nvPr/>
+      </p:nvGrpSpPr>
+      <p:grpSpPr>
+        <a:xfrm>
+          <a:off x="0" y="0"/>
+          <a:ext cx="0" cy="0"/>
+          <a:chOff x="0" y="0"/>
+          <a:chExt cx="0" cy="0"/>
+        </a:xfrm>
+      </p:grpSpPr>
+      <p:pic>
+        <p:nvPicPr>
+          <p:cNvPr id="45060" name="Picture 5" descr="fig2venn.jpg"/>
+          <p:cNvPicPr>
+            <a:picLocks noChangeAspect="1"/>
+          </p:cNvPicPr>
+          <p:nvPr/>
+        </p:nvPicPr>
+        <p:blipFill>
+          <a:blip r:embed="rId2"/>
+          <a:srcRect/>
+          <a:stretch>
+            <a:fillRect/>
+          </a:stretch>
+        </p:blipFill>
+        <p:spPr bwMode="auto">
+          <a:xfrm>
+            <a:off x="838200" y="914400"/>
+            <a:ext cx="7162800" cy="5957887"/>
+          </a:xfrm>
+          <a:prstGeom prst="rect">
+            <a:avLst/>
+          </a:prstGeom>
+          <a:noFill/>
+          <a:ln w="9525">
+            <a:noFill/>
+            <a:miter lim="800000"/>
+            <a:headEnd/>
+            <a:tailEnd/>
+          </a:ln>
+        </p:spPr>
+      </p:pic>
+      <p:sp>
+        <p:nvSpPr>
+          <p:cNvPr id="4" name="Title 2"/>
+          <p:cNvSpPr txBox="1">
+            <a:spLocks/>
+          </p:cNvSpPr>
+          <p:nvPr/>
+        </p:nvSpPr>
+        <p:spPr>
+          <a:xfrm>
+            <a:off x="457200" y="-152400"/>
+            <a:ext cx="8229600" cy="1143000"/>
+          </a:xfrm>
+          <a:prstGeom prst="rect">
+            <a:avLst/>
+          </a:prstGeom>
+        </p:spPr>
+        <p:txBody>
+          <a:bodyPr vert="horz" rtlCol="0" anchor="ctr">
+            <a:normAutofit/>
+            <a:scene3d>
+              <a:camera prst="orthographicFront"/>
+              <a:lightRig rig="soft" dir="t"/>
+            </a:scene3d>
+            <a:sp3d prstMaterial="softEdge">
+              <a:bevelT w="25400" h="25400"/>
+            </a:sp3d>
+          </a:bodyPr>
+          <a:lstStyle/>
+          <a:p>
+            <a:pPr marL="0" marR="0" lvl="0" indent="0" algn="ctr" defTabSz="914400" rtl="0" eaLnBrk="1" fontAlgn="auto" latinLnBrk="0" hangingPunct="1">
+              <a:lnSpc>
+                <a:spcPct val="100000"/>
+              </a:lnSpc>
+              <a:spcBef>
+                <a:spcPct val="0"/>
+              </a:spcBef>
+              <a:spcAft>
+                <a:spcPts val="0"/>
+              </a:spcAft>
+              <a:buClrTx/>
+              <a:buSzTx/>
+              <a:buFontTx/>
+              <a:buNone/>
+              <a:tabLst/>
+              <a:defRPr/>
+            </a:pPr>
+            <a:r>
+              <a:rPr kumimoji="0" lang="en-US" sz="4100" b="1" i="0" u="none" strike="noStrike" kern="1200" cap="none" spc="0" normalizeH="0" baseline="0" noProof="0" dirty="0" smtClean="0">
+                <a:ln>
+                  <a:noFill/>
+                </a:ln>
+                <a:solidFill>
+                  <a:schemeClr val="tx2"/>
+                </a:solidFill>
+                <a:effectLst>
+                  <a:outerShdw blurRad="31750" dist="25400" dir="5400000" algn="tl" rotWithShape="0">
+                    <a:srgbClr val="000000">
+                      <a:alpha val="25000"/>
+                    </a:srgbClr>
+                  </a:outerShdw>
+                </a:effectLst>
+                <a:uLnTx/>
+                <a:uFillTx/>
+                <a:latin typeface="+mj-lt"/>
+                <a:ea typeface="+mj-ea"/>
+                <a:cs typeface="+mj-cs"/>
+              </a:rPr>
+              <a:t>EQ </a:t>
+            </a:r>
+            <a:r>
+              <a:rPr kumimoji="0" lang="en-US" sz="4100" b="1" i="0" u="none" strike="noStrike" kern="1200" cap="none" spc="0" normalizeH="0" baseline="0" noProof="0" dirty="0" err="1" smtClean="0">
+                <a:ln>
+                  <a:noFill/>
+                </a:ln>
+                <a:solidFill>
+                  <a:schemeClr val="tx2"/>
+                </a:solidFill>
+                <a:effectLst>
+                  <a:outerShdw blurRad="31750" dist="25400" dir="5400000" algn="tl" rotWithShape="0">
+                    <a:srgbClr val="000000">
+                      <a:alpha val="25000"/>
+                    </a:srgbClr>
+                  </a:outerShdw>
+                </a:effectLst>
+                <a:uLnTx/>
+                <a:uFillTx/>
+                <a:latin typeface="+mj-lt"/>
+                <a:ea typeface="+mj-ea"/>
+                <a:cs typeface="+mj-cs"/>
+              </a:rPr>
+              <a:t>subsumption</a:t>
+            </a:r>
+            <a:endParaRPr kumimoji="0" lang="en-US" sz="4100" b="1" i="0" u="none" strike="noStrike" kern="1200" cap="none" spc="0" normalizeH="0" baseline="0" noProof="0" dirty="0">
+              <a:ln>
+                <a:noFill/>
+              </a:ln>
+              <a:solidFill>
+                <a:schemeClr val="tx2"/>
+              </a:solidFill>
+              <a:effectLst>
+                <a:outerShdw blurRad="31750" dist="25400" dir="5400000" algn="tl" rotWithShape="0">
+                  <a:srgbClr val="000000">
+                    <a:alpha val="25000"/>
+                  </a:srgbClr>
+                </a:outerShdw>
+              </a:effectLst>
+              <a:uLnTx/>
+              <a:uFillTx/>
+              <a:latin typeface="+mj-lt"/>
+              <a:ea typeface="+mj-ea"/>
+              <a:cs typeface="+mj-cs"/>
+            </a:endParaRPr>
+          </a:p>
+        </p:txBody>
+      </p:sp>
+    </p:spTree>
+  </p:cSld>
+  <p:clrMapOvr>
+    <a:masterClrMapping/>
+  </p:clrMapOvr>
+</p:sld>
+</file>
+
+<file path=ppt/slides/slide14.xml><?xml version="1.0" encoding="utf-8"?>
+<p:sld xmlns:a="http://schemas.openxmlformats.org/drawingml/2006/main" xmlns:r="http://schemas.openxmlformats.org/officeDocument/2006/relationships" xmlns:mc="http://schemas.openxmlformats.org/markup-compatibility/2006" xmlns:mv="urn:schemas-microsoft-com:mac:vml" xmlns:p="http://schemas.openxmlformats.org/presentationml/2006/main" mc:Ignorable="mv" mc:PreserveAttributes="mv:*">
+  <p:cSld>
+    <p:spTree>
+      <p:nvGrpSpPr>
+        <p:cNvPr id="1" name=""/>
+        <p:cNvGrpSpPr/>
+        <p:nvPr/>
+      </p:nvGrpSpPr>
+      <p:grpSpPr>
+        <a:xfrm>
+          <a:off x="0" y="0"/>
+          <a:ext cx="0" cy="0"/>
+          <a:chOff x="0" y="0"/>
+          <a:chExt cx="0" cy="0"/>
+        </a:xfrm>
+      </p:grpSpPr>
+      <p:sp>
+        <p:nvSpPr>
+          <p:cNvPr id="3" name="Title 2"/>
+          <p:cNvSpPr>
+            <a:spLocks noGrp="1"/>
+          </p:cNvSpPr>
+          <p:nvPr>
+            <p:ph type="title"/>
+          </p:nvPr>
+        </p:nvSpPr>
+        <p:spPr/>
+        <p:txBody>
+          <a:bodyPr>
+            <a:normAutofit fontScale="90000"/>
+          </a:bodyPr>
+          <a:lstStyle/>
+          <a:p>
+            <a:r>
+              <a:rPr lang="en-US" dirty="0" smtClean="0"/>
+              <a:t>Relating </a:t>
+            </a:r>
+            <a:r>
+              <a:rPr lang="en-US" dirty="0" err="1" smtClean="0"/>
+              <a:t>precomposed</a:t>
+            </a:r>
+            <a:r>
+              <a:rPr lang="en-US" dirty="0" smtClean="0"/>
+              <a:t> phenotype ontology classes with EQ model</a:t>
+            </a:r>
+            <a:endParaRPr lang="en-US" dirty="0"/>
+          </a:p>
+        </p:txBody>
+      </p:sp>
+      <p:pic>
+        <p:nvPicPr>
+          <p:cNvPr id="4" name="Picture 3"/>
+          <p:cNvPicPr>
+            <a:picLocks noChangeAspect="1"/>
+          </p:cNvPicPr>
+          <p:nvPr/>
+        </p:nvPicPr>
+        <p:blipFill>
+          <a:blip r:embed="rId2"/>
+          <a:srcRect l="3846" t="4023"/>
+          <a:stretch>
+            <a:fillRect/>
+          </a:stretch>
+        </p:blipFill>
+        <p:spPr>
+          <a:xfrm>
+            <a:off x="914400" y="1447800"/>
+            <a:ext cx="6600958" cy="4267200"/>
+          </a:xfrm>
+          <a:prstGeom prst="rect">
+            <a:avLst/>
+          </a:prstGeom>
+        </p:spPr>
+      </p:pic>
+      <p:sp>
+        <p:nvSpPr>
+          <p:cNvPr id="5" name="TextBox 4"/>
+          <p:cNvSpPr txBox="1"/>
+          <p:nvPr/>
+        </p:nvSpPr>
+        <p:spPr>
+          <a:xfrm>
+            <a:off x="6705600" y="6096000"/>
+            <a:ext cx="2131187" cy="369332"/>
+          </a:xfrm>
+          <a:prstGeom prst="rect">
+            <a:avLst/>
+          </a:prstGeom>
+          <a:noFill/>
+        </p:spPr>
+        <p:txBody>
+          <a:bodyPr wrap="none" rtlCol="0">
+            <a:spAutoFit/>
+          </a:bodyPr>
+          <a:lstStyle/>
+          <a:p>
+            <a:r>
+              <a:rPr lang="en-US" dirty="0" err="1" smtClean="0"/>
+              <a:t>Mungall</a:t>
+            </a:r>
+            <a:r>
+              <a:rPr lang="en-US" dirty="0" smtClean="0"/>
+              <a:t> MP 2010</a:t>
+            </a:r>
+            <a:endParaRPr lang="en-US" dirty="0"/>
+          </a:p>
+        </p:txBody>
+      </p:sp>
+    </p:spTree>
+  </p:cSld>
+  <p:clrMapOvr>
+    <a:masterClrMapping/>
+  </p:clrMapOvr>
+  <p:transition>
+    <p:fade/>
+  </p:transition>
+</p:sld>
+</file>
+
+<file path=ppt/slides/slide15.xml><?xml version="1.0" encoding="utf-8"?>
+<p:sld xmlns:a="http://schemas.openxmlformats.org/drawingml/2006/main" xmlns:r="http://schemas.openxmlformats.org/officeDocument/2006/relationships" xmlns:mc="http://schemas.openxmlformats.org/markup-compatibility/2006" xmlns:mv="urn:schemas-microsoft-com:mac:vml" xmlns:p="http://schemas.openxmlformats.org/presentationml/2006/main" mc:Ignorable="mv" mc:PreserveAttributes="mv:*">
+  <p:cSld>
+    <p:spTree>
+      <p:nvGrpSpPr>
+        <p:cNvPr id="1" name=""/>
+        <p:cNvGrpSpPr/>
+        <p:nvPr/>
+      </p:nvGrpSpPr>
+      <p:grpSpPr>
+        <a:xfrm>
+          <a:off x="0" y="0"/>
+          <a:ext cx="0" cy="0"/>
+          <a:chOff x="0" y="0"/>
+          <a:chExt cx="0" cy="0"/>
+        </a:xfrm>
+      </p:grpSpPr>
+      <p:sp>
+        <p:nvSpPr>
+          <p:cNvPr id="3" name="Title 2"/>
+          <p:cNvSpPr>
+            <a:spLocks noGrp="1"/>
+          </p:cNvSpPr>
+          <p:nvPr>
+            <p:ph type="title"/>
+          </p:nvPr>
+        </p:nvSpPr>
+        <p:spPr/>
+        <p:txBody>
+          <a:bodyPr/>
+          <a:lstStyle/>
+          <a:p>
+            <a:r>
+              <a:rPr lang="en-US" dirty="0" smtClean="0"/>
+              <a:t>The </a:t>
+            </a:r>
+            <a:r>
+              <a:rPr lang="en-US" dirty="0" err="1" smtClean="0"/>
+              <a:t>phene</a:t>
+            </a:r>
+            <a:r>
+              <a:rPr lang="en-US" dirty="0" smtClean="0"/>
+              <a:t> approach</a:t>
+            </a:r>
+            <a:endParaRPr lang="en-US" dirty="0"/>
+          </a:p>
+        </p:txBody>
+      </p:sp>
+      <p:sp>
+        <p:nvSpPr>
+          <p:cNvPr id="4" name="TextBox 3"/>
+          <p:cNvSpPr txBox="1"/>
+          <p:nvPr/>
+        </p:nvSpPr>
+        <p:spPr>
+          <a:xfrm>
+            <a:off x="228600" y="1447800"/>
+            <a:ext cx="8637141" cy="3477875"/>
+          </a:xfrm>
+          <a:prstGeom prst="rect">
+            <a:avLst/>
+          </a:prstGeom>
+          <a:noFill/>
+        </p:spPr>
+        <p:txBody>
+          <a:bodyPr wrap="square" rtlCol="0">
+            <a:spAutoFit/>
+          </a:bodyPr>
+          <a:lstStyle/>
+          <a:p>
+            <a:r>
+              <a:rPr lang="en-US" sz="2000" dirty="0" err="1" smtClean="0"/>
+              <a:t>Phenes</a:t>
+            </a:r>
+            <a:r>
+              <a:rPr lang="en-US" sz="2000" dirty="0" smtClean="0"/>
+              <a:t> are </a:t>
+            </a:r>
+            <a:r>
+              <a:rPr lang="en-US" sz="2000" dirty="0" smtClean="0"/>
+              <a:t>attributive entities which are existentially dependent on a bearer, </a:t>
+            </a:r>
+            <a:r>
+              <a:rPr lang="en-US" sz="2000" dirty="0" smtClean="0"/>
+              <a:t>and </a:t>
+            </a:r>
+            <a:r>
+              <a:rPr lang="en-US" sz="2000" dirty="0" err="1" smtClean="0"/>
+              <a:t>phenes</a:t>
+            </a:r>
+            <a:r>
+              <a:rPr lang="en-US" sz="2000" dirty="0" smtClean="0"/>
+              <a:t> </a:t>
+            </a:r>
+            <a:r>
+              <a:rPr lang="en-US" sz="2000" dirty="0" smtClean="0"/>
+              <a:t>characterize the properties of their bearer.</a:t>
+            </a:r>
+            <a:r>
+              <a:rPr lang="en-US" sz="2000" dirty="0" smtClean="0"/>
+              <a:t> </a:t>
+            </a:r>
+          </a:p>
+          <a:p>
+            <a:endParaRPr lang="en-US" sz="2000" dirty="0" smtClean="0"/>
+          </a:p>
+          <a:p>
+            <a:r>
+              <a:rPr lang="en-US" sz="2000" dirty="0" smtClean="0"/>
+              <a:t>Therefore</a:t>
+            </a:r>
+            <a:r>
+              <a:rPr lang="en-US" sz="2000" dirty="0" smtClean="0"/>
+              <a:t>, we </a:t>
+            </a:r>
+            <a:r>
+              <a:rPr lang="en-US" sz="2000" dirty="0" smtClean="0"/>
+              <a:t>formally define </a:t>
+            </a:r>
+            <a:r>
+              <a:rPr lang="en-US" sz="2000" dirty="0" err="1" smtClean="0"/>
+              <a:t>phenes</a:t>
+            </a:r>
+            <a:r>
+              <a:rPr lang="en-US" sz="2000" dirty="0" smtClean="0"/>
+              <a:t> as the properties that are possessed by ‘entities which </a:t>
+            </a:r>
+            <a:r>
+              <a:rPr lang="en-US" sz="2000" dirty="0" smtClean="0"/>
+              <a:t>are </a:t>
+            </a:r>
+            <a:r>
+              <a:rPr lang="en-US" sz="2000" i="1" dirty="0" smtClean="0"/>
+              <a:t>Y</a:t>
+            </a:r>
+            <a:r>
+              <a:rPr lang="en-US" sz="2000" i="1" dirty="0" smtClean="0"/>
+              <a:t>’, and express Y as class-membership in description logic, or as a </a:t>
+            </a:r>
+            <a:r>
+              <a:rPr lang="en-US" sz="2000" i="1" dirty="0" smtClean="0"/>
+              <a:t>unary </a:t>
+            </a:r>
+            <a:r>
+              <a:rPr lang="en-US" sz="2000" dirty="0" smtClean="0"/>
+              <a:t>predicates </a:t>
+            </a:r>
+            <a:r>
+              <a:rPr lang="en-US" sz="2000" dirty="0" smtClean="0"/>
+              <a:t>in first-order logic. We call </a:t>
+            </a:r>
+            <a:r>
+              <a:rPr lang="en-US" sz="2000" i="1" dirty="0" smtClean="0"/>
+              <a:t>Y the defining property of a </a:t>
+            </a:r>
+            <a:r>
+              <a:rPr lang="en-US" sz="2000" i="1" dirty="0" err="1" smtClean="0"/>
+              <a:t>phene</a:t>
+            </a:r>
+            <a:r>
+              <a:rPr lang="en-US" sz="2000" i="1" dirty="0" smtClean="0"/>
+              <a:t>.</a:t>
+            </a:r>
+            <a:endParaRPr lang="en-US" sz="2000" i="1" dirty="0" smtClean="0"/>
+          </a:p>
+          <a:p>
+            <a:endParaRPr lang="en-US" sz="2000" dirty="0" smtClean="0"/>
+          </a:p>
+          <a:p>
+            <a:r>
+              <a:rPr lang="en-US" sz="2000" dirty="0" smtClean="0"/>
+              <a:t>The </a:t>
+            </a:r>
+            <a:r>
+              <a:rPr lang="en-US" sz="2000" dirty="0" smtClean="0"/>
+              <a:t>defining property of a </a:t>
+            </a:r>
+            <a:r>
+              <a:rPr lang="en-US" sz="2000" dirty="0" err="1" smtClean="0"/>
+              <a:t>phene</a:t>
+            </a:r>
+            <a:r>
+              <a:rPr lang="en-US" sz="2000" dirty="0" smtClean="0"/>
+              <a:t> characterizes the </a:t>
+            </a:r>
+            <a:r>
+              <a:rPr lang="en-US" sz="2000" dirty="0" err="1" smtClean="0"/>
+              <a:t>phene’s</a:t>
+            </a:r>
+            <a:r>
+              <a:rPr lang="en-US" sz="2000" dirty="0" smtClean="0"/>
+              <a:t> bearer, </a:t>
+            </a:r>
+            <a:r>
+              <a:rPr lang="en-US" sz="2000" dirty="0" smtClean="0"/>
+              <a:t>and therefore </a:t>
+            </a:r>
+            <a:r>
+              <a:rPr lang="en-US" sz="2000" dirty="0" smtClean="0"/>
+              <a:t>we can distinguish different kinds of </a:t>
+            </a:r>
+            <a:r>
+              <a:rPr lang="en-US" sz="2000" dirty="0" err="1" smtClean="0"/>
+              <a:t>phenes</a:t>
+            </a:r>
+            <a:r>
+              <a:rPr lang="en-US" sz="2000" dirty="0" smtClean="0"/>
+              <a:t> based on the </a:t>
+            </a:r>
+            <a:r>
+              <a:rPr lang="en-US" sz="2000" dirty="0" smtClean="0"/>
+              <a:t>relations that </a:t>
+            </a:r>
+            <a:r>
+              <a:rPr lang="en-US" sz="2000" dirty="0" smtClean="0"/>
+              <a:t>are necessary to formulate this characteristic.</a:t>
+            </a:r>
+            <a:endParaRPr lang="en-US" sz="2000" dirty="0"/>
+          </a:p>
+        </p:txBody>
+      </p:sp>
+      <p:sp>
+        <p:nvSpPr>
+          <p:cNvPr id="5" name="TextBox 4"/>
+          <p:cNvSpPr txBox="1"/>
+          <p:nvPr/>
+        </p:nvSpPr>
+        <p:spPr>
+          <a:xfrm>
+            <a:off x="6705600" y="6211669"/>
+            <a:ext cx="2034481" cy="646331"/>
+          </a:xfrm>
+          <a:prstGeom prst="rect">
+            <a:avLst/>
+          </a:prstGeom>
+          <a:noFill/>
+        </p:spPr>
+        <p:txBody>
+          <a:bodyPr wrap="none" rtlCol="0">
+            <a:spAutoFit/>
+          </a:bodyPr>
+          <a:lstStyle/>
+          <a:p>
+            <a:r>
+              <a:rPr lang="en-US" dirty="0" err="1" smtClean="0"/>
+              <a:t>Hoehndorf</a:t>
+            </a:r>
+            <a:r>
+              <a:rPr lang="en-US" dirty="0" smtClean="0"/>
+              <a:t> 2010</a:t>
+            </a:r>
+          </a:p>
+          <a:p>
+            <a:endParaRPr lang="en-US" dirty="0"/>
+          </a:p>
+        </p:txBody>
+      </p:sp>
+    </p:spTree>
+  </p:cSld>
+  <p:clrMapOvr>
+    <a:masterClrMapping/>
+  </p:clrMapOvr>
+  <p:transition>
+    <p:fade/>
+  </p:transition>
+</p:sld>
+</file>
+
+<file path=ppt/slides/slide16.xml><?xml version="1.0" encoding="utf-8"?>
+<p:sld xmlns:a="http://schemas.openxmlformats.org/drawingml/2006/main" xmlns:r="http://schemas.openxmlformats.org/officeDocument/2006/relationships" xmlns:mc="http://schemas.openxmlformats.org/markup-compatibility/2006" xmlns:mv="urn:schemas-microsoft-com:mac:vml" xmlns:p="http://schemas.openxmlformats.org/presentationml/2006/main" mc:Ignorable="mv" mc:PreserveAttributes="mv:*">
+  <p:cSld>
+    <p:spTree>
+      <p:nvGrpSpPr>
+        <p:cNvPr id="1" name=""/>
+        <p:cNvGrpSpPr/>
+        <p:nvPr/>
+      </p:nvGrpSpPr>
+      <p:grpSpPr>
+        <a:xfrm>
+          <a:off x="0" y="0"/>
+          <a:ext cx="0" cy="0"/>
+          <a:chOff x="0" y="0"/>
+          <a:chExt cx="0" cy="0"/>
+        </a:xfrm>
+      </p:grpSpPr>
+      <p:sp>
+        <p:nvSpPr>
+          <p:cNvPr id="2" name="Content Placeholder 1"/>
+          <p:cNvSpPr>
+            <a:spLocks noGrp="1"/>
+          </p:cNvSpPr>
+          <p:nvPr>
+            <p:ph idx="1"/>
+          </p:nvPr>
+        </p:nvSpPr>
+        <p:spPr/>
+        <p:txBody>
+          <a:bodyPr>
+            <a:normAutofit/>
+          </a:bodyPr>
+          <a:lstStyle/>
+          <a:p>
+            <a:pPr>
+              <a:buNone/>
+            </a:pPr>
+            <a:r>
+              <a:rPr lang="en-US" sz="1600" b="1" dirty="0" smtClean="0"/>
+              <a:t>Fig</a:t>
+            </a:r>
+            <a:r>
+              <a:rPr lang="en-US" sz="1600" b="1" dirty="0" smtClean="0"/>
+              <a:t>. 1. The first distinction is drawn between </a:t>
+            </a:r>
+            <a:r>
+              <a:rPr lang="en-US" sz="1600" b="1" dirty="0" err="1" smtClean="0"/>
+              <a:t>phenes</a:t>
+            </a:r>
+            <a:r>
+              <a:rPr lang="en-US" sz="1600" b="1" dirty="0" smtClean="0"/>
+              <a:t> of objects and </a:t>
+            </a:r>
+            <a:r>
+              <a:rPr lang="en-US" sz="1600" b="1" dirty="0" err="1" smtClean="0"/>
+              <a:t>phenes</a:t>
+            </a:r>
+            <a:r>
+              <a:rPr lang="en-US" sz="1600" b="1" dirty="0" smtClean="0"/>
+              <a:t> of processes. We primarily classify </a:t>
+            </a:r>
+            <a:r>
+              <a:rPr lang="en-US" sz="1600" b="1" dirty="0" err="1" smtClean="0"/>
+              <a:t>phenes</a:t>
+            </a:r>
+            <a:r>
+              <a:rPr lang="en-US" sz="1600" b="1" dirty="0" smtClean="0"/>
+              <a:t> of objects into four main </a:t>
+            </a:r>
+            <a:r>
+              <a:rPr lang="en-US" sz="1600" b="1" dirty="0" smtClean="0"/>
+              <a:t>categories: structural</a:t>
+            </a:r>
+            <a:r>
+              <a:rPr lang="en-US" sz="1600" b="1" dirty="0" smtClean="0"/>
+              <a:t>, functional, qualitative and participatory </a:t>
+            </a:r>
+            <a:r>
+              <a:rPr lang="en-US" sz="1600" b="1" dirty="0" err="1" smtClean="0"/>
+              <a:t>phenes</a:t>
+            </a:r>
+            <a:r>
+              <a:rPr lang="en-US" sz="1600" b="1" dirty="0" smtClean="0"/>
+              <a:t>. Under </a:t>
+            </a:r>
+            <a:r>
+              <a:rPr lang="en-US" sz="1600" b="1" dirty="0" smtClean="0"/>
+              <a:t>the structural </a:t>
+            </a:r>
+            <a:r>
+              <a:rPr lang="en-US" sz="1600" b="1" dirty="0" err="1" smtClean="0"/>
+              <a:t>phenes</a:t>
+            </a:r>
+            <a:r>
+              <a:rPr lang="en-US" sz="1600" b="1" dirty="0" smtClean="0"/>
+              <a:t>, we show possible further classifications based on </a:t>
+            </a:r>
+            <a:r>
+              <a:rPr lang="en-US" sz="1600" b="1" dirty="0" smtClean="0"/>
+              <a:t>the relations </a:t>
+            </a:r>
+            <a:r>
+              <a:rPr lang="en-US" sz="1600" b="1" dirty="0" smtClean="0"/>
+              <a:t>we </a:t>
+            </a:r>
+            <a:r>
+              <a:rPr lang="en-US" sz="1600" b="1" dirty="0" smtClean="0"/>
+              <a:t>use in </a:t>
+            </a:r>
+            <a:r>
+              <a:rPr lang="en-US" sz="1600" b="1" dirty="0" smtClean="0"/>
+              <a:t>our method. Qualitative </a:t>
+            </a:r>
+            <a:r>
+              <a:rPr lang="en-US" sz="1600" b="1" dirty="0" err="1" smtClean="0"/>
+              <a:t>phenes</a:t>
+            </a:r>
+            <a:r>
+              <a:rPr lang="en-US" sz="1600" b="1" dirty="0" smtClean="0"/>
+              <a:t> can be further distinguished into those where only the quality is relevant and those where the quality’s value is considered</a:t>
+            </a:r>
+            <a:endParaRPr lang="en-US" sz="1600" b="1" dirty="0"/>
+          </a:p>
+        </p:txBody>
+      </p:sp>
+      <p:sp>
+        <p:nvSpPr>
+          <p:cNvPr id="3" name="Title 2"/>
+          <p:cNvSpPr>
+            <a:spLocks noGrp="1"/>
+          </p:cNvSpPr>
+          <p:nvPr>
+            <p:ph type="title"/>
+          </p:nvPr>
+        </p:nvSpPr>
+        <p:spPr/>
+        <p:txBody>
+          <a:bodyPr/>
+          <a:lstStyle/>
+          <a:p>
+            <a:r>
+              <a:rPr lang="en-US" dirty="0" smtClean="0"/>
+              <a:t>The </a:t>
+            </a:r>
+            <a:r>
+              <a:rPr lang="en-US" dirty="0" err="1" smtClean="0"/>
+              <a:t>phene</a:t>
+            </a:r>
+            <a:r>
+              <a:rPr lang="en-US" dirty="0" smtClean="0"/>
+              <a:t> approach</a:t>
+            </a:r>
+            <a:endParaRPr lang="en-US" dirty="0"/>
+          </a:p>
+        </p:txBody>
+      </p:sp>
+      <p:pic>
+        <p:nvPicPr>
+          <p:cNvPr id="4" name="Picture 3"/>
+          <p:cNvPicPr>
+            <a:picLocks noChangeAspect="1"/>
+          </p:cNvPicPr>
+          <p:nvPr/>
+        </p:nvPicPr>
+        <p:blipFill>
+          <a:blip r:embed="rId2"/>
+          <a:stretch>
+            <a:fillRect/>
+          </a:stretch>
+        </p:blipFill>
+        <p:spPr>
+          <a:xfrm>
+            <a:off x="0" y="3733800"/>
+            <a:ext cx="9144000" cy="1749539"/>
+          </a:xfrm>
+          <a:prstGeom prst="rect">
+            <a:avLst/>
+          </a:prstGeom>
+        </p:spPr>
+      </p:pic>
+      <p:sp>
+        <p:nvSpPr>
+          <p:cNvPr id="5" name="TextBox 4"/>
+          <p:cNvSpPr txBox="1"/>
+          <p:nvPr/>
+        </p:nvSpPr>
+        <p:spPr>
+          <a:xfrm>
+            <a:off x="6705600" y="6211669"/>
+            <a:ext cx="2034481" cy="646331"/>
+          </a:xfrm>
+          <a:prstGeom prst="rect">
+            <a:avLst/>
+          </a:prstGeom>
+          <a:noFill/>
+        </p:spPr>
+        <p:txBody>
+          <a:bodyPr wrap="none" rtlCol="0">
+            <a:spAutoFit/>
+          </a:bodyPr>
+          <a:lstStyle/>
+          <a:p>
+            <a:r>
+              <a:rPr lang="en-US" dirty="0" err="1" smtClean="0"/>
+              <a:t>Hoehndorf</a:t>
+            </a:r>
+            <a:r>
+              <a:rPr lang="en-US" dirty="0" smtClean="0"/>
+              <a:t> 2010</a:t>
+            </a:r>
+          </a:p>
+          <a:p>
+            <a:endParaRPr lang="en-US" dirty="0"/>
+          </a:p>
+        </p:txBody>
+      </p:sp>
+    </p:spTree>
+  </p:cSld>
+  <p:clrMapOvr>
+    <a:masterClrMapping/>
+  </p:clrMapOvr>
+  <p:transition>
+    <p:fade/>
+  </p:transition>
+</p:sld>
+</file>
+
+<file path=ppt/slides/slide17.xml><?xml version="1.0" encoding="utf-8"?>
+<p:sld xmlns:a="http://schemas.openxmlformats.org/drawingml/2006/main" xmlns:r="http://schemas.openxmlformats.org/officeDocument/2006/relationships" xmlns:mc="http://schemas.openxmlformats.org/markup-compatibility/2006" xmlns:mv="urn:schemas-microsoft-com:mac:vml" xmlns:p="http://schemas.openxmlformats.org/presentationml/2006/main" mc:Ignorable="mv" mc:PreserveAttributes="mv:*">
+  <p:cSld>
+    <p:spTree>
+      <p:nvGrpSpPr>
+        <p:cNvPr id="1" name=""/>
+        <p:cNvGrpSpPr/>
+        <p:nvPr/>
+      </p:nvGrpSpPr>
+      <p:grpSpPr>
+        <a:xfrm>
+          <a:off x="0" y="0"/>
+          <a:ext cx="0" cy="0"/>
+          <a:chOff x="0" y="0"/>
+          <a:chExt cx="0" cy="0"/>
+        </a:xfrm>
+      </p:grpSpPr>
+      <p:sp>
+        <p:nvSpPr>
+          <p:cNvPr id="3" name="Title 2"/>
+          <p:cNvSpPr>
+            <a:spLocks noGrp="1"/>
+          </p:cNvSpPr>
+          <p:nvPr>
+            <p:ph type="title"/>
+          </p:nvPr>
+        </p:nvSpPr>
+        <p:spPr/>
+        <p:txBody>
+          <a:bodyPr/>
+          <a:lstStyle/>
+          <a:p>
+            <a:r>
+              <a:rPr lang="en-US" dirty="0" smtClean="0"/>
+              <a:t>Phenotype relations</a:t>
+            </a:r>
+            <a:endParaRPr lang="en-US" dirty="0"/>
+          </a:p>
+        </p:txBody>
+      </p:sp>
+      <p:pic>
+        <p:nvPicPr>
+          <p:cNvPr id="6" name="Picture 5"/>
+          <p:cNvPicPr>
+            <a:picLocks noChangeAspect="1"/>
+          </p:cNvPicPr>
+          <p:nvPr/>
+        </p:nvPicPr>
+        <p:blipFill>
+          <a:blip r:embed="rId2"/>
+          <a:srcRect l="8000" t="7576" r="12154" b="18939"/>
+          <a:stretch>
+            <a:fillRect/>
+          </a:stretch>
+        </p:blipFill>
+        <p:spPr>
+          <a:xfrm>
+            <a:off x="0" y="614445"/>
+            <a:ext cx="9144000" cy="5126983"/>
+          </a:xfrm>
+          <a:prstGeom prst="rect">
+            <a:avLst/>
+          </a:prstGeom>
+        </p:spPr>
+      </p:pic>
+      <p:sp>
+        <p:nvSpPr>
+          <p:cNvPr id="7" name="Rectangle 6"/>
+          <p:cNvSpPr/>
+          <p:nvPr/>
+        </p:nvSpPr>
+        <p:spPr>
+          <a:xfrm>
+            <a:off x="6705600" y="6324600"/>
+            <a:ext cx="2034481" cy="369332"/>
+          </a:xfrm>
+          <a:prstGeom prst="rect">
+            <a:avLst/>
+          </a:prstGeom>
+        </p:spPr>
+        <p:txBody>
+          <a:bodyPr wrap="none">
+            <a:spAutoFit/>
+          </a:bodyPr>
+          <a:lstStyle/>
+          <a:p>
+            <a:r>
+              <a:rPr lang="en-US" dirty="0" err="1" smtClean="0"/>
+              <a:t>Hoehndorf</a:t>
+            </a:r>
+            <a:r>
+              <a:rPr lang="en-US" dirty="0" smtClean="0"/>
+              <a:t> 2010</a:t>
+            </a:r>
+          </a:p>
+        </p:txBody>
+      </p:sp>
+    </p:spTree>
+  </p:cSld>
+  <p:clrMapOvr>
+    <a:masterClrMapping/>
+  </p:clrMapOvr>
+  <p:transition>
+    <p:fade/>
+  </p:transition>
+</p:sld>
+</file>
+
 <file path=ppt/slides/slide2.xml><?xml version="1.0" encoding="utf-8"?>
-<p:sld xmlns:a="http://schemas.openxmlformats.org/drawingml/2006/main" xmlns:r="http://schemas.openxmlformats.org/officeDocument/2006/relationships" xmlns:p="http://schemas.openxmlformats.org/presentationml/2006/main">
+<p:sld xmlns:a="http://schemas.openxmlformats.org/drawingml/2006/main" xmlns:r="http://schemas.openxmlformats.org/officeDocument/2006/relationships" xmlns:mc="http://schemas.openxmlformats.org/markup-compatibility/2006" xmlns:mv="urn:schemas-microsoft-com:mac:vml" xmlns:p="http://schemas.openxmlformats.org/presentationml/2006/main" mc:Ignorable="mv" mc:PreserveAttributes="mv:*">
   <p:cSld>
     <p:spTree>
       <p:nvGrpSpPr>
@@ -32382,11 +33278,7 @@
             <a:p>
               <a:r>
                 <a:rPr lang="en-US" sz="1600" i="1" dirty="0" smtClean="0"/>
-                <a:t>i</a:t>
-              </a:r>
-              <a:r>
-                <a:rPr lang="en-US" sz="1600" i="1" dirty="0" smtClean="0"/>
-                <a:t>s about</a:t>
+                <a:t>is about</a:t>
               </a:r>
               <a:endParaRPr lang="en-US" sz="1600" i="1" dirty="0"/>
             </a:p>
@@ -32525,11 +33417,7 @@
             <a:p>
               <a:r>
                 <a:rPr lang="en-US" sz="1600" i="1" dirty="0" err="1" smtClean="0"/>
-                <a:t>b</a:t>
-              </a:r>
-              <a:r>
-                <a:rPr lang="en-US" sz="1600" i="1" dirty="0" err="1" smtClean="0"/>
-                <a:t>earer_of</a:t>
+                <a:t>bearer_of</a:t>
               </a:r>
               <a:r>
                 <a:rPr lang="en-US" sz="1600" i="1" dirty="0" smtClean="0"/>
@@ -32549,7 +33437,7 @@
 </file>
 
 <file path=ppt/slides/slide3.xml><?xml version="1.0" encoding="utf-8"?>
-<p:sld xmlns:a="http://schemas.openxmlformats.org/drawingml/2006/main" xmlns:r="http://schemas.openxmlformats.org/officeDocument/2006/relationships" xmlns:p="http://schemas.openxmlformats.org/presentationml/2006/main">
+<p:sld xmlns:a="http://schemas.openxmlformats.org/drawingml/2006/main" xmlns:r="http://schemas.openxmlformats.org/officeDocument/2006/relationships" xmlns:mc="http://schemas.openxmlformats.org/markup-compatibility/2006" xmlns:mv="urn:schemas-microsoft-com:mac:vml" xmlns:p="http://schemas.openxmlformats.org/presentationml/2006/main" mc:Ignorable="mv" mc:PreserveAttributes="mv:*">
   <p:cSld>
     <p:spTree>
       <p:nvGrpSpPr>
@@ -33145,11 +34033,7 @@
             <a:p>
               <a:r>
                 <a:rPr lang="en-US" sz="1600" i="1" dirty="0" smtClean="0"/>
-                <a:t>i</a:t>
-              </a:r>
-              <a:r>
-                <a:rPr lang="en-US" sz="1600" i="1" dirty="0" smtClean="0"/>
-                <a:t>s about</a:t>
+                <a:t>is about</a:t>
               </a:r>
               <a:endParaRPr lang="en-US" sz="1600" i="1" dirty="0"/>
             </a:p>
@@ -33371,17 +34255,12 @@
             <a:p>
               <a:r>
                 <a:rPr lang="en-US" sz="1600" i="1" dirty="0" err="1" smtClean="0"/>
-                <a:t>b</a:t>
-              </a:r>
-              <a:r>
-                <a:rPr lang="en-US" sz="1600" i="1" dirty="0" err="1" smtClean="0"/>
-                <a:t>earer_of</a:t>
+                <a:t>bearer_of</a:t>
               </a:r>
               <a:r>
                 <a:rPr lang="en-US" sz="1600" i="1" dirty="0" smtClean="0"/>
                 <a:t>?</a:t>
               </a:r>
-              <a:endParaRPr lang="en-US" sz="1600" i="1" dirty="0" smtClean="0"/>
             </a:p>
           </p:txBody>
         </p:sp>
@@ -33395,7 +34274,7 @@
 </file>
 
 <file path=ppt/slides/slide4.xml><?xml version="1.0" encoding="utf-8"?>
-<p:sld xmlns:a="http://schemas.openxmlformats.org/drawingml/2006/main" xmlns:r="http://schemas.openxmlformats.org/officeDocument/2006/relationships" xmlns:p="http://schemas.openxmlformats.org/presentationml/2006/main">
+<p:sld xmlns:a="http://schemas.openxmlformats.org/drawingml/2006/main" xmlns:r="http://schemas.openxmlformats.org/officeDocument/2006/relationships" xmlns:mc="http://schemas.openxmlformats.org/markup-compatibility/2006" xmlns:mv="urn:schemas-microsoft-com:mac:vml" xmlns:p="http://schemas.openxmlformats.org/presentationml/2006/main" mc:Ignorable="mv" mc:PreserveAttributes="mv:*">
   <p:cSld>
     <p:spTree>
       <p:nvGrpSpPr>
@@ -33428,23 +34307,7 @@
           <a:p>
             <a:r>
               <a:rPr lang="en-US" dirty="0" smtClean="0"/>
-              <a:t>Phenotype of </a:t>
-            </a:r>
-            <a:r>
-              <a:rPr lang="en-US" dirty="0" smtClean="0"/>
-              <a:t>geneticall</a:t>
-            </a:r>
-            <a:r>
-              <a:rPr lang="en-US" dirty="0" smtClean="0"/>
-              <a:t>y modified </a:t>
-            </a:r>
-            <a:r>
-              <a:rPr lang="en-US" dirty="0" smtClean="0"/>
-              <a:t>protozoon </a:t>
-            </a:r>
-            <a:r>
-              <a:rPr lang="en-US" dirty="0" smtClean="0"/>
-              <a:t>parasite</a:t>
+              <a:t>Phenotype of genetically modified protozoon parasite</a:t>
             </a:r>
           </a:p>
           <a:p>
@@ -33551,7 +34414,7 @@
 </file>
 
 <file path=ppt/slides/slide5.xml><?xml version="1.0" encoding="utf-8"?>
-<p:sld xmlns:a="http://schemas.openxmlformats.org/drawingml/2006/main" xmlns:r="http://schemas.openxmlformats.org/officeDocument/2006/relationships" xmlns:p="http://schemas.openxmlformats.org/presentationml/2006/main">
+<p:sld xmlns:a="http://schemas.openxmlformats.org/drawingml/2006/main" xmlns:r="http://schemas.openxmlformats.org/officeDocument/2006/relationships" xmlns:mc="http://schemas.openxmlformats.org/markup-compatibility/2006" xmlns:mv="urn:schemas-microsoft-com:mac:vml" xmlns:p="http://schemas.openxmlformats.org/presentationml/2006/main" mc:Ignorable="mv" mc:PreserveAttributes="mv:*">
   <p:cSld>
     <p:spTree>
       <p:nvGrpSpPr>
@@ -33771,7 +34634,7 @@
 </file>
 
 <file path=ppt/slides/slide6.xml><?xml version="1.0" encoding="utf-8"?>
-<p:sld xmlns:a="http://schemas.openxmlformats.org/drawingml/2006/main" xmlns:r="http://schemas.openxmlformats.org/officeDocument/2006/relationships" xmlns:p="http://schemas.openxmlformats.org/presentationml/2006/main">
+<p:sld xmlns:a="http://schemas.openxmlformats.org/drawingml/2006/main" xmlns:r="http://schemas.openxmlformats.org/officeDocument/2006/relationships" xmlns:mc="http://schemas.openxmlformats.org/markup-compatibility/2006" xmlns:mv="urn:schemas-microsoft-com:mac:vml" xmlns:p="http://schemas.openxmlformats.org/presentationml/2006/main" mc:Ignorable="mv" mc:PreserveAttributes="mv:*">
   <p:cSld>
     <p:spTree>
       <p:nvGrpSpPr>
@@ -33910,7 +34773,7 @@
 </file>
 
 <file path=ppt/slides/slide7.xml><?xml version="1.0" encoding="utf-8"?>
-<p:sld xmlns:a="http://schemas.openxmlformats.org/drawingml/2006/main" xmlns:r="http://schemas.openxmlformats.org/officeDocument/2006/relationships" xmlns:p="http://schemas.openxmlformats.org/presentationml/2006/main">
+<p:sld xmlns:a="http://schemas.openxmlformats.org/drawingml/2006/main" xmlns:r="http://schemas.openxmlformats.org/officeDocument/2006/relationships" xmlns:mc="http://schemas.openxmlformats.org/markup-compatibility/2006" xmlns:mv="urn:schemas-microsoft-com:mac:vml" xmlns:p="http://schemas.openxmlformats.org/presentationml/2006/main" mc:Ignorable="mv" mc:PreserveAttributes="mv:*">
   <p:cSld>
     <p:spTree>
       <p:nvGrpSpPr>
@@ -34032,7 +34895,7 @@
 </file>
 
 <file path=ppt/slides/slide8.xml><?xml version="1.0" encoding="utf-8"?>
-<p:sld xmlns:a="http://schemas.openxmlformats.org/drawingml/2006/main" xmlns:r="http://schemas.openxmlformats.org/officeDocument/2006/relationships" xmlns:p="http://schemas.openxmlformats.org/presentationml/2006/main">
+<p:sld xmlns:a="http://schemas.openxmlformats.org/drawingml/2006/main" xmlns:r="http://schemas.openxmlformats.org/officeDocument/2006/relationships" xmlns:mc="http://schemas.openxmlformats.org/markup-compatibility/2006" xmlns:mv="urn:schemas-microsoft-com:mac:vml" xmlns:p="http://schemas.openxmlformats.org/presentationml/2006/main" mc:Ignorable="mv" mc:PreserveAttributes="mv:*">
   <p:cSld>
     <p:spTree>
       <p:nvGrpSpPr>
@@ -34209,7 +35072,7 @@
 </file>
 
 <file path=ppt/slides/slide9.xml><?xml version="1.0" encoding="utf-8"?>
-<p:sld xmlns:a="http://schemas.openxmlformats.org/drawingml/2006/main" xmlns:r="http://schemas.openxmlformats.org/officeDocument/2006/relationships" xmlns:p="http://schemas.openxmlformats.org/presentationml/2006/main">
+<p:sld xmlns:a="http://schemas.openxmlformats.org/drawingml/2006/main" xmlns:r="http://schemas.openxmlformats.org/officeDocument/2006/relationships" xmlns:mc="http://schemas.openxmlformats.org/markup-compatibility/2006" xmlns:mv="urn:schemas-microsoft-com:mac:vml" xmlns:p="http://schemas.openxmlformats.org/presentationml/2006/main" mc:Ignorable="mv" mc:PreserveAttributes="mv:*">
   <p:cSld>
     <p:spTree>
       <p:nvGrpSpPr>

</xml_diff>